<commit_message>
feat : implement google oauth login feature
</commit_message>
<xml_diff>
--- a/other/document/DB 설계 및 화면설계 리소스.pptx
+++ b/other/document/DB 설계 및 화면설계 리소스.pptx
@@ -5,7 +5,7 @@
     <p:sldMasterId id="2147483648" r:id="rId1"/>
   </p:sldMasterIdLst>
   <p:handoutMasterIdLst>
-    <p:handoutMasterId r:id="rId14"/>
+    <p:handoutMasterId r:id="rId15"/>
   </p:handoutMasterIdLst>
   <p:sldIdLst>
     <p:sldId id="318" r:id="rId2"/>
@@ -20,6 +20,7 @@
     <p:sldId id="324" r:id="rId11"/>
     <p:sldId id="325" r:id="rId12"/>
     <p:sldId id="327" r:id="rId13"/>
+    <p:sldId id="329" r:id="rId14"/>
   </p:sldIdLst>
   <p:sldSz cx="12192000" cy="6858000"/>
   <p:notesSz cx="6858000" cy="9144000"/>
@@ -220,7 +221,7 @@
             <a:fld id="{A33333DA-1850-4149-A852-9DE0883580C0}" type="datetimeFigureOut">
               <a:rPr lang="ko-KR" altLang="en-US" smtClean="0"/>
               <a:pPr/>
-              <a:t>2022-05-28</a:t>
+              <a:t>2022-06-18</a:t>
             </a:fld>
             <a:endParaRPr lang="ko-KR" altLang="en-US"/>
           </a:p>
@@ -436,7 +437,7 @@
             <a:fld id="{51E7485C-BA9C-437D-8914-F26087319FD8}" type="datetimeFigureOut">
               <a:rPr lang="ko-KR" altLang="en-US" smtClean="0"/>
               <a:pPr/>
-              <a:t>2022-05-28</a:t>
+              <a:t>2022-06-18</a:t>
             </a:fld>
             <a:endParaRPr lang="ko-KR" altLang="en-US"/>
           </a:p>
@@ -608,7 +609,7 @@
             <a:fld id="{51E7485C-BA9C-437D-8914-F26087319FD8}" type="datetimeFigureOut">
               <a:rPr lang="ko-KR" altLang="en-US" smtClean="0"/>
               <a:pPr/>
-              <a:t>2022-05-28</a:t>
+              <a:t>2022-06-18</a:t>
             </a:fld>
             <a:endParaRPr lang="ko-KR" altLang="en-US"/>
           </a:p>
@@ -790,7 +791,7 @@
             <a:fld id="{51E7485C-BA9C-437D-8914-F26087319FD8}" type="datetimeFigureOut">
               <a:rPr lang="ko-KR" altLang="en-US" smtClean="0"/>
               <a:pPr/>
-              <a:t>2022-05-28</a:t>
+              <a:t>2022-06-18</a:t>
             </a:fld>
             <a:endParaRPr lang="ko-KR" altLang="en-US"/>
           </a:p>
@@ -962,7 +963,7 @@
             <a:fld id="{51E7485C-BA9C-437D-8914-F26087319FD8}" type="datetimeFigureOut">
               <a:rPr lang="ko-KR" altLang="en-US" smtClean="0"/>
               <a:pPr/>
-              <a:t>2022-05-28</a:t>
+              <a:t>2022-06-18</a:t>
             </a:fld>
             <a:endParaRPr lang="ko-KR" altLang="en-US"/>
           </a:p>
@@ -1210,7 +1211,7 @@
             <a:fld id="{51E7485C-BA9C-437D-8914-F26087319FD8}" type="datetimeFigureOut">
               <a:rPr lang="ko-KR" altLang="en-US" smtClean="0"/>
               <a:pPr/>
-              <a:t>2022-05-28</a:t>
+              <a:t>2022-06-18</a:t>
             </a:fld>
             <a:endParaRPr lang="ko-KR" altLang="en-US"/>
           </a:p>
@@ -1444,7 +1445,7 @@
             <a:fld id="{51E7485C-BA9C-437D-8914-F26087319FD8}" type="datetimeFigureOut">
               <a:rPr lang="ko-KR" altLang="en-US" smtClean="0"/>
               <a:pPr/>
-              <a:t>2022-05-28</a:t>
+              <a:t>2022-06-18</a:t>
             </a:fld>
             <a:endParaRPr lang="ko-KR" altLang="en-US"/>
           </a:p>
@@ -1813,7 +1814,7 @@
             <a:fld id="{51E7485C-BA9C-437D-8914-F26087319FD8}" type="datetimeFigureOut">
               <a:rPr lang="ko-KR" altLang="en-US" smtClean="0"/>
               <a:pPr/>
-              <a:t>2022-05-28</a:t>
+              <a:t>2022-06-18</a:t>
             </a:fld>
             <a:endParaRPr lang="ko-KR" altLang="en-US"/>
           </a:p>
@@ -1933,7 +1934,7 @@
             <a:fld id="{51E7485C-BA9C-437D-8914-F26087319FD8}" type="datetimeFigureOut">
               <a:rPr lang="ko-KR" altLang="en-US" smtClean="0"/>
               <a:pPr/>
-              <a:t>2022-05-28</a:t>
+              <a:t>2022-06-18</a:t>
             </a:fld>
             <a:endParaRPr lang="ko-KR" altLang="en-US"/>
           </a:p>
@@ -2030,7 +2031,7 @@
             <a:fld id="{51E7485C-BA9C-437D-8914-F26087319FD8}" type="datetimeFigureOut">
               <a:rPr lang="ko-KR" altLang="en-US" smtClean="0"/>
               <a:pPr/>
-              <a:t>2022-05-28</a:t>
+              <a:t>2022-06-18</a:t>
             </a:fld>
             <a:endParaRPr lang="ko-KR" altLang="en-US"/>
           </a:p>
@@ -2309,7 +2310,7 @@
             <a:fld id="{51E7485C-BA9C-437D-8914-F26087319FD8}" type="datetimeFigureOut">
               <a:rPr lang="ko-KR" altLang="en-US" smtClean="0"/>
               <a:pPr/>
-              <a:t>2022-05-28</a:t>
+              <a:t>2022-06-18</a:t>
             </a:fld>
             <a:endParaRPr lang="ko-KR" altLang="en-US"/>
           </a:p>
@@ -2564,7 +2565,7 @@
             <a:fld id="{51E7485C-BA9C-437D-8914-F26087319FD8}" type="datetimeFigureOut">
               <a:rPr lang="ko-KR" altLang="en-US" smtClean="0"/>
               <a:pPr/>
-              <a:t>2022-05-28</a:t>
+              <a:t>2022-06-18</a:t>
             </a:fld>
             <a:endParaRPr lang="ko-KR" altLang="en-US"/>
           </a:p>
@@ -2782,7 +2783,7 @@
             <a:fld id="{51E7485C-BA9C-437D-8914-F26087319FD8}" type="datetimeFigureOut">
               <a:rPr lang="ko-KR" altLang="en-US" smtClean="0"/>
               <a:pPr/>
-              <a:t>2022-05-28</a:t>
+              <a:t>2022-06-18</a:t>
             </a:fld>
             <a:endParaRPr lang="ko-KR" altLang="en-US"/>
           </a:p>
@@ -5305,6 +5306,596 @@
     <p:extLst>
       <p:ext uri="{BB962C8B-B14F-4D97-AF65-F5344CB8AC3E}">
         <p14:creationId xmlns:p14="http://schemas.microsoft.com/office/powerpoint/2010/main" val="770098739"/>
+      </p:ext>
+    </p:extLst>
+  </p:cSld>
+  <p:clrMapOvr>
+    <a:masterClrMapping/>
+  </p:clrMapOvr>
+  <p:timing>
+    <p:tnLst>
+      <p:par>
+        <p:cTn id="1" dur="indefinite" restart="never" nodeType="tmRoot"/>
+      </p:par>
+    </p:tnLst>
+  </p:timing>
+</p:sld>
+</file>
+
+<file path=ppt/slides/slide13.xml><?xml version="1.0" encoding="utf-8"?>
+<p:sld xmlns:a="http://schemas.openxmlformats.org/drawingml/2006/main" xmlns:r="http://schemas.openxmlformats.org/officeDocument/2006/relationships" xmlns:p="http://schemas.openxmlformats.org/presentationml/2006/main">
+  <p:cSld>
+    <p:spTree>
+      <p:nvGrpSpPr>
+        <p:cNvPr id="1" name=""/>
+        <p:cNvGrpSpPr/>
+        <p:nvPr/>
+      </p:nvGrpSpPr>
+      <p:grpSpPr>
+        <a:xfrm>
+          <a:off x="0" y="0"/>
+          <a:ext cx="0" cy="0"/>
+          <a:chOff x="0" y="0"/>
+          <a:chExt cx="0" cy="0"/>
+        </a:xfrm>
+      </p:grpSpPr>
+      <p:sp>
+        <p:nvSpPr>
+          <p:cNvPr id="124" name="Rectangle 15"/>
+          <p:cNvSpPr>
+            <a:spLocks noChangeArrowheads="1"/>
+          </p:cNvSpPr>
+          <p:nvPr/>
+        </p:nvSpPr>
+        <p:spPr bwMode="auto">
+          <a:xfrm>
+            <a:off x="5641975" y="3343910"/>
+            <a:ext cx="12192000" cy="457200"/>
+          </a:xfrm>
+          <a:prstGeom prst="rect">
+            <a:avLst/>
+          </a:prstGeom>
+          <a:noFill/>
+          <a:ln>
+            <a:noFill/>
+          </a:ln>
+          <a:effectLst/>
+          <a:extLst>
+            <a:ext uri="{909E8E84-426E-40DD-AFC4-6F175D3DCCD1}">
+              <a14:hiddenFill xmlns:a14="http://schemas.microsoft.com/office/drawing/2010/main">
+                <a:solidFill>
+                  <a:schemeClr val="accent1"/>
+                </a:solidFill>
+              </a14:hiddenFill>
+            </a:ext>
+            <a:ext uri="{91240B29-F687-4F45-9708-019B960494DF}">
+              <a14:hiddenLine xmlns:a14="http://schemas.microsoft.com/office/drawing/2010/main" w="9525">
+                <a:solidFill>
+                  <a:schemeClr val="tx1"/>
+                </a:solidFill>
+                <a:miter lim="800000"/>
+                <a:headEnd/>
+                <a:tailEnd/>
+              </a14:hiddenLine>
+            </a:ext>
+            <a:ext uri="{AF507438-7753-43E0-B8FC-AC1667EBCBE1}">
+              <a14:hiddenEffects xmlns:a14="http://schemas.microsoft.com/office/drawing/2010/main">
+                <a:effectLst>
+                  <a:outerShdw dist="35921" dir="2700000" algn="ctr" rotWithShape="0">
+                    <a:schemeClr val="bg2"/>
+                  </a:outerShdw>
+                </a:effectLst>
+              </a14:hiddenEffects>
+            </a:ext>
+          </a:extLst>
+        </p:spPr>
+        <p:txBody>
+          <a:bodyPr vert="horz" wrap="none" lIns="91440" tIns="45720" rIns="91440" bIns="45720" numCol="1" anchor="ctr" anchorCtr="0" compatLnSpc="1">
+            <a:prstTxWarp prst="textNoShape">
+              <a:avLst/>
+            </a:prstTxWarp>
+            <a:spAutoFit/>
+          </a:bodyPr>
+          <a:lstStyle/>
+          <a:p>
+            <a:endParaRPr lang="ko-KR" altLang="en-US"/>
+          </a:p>
+        </p:txBody>
+      </p:sp>
+      <p:pic>
+        <p:nvPicPr>
+          <p:cNvPr id="1026" name="Picture 2"/>
+          <p:cNvPicPr>
+            <a:picLocks noChangeAspect="1" noChangeArrowheads="1"/>
+          </p:cNvPicPr>
+          <p:nvPr/>
+        </p:nvPicPr>
+        <p:blipFill>
+          <a:blip r:embed="rId2">
+            <a:extLst>
+              <a:ext uri="{28A0092B-C50C-407E-A947-70E740481C1C}">
+                <a14:useLocalDpi xmlns:a14="http://schemas.microsoft.com/office/drawing/2010/main" val="0"/>
+              </a:ext>
+            </a:extLst>
+          </a:blip>
+          <a:srcRect/>
+          <a:stretch>
+            <a:fillRect/>
+          </a:stretch>
+        </p:blipFill>
+        <p:spPr bwMode="auto">
+          <a:xfrm>
+            <a:off x="7653972" y="3024188"/>
+            <a:ext cx="4124325" cy="809625"/>
+          </a:xfrm>
+          <a:prstGeom prst="rect">
+            <a:avLst/>
+          </a:prstGeom>
+          <a:noFill/>
+          <a:ln>
+            <a:noFill/>
+          </a:ln>
+          <a:effectLst/>
+          <a:extLst>
+            <a:ext uri="{909E8E84-426E-40DD-AFC4-6F175D3DCCD1}">
+              <a14:hiddenFill xmlns:a14="http://schemas.microsoft.com/office/drawing/2010/main">
+                <a:solidFill>
+                  <a:schemeClr val="accent1"/>
+                </a:solidFill>
+              </a14:hiddenFill>
+            </a:ext>
+            <a:ext uri="{91240B29-F687-4F45-9708-019B960494DF}">
+              <a14:hiddenLine xmlns:a14="http://schemas.microsoft.com/office/drawing/2010/main" w="9525">
+                <a:solidFill>
+                  <a:schemeClr val="tx1"/>
+                </a:solidFill>
+                <a:miter lim="800000"/>
+                <a:headEnd/>
+                <a:tailEnd/>
+              </a14:hiddenLine>
+            </a:ext>
+            <a:ext uri="{AF507438-7753-43E0-B8FC-AC1667EBCBE1}">
+              <a14:hiddenEffects xmlns:a14="http://schemas.microsoft.com/office/drawing/2010/main">
+                <a:effectLst>
+                  <a:outerShdw dist="35921" dir="2700000" algn="ctr" rotWithShape="0">
+                    <a:schemeClr val="bg2"/>
+                  </a:outerShdw>
+                </a:effectLst>
+              </a14:hiddenEffects>
+            </a:ext>
+          </a:extLst>
+        </p:spPr>
+      </p:pic>
+      <p:sp>
+        <p:nvSpPr>
+          <p:cNvPr id="24" name="직사각형 23"/>
+          <p:cNvSpPr/>
+          <p:nvPr/>
+        </p:nvSpPr>
+        <p:spPr>
+          <a:xfrm>
+            <a:off x="8043108" y="4521994"/>
+            <a:ext cx="3490913" cy="516731"/>
+          </a:xfrm>
+          <a:prstGeom prst="rect">
+            <a:avLst/>
+          </a:prstGeom>
+          <a:noFill/>
+          <a:ln>
+            <a:solidFill>
+              <a:schemeClr val="tx1"/>
+            </a:solidFill>
+          </a:ln>
+        </p:spPr>
+        <p:style>
+          <a:lnRef idx="2">
+            <a:schemeClr val="accent1">
+              <a:shade val="50000"/>
+            </a:schemeClr>
+          </a:lnRef>
+          <a:fillRef idx="1">
+            <a:schemeClr val="accent1"/>
+          </a:fillRef>
+          <a:effectRef idx="0">
+            <a:schemeClr val="accent1"/>
+          </a:effectRef>
+          <a:fontRef idx="minor">
+            <a:schemeClr val="lt1"/>
+          </a:fontRef>
+        </p:style>
+        <p:txBody>
+          <a:bodyPr rtlCol="0" anchor="ctr"/>
+          <a:lstStyle/>
+          <a:p>
+            <a:pPr algn="ctr"/>
+            <a:endParaRPr lang="ko-KR" altLang="en-US" sz="2000">
+              <a:latin typeface="HY동녘M" panose="02030600000101010101" pitchFamily="18" charset="-127"/>
+              <a:ea typeface="HY동녘M" panose="02030600000101010101" pitchFamily="18" charset="-127"/>
+            </a:endParaRPr>
+          </a:p>
+        </p:txBody>
+      </p:sp>
+      <p:sp>
+        <p:nvSpPr>
+          <p:cNvPr id="25" name="직사각형 24"/>
+          <p:cNvSpPr/>
+          <p:nvPr/>
+        </p:nvSpPr>
+        <p:spPr>
+          <a:xfrm>
+            <a:off x="8043108" y="3839210"/>
+            <a:ext cx="3490913" cy="399415"/>
+          </a:xfrm>
+          <a:prstGeom prst="rect">
+            <a:avLst/>
+          </a:prstGeom>
+          <a:solidFill>
+            <a:srgbClr val="5C6A30"/>
+          </a:solidFill>
+          <a:ln>
+            <a:noFill/>
+          </a:ln>
+        </p:spPr>
+        <p:style>
+          <a:lnRef idx="2">
+            <a:schemeClr val="accent1">
+              <a:shade val="50000"/>
+            </a:schemeClr>
+          </a:lnRef>
+          <a:fillRef idx="1">
+            <a:schemeClr val="accent1"/>
+          </a:fillRef>
+          <a:effectRef idx="0">
+            <a:schemeClr val="accent1"/>
+          </a:effectRef>
+          <a:fontRef idx="minor">
+            <a:schemeClr val="lt1"/>
+          </a:fontRef>
+        </p:style>
+        <p:txBody>
+          <a:bodyPr rtlCol="0" anchor="ctr"/>
+          <a:lstStyle/>
+          <a:p>
+            <a:pPr algn="ctr"/>
+            <a:r>
+              <a:rPr lang="ko-KR" altLang="en-US" sz="2000" smtClean="0">
+                <a:latin typeface="HY동녘M" panose="02030600000101010101" pitchFamily="18" charset="-127"/>
+                <a:ea typeface="HY동녘M" panose="02030600000101010101" pitchFamily="18" charset="-127"/>
+              </a:rPr>
+              <a:t>로그인</a:t>
+            </a:r>
+            <a:endParaRPr lang="ko-KR" altLang="en-US" sz="2000">
+              <a:latin typeface="HY동녘M" panose="02030600000101010101" pitchFamily="18" charset="-127"/>
+              <a:ea typeface="HY동녘M" panose="02030600000101010101" pitchFamily="18" charset="-127"/>
+            </a:endParaRPr>
+          </a:p>
+        </p:txBody>
+      </p:sp>
+      <p:pic>
+        <p:nvPicPr>
+          <p:cNvPr id="1043" name="Picture 19"/>
+          <p:cNvPicPr>
+            <a:picLocks noChangeAspect="1" noChangeArrowheads="1"/>
+          </p:cNvPicPr>
+          <p:nvPr/>
+        </p:nvPicPr>
+        <p:blipFill>
+          <a:blip r:embed="rId3" cstate="print">
+            <a:extLst>
+              <a:ext uri="{28A0092B-C50C-407E-A947-70E740481C1C}">
+                <a14:useLocalDpi xmlns:a14="http://schemas.microsoft.com/office/drawing/2010/main" val="0"/>
+              </a:ext>
+            </a:extLst>
+          </a:blip>
+          <a:srcRect/>
+          <a:stretch>
+            <a:fillRect/>
+          </a:stretch>
+        </p:blipFill>
+        <p:spPr bwMode="auto">
+          <a:xfrm>
+            <a:off x="8472327" y="4620609"/>
+            <a:ext cx="2487613" cy="319499"/>
+          </a:xfrm>
+          <a:prstGeom prst="rect">
+            <a:avLst/>
+          </a:prstGeom>
+          <a:noFill/>
+          <a:ln>
+            <a:noFill/>
+          </a:ln>
+          <a:effectLst/>
+          <a:extLst>
+            <a:ext uri="{909E8E84-426E-40DD-AFC4-6F175D3DCCD1}">
+              <a14:hiddenFill xmlns:a14="http://schemas.microsoft.com/office/drawing/2010/main">
+                <a:solidFill>
+                  <a:schemeClr val="accent1"/>
+                </a:solidFill>
+              </a14:hiddenFill>
+            </a:ext>
+            <a:ext uri="{91240B29-F687-4F45-9708-019B960494DF}">
+              <a14:hiddenLine xmlns:a14="http://schemas.microsoft.com/office/drawing/2010/main" w="9525">
+                <a:solidFill>
+                  <a:schemeClr val="tx1"/>
+                </a:solidFill>
+                <a:miter lim="800000"/>
+                <a:headEnd/>
+                <a:tailEnd/>
+              </a14:hiddenLine>
+            </a:ext>
+            <a:ext uri="{AF507438-7753-43E0-B8FC-AC1667EBCBE1}">
+              <a14:hiddenEffects xmlns:a14="http://schemas.microsoft.com/office/drawing/2010/main">
+                <a:effectLst>
+                  <a:outerShdw dist="35921" dir="2700000" algn="ctr" rotWithShape="0">
+                    <a:schemeClr val="bg2"/>
+                  </a:outerShdw>
+                </a:effectLst>
+              </a14:hiddenEffects>
+            </a:ext>
+          </a:extLst>
+        </p:spPr>
+      </p:pic>
+      <p:sp>
+        <p:nvSpPr>
+          <p:cNvPr id="5" name="직사각형 4"/>
+          <p:cNvSpPr/>
+          <p:nvPr/>
+        </p:nvSpPr>
+        <p:spPr>
+          <a:xfrm>
+            <a:off x="456603" y="1390650"/>
+            <a:ext cx="5726113" cy="1038225"/>
+          </a:xfrm>
+          <a:prstGeom prst="rect">
+            <a:avLst/>
+          </a:prstGeom>
+          <a:solidFill>
+            <a:schemeClr val="accent3">
+              <a:lumMod val="60000"/>
+              <a:lumOff val="40000"/>
+            </a:schemeClr>
+          </a:solidFill>
+          <a:ln>
+            <a:noFill/>
+          </a:ln>
+        </p:spPr>
+        <p:style>
+          <a:lnRef idx="2">
+            <a:schemeClr val="accent1">
+              <a:shade val="50000"/>
+            </a:schemeClr>
+          </a:lnRef>
+          <a:fillRef idx="1">
+            <a:schemeClr val="accent1"/>
+          </a:fillRef>
+          <a:effectRef idx="0">
+            <a:schemeClr val="accent1"/>
+          </a:effectRef>
+          <a:fontRef idx="minor">
+            <a:schemeClr val="lt1"/>
+          </a:fontRef>
+        </p:style>
+        <p:txBody>
+          <a:bodyPr rtlCol="0" anchor="ctr"/>
+          <a:lstStyle/>
+          <a:p>
+            <a:pPr algn="ctr"/>
+            <a:r>
+              <a:rPr lang="ko-KR" altLang="en-US" sz="4400" smtClean="0">
+                <a:latin typeface="HY목각파임B" panose="02030600000101010101" pitchFamily="18" charset="-127"/>
+                <a:ea typeface="HY목각파임B" panose="02030600000101010101" pitchFamily="18" charset="-127"/>
+              </a:rPr>
+              <a:t>쿡얼론</a:t>
+            </a:r>
+            <a:r>
+              <a:rPr lang="ko-KR" altLang="en-US" sz="4400" smtClean="0">
+                <a:latin typeface="HY동녘M" panose="02030600000101010101" pitchFamily="18" charset="-127"/>
+                <a:ea typeface="HY동녘M" panose="02030600000101010101" pitchFamily="18" charset="-127"/>
+              </a:rPr>
+              <a:t> 로그인</a:t>
+            </a:r>
+            <a:endParaRPr lang="ko-KR" altLang="en-US" sz="4400">
+              <a:latin typeface="HY동녘M" panose="02030600000101010101" pitchFamily="18" charset="-127"/>
+              <a:ea typeface="HY동녘M" panose="02030600000101010101" pitchFamily="18" charset="-127"/>
+            </a:endParaRPr>
+          </a:p>
+        </p:txBody>
+      </p:sp>
+      <p:sp>
+        <p:nvSpPr>
+          <p:cNvPr id="30" name="직사각형 29"/>
+          <p:cNvSpPr/>
+          <p:nvPr/>
+        </p:nvSpPr>
+        <p:spPr>
+          <a:xfrm>
+            <a:off x="6303962" y="1390650"/>
+            <a:ext cx="5726113" cy="1038225"/>
+          </a:xfrm>
+          <a:prstGeom prst="rect">
+            <a:avLst/>
+          </a:prstGeom>
+          <a:solidFill>
+            <a:schemeClr val="accent3">
+              <a:lumMod val="60000"/>
+              <a:lumOff val="40000"/>
+            </a:schemeClr>
+          </a:solidFill>
+          <a:ln>
+            <a:noFill/>
+          </a:ln>
+        </p:spPr>
+        <p:style>
+          <a:lnRef idx="2">
+            <a:schemeClr val="accent1">
+              <a:shade val="50000"/>
+            </a:schemeClr>
+          </a:lnRef>
+          <a:fillRef idx="1">
+            <a:schemeClr val="accent1"/>
+          </a:fillRef>
+          <a:effectRef idx="0">
+            <a:schemeClr val="accent1"/>
+          </a:effectRef>
+          <a:fontRef idx="minor">
+            <a:schemeClr val="lt1"/>
+          </a:fontRef>
+        </p:style>
+        <p:txBody>
+          <a:bodyPr rtlCol="0" anchor="ctr"/>
+          <a:lstStyle/>
+          <a:p>
+            <a:pPr algn="ctr"/>
+            <a:r>
+              <a:rPr lang="ko-KR" altLang="en-US" sz="4400" smtClean="0">
+                <a:latin typeface="HY목각파임B" panose="02030600000101010101" pitchFamily="18" charset="-127"/>
+                <a:ea typeface="HY목각파임B" panose="02030600000101010101" pitchFamily="18" charset="-127"/>
+              </a:rPr>
+              <a:t>쿡얼론</a:t>
+            </a:r>
+            <a:r>
+              <a:rPr lang="ko-KR" altLang="en-US" sz="4400" smtClean="0">
+                <a:latin typeface="HY동녘M" panose="02030600000101010101" pitchFamily="18" charset="-127"/>
+                <a:ea typeface="HY동녘M" panose="02030600000101010101" pitchFamily="18" charset="-127"/>
+              </a:rPr>
+              <a:t> 회원 가입</a:t>
+            </a:r>
+            <a:endParaRPr lang="ko-KR" altLang="en-US" sz="4400">
+              <a:latin typeface="HY동녘M" panose="02030600000101010101" pitchFamily="18" charset="-127"/>
+              <a:ea typeface="HY동녘M" panose="02030600000101010101" pitchFamily="18" charset="-127"/>
+            </a:endParaRPr>
+          </a:p>
+        </p:txBody>
+      </p:sp>
+      <p:sp>
+        <p:nvSpPr>
+          <p:cNvPr id="32" name="직사각형 31"/>
+          <p:cNvSpPr/>
+          <p:nvPr/>
+        </p:nvSpPr>
+        <p:spPr>
+          <a:xfrm>
+            <a:off x="3319659" y="2953861"/>
+            <a:ext cx="2683138" cy="950278"/>
+          </a:xfrm>
+          <a:prstGeom prst="rect">
+            <a:avLst/>
+          </a:prstGeom>
+          <a:solidFill>
+            <a:schemeClr val="accent3">
+              <a:lumMod val="60000"/>
+              <a:lumOff val="40000"/>
+            </a:schemeClr>
+          </a:solidFill>
+          <a:ln>
+            <a:noFill/>
+          </a:ln>
+        </p:spPr>
+        <p:style>
+          <a:lnRef idx="2">
+            <a:schemeClr val="accent1">
+              <a:shade val="50000"/>
+            </a:schemeClr>
+          </a:lnRef>
+          <a:fillRef idx="1">
+            <a:schemeClr val="accent1"/>
+          </a:fillRef>
+          <a:effectRef idx="0">
+            <a:schemeClr val="accent1"/>
+          </a:effectRef>
+          <a:fontRef idx="minor">
+            <a:schemeClr val="lt1"/>
+          </a:fontRef>
+        </p:style>
+        <p:txBody>
+          <a:bodyPr rtlCol="0" anchor="ctr"/>
+          <a:lstStyle/>
+          <a:p>
+            <a:pPr algn="ctr"/>
+            <a:r>
+              <a:rPr lang="ko-KR" altLang="en-US" sz="4400" smtClean="0">
+                <a:latin typeface="HY동녘M" panose="02030600000101010101" pitchFamily="18" charset="-127"/>
+                <a:ea typeface="HY동녘M" panose="02030600000101010101" pitchFamily="18" charset="-127"/>
+              </a:rPr>
+              <a:t>검색</a:t>
+            </a:r>
+            <a:endParaRPr lang="ko-KR" altLang="en-US" sz="4400">
+              <a:latin typeface="HY동녘M" panose="02030600000101010101" pitchFamily="18" charset="-127"/>
+              <a:ea typeface="HY동녘M" panose="02030600000101010101" pitchFamily="18" charset="-127"/>
+            </a:endParaRPr>
+          </a:p>
+        </p:txBody>
+      </p:sp>
+      <p:sp>
+        <p:nvSpPr>
+          <p:cNvPr id="12" name="직사각형 11"/>
+          <p:cNvSpPr/>
+          <p:nvPr/>
+        </p:nvSpPr>
+        <p:spPr>
+          <a:xfrm>
+            <a:off x="3319660" y="5796358"/>
+            <a:ext cx="3571593" cy="950277"/>
+          </a:xfrm>
+          <a:prstGeom prst="rect">
+            <a:avLst/>
+          </a:prstGeom>
+          <a:solidFill>
+            <a:schemeClr val="accent3">
+              <a:lumMod val="60000"/>
+              <a:lumOff val="40000"/>
+            </a:schemeClr>
+          </a:solidFill>
+          <a:ln>
+            <a:noFill/>
+          </a:ln>
+        </p:spPr>
+        <p:style>
+          <a:lnRef idx="2">
+            <a:schemeClr val="accent1">
+              <a:shade val="50000"/>
+            </a:schemeClr>
+          </a:lnRef>
+          <a:fillRef idx="1">
+            <a:schemeClr val="accent1"/>
+          </a:fillRef>
+          <a:effectRef idx="0">
+            <a:schemeClr val="accent1"/>
+          </a:effectRef>
+          <a:fontRef idx="minor">
+            <a:schemeClr val="lt1"/>
+          </a:fontRef>
+        </p:style>
+        <p:txBody>
+          <a:bodyPr rtlCol="0" anchor="ctr"/>
+          <a:lstStyle/>
+          <a:p>
+            <a:pPr algn="ctr"/>
+            <a:r>
+              <a:rPr lang="ko-KR" altLang="en-US" sz="4400" smtClean="0">
+                <a:latin typeface="HY동녘M" panose="02030600000101010101" pitchFamily="18" charset="-127"/>
+                <a:ea typeface="HY동녘M" panose="02030600000101010101" pitchFamily="18" charset="-127"/>
+              </a:rPr>
+              <a:t>로그아</a:t>
+            </a:r>
+            <a:r>
+              <a:rPr lang="ko-KR" altLang="en-US" sz="4400">
+                <a:latin typeface="HY동녘M" panose="02030600000101010101" pitchFamily="18" charset="-127"/>
+                <a:ea typeface="HY동녘M" panose="02030600000101010101" pitchFamily="18" charset="-127"/>
+              </a:rPr>
+              <a:t>웃</a:t>
+            </a:r>
+            <a:endParaRPr lang="ko-KR" altLang="en-US" sz="4400">
+              <a:latin typeface="HY동녘M" panose="02030600000101010101" pitchFamily="18" charset="-127"/>
+              <a:ea typeface="HY동녘M" panose="02030600000101010101" pitchFamily="18" charset="-127"/>
+            </a:endParaRPr>
+          </a:p>
+        </p:txBody>
+      </p:sp>
+    </p:spTree>
+    <p:extLst>
+      <p:ext uri="{BB962C8B-B14F-4D97-AF65-F5344CB8AC3E}">
+        <p14:creationId xmlns:p14="http://schemas.microsoft.com/office/powerpoint/2010/main" val="4964573"/>
       </p:ext>
     </p:extLst>
   </p:cSld>

</xml_diff>

<commit_message>
chore : update resource.pptx
</commit_message>
<xml_diff>
--- a/other/document/DB 설계 및 화면설계 리소스.pptx
+++ b/other/document/DB 설계 및 화면설계 리소스.pptx
@@ -121,7 +121,7 @@
   </p:defaultTextStyle>
   <p:extLst>
     <p:ext uri="{EFAFB233-063F-42B5-8137-9DF3F51BA10A}">
-      <p15:sldGuideLst xmlns:p15="http://schemas.microsoft.com/office/powerpoint/2012/main" xmlns="">
+      <p15:sldGuideLst xmlns="" xmlns:p15="http://schemas.microsoft.com/office/powerpoint/2012/main">
         <p15:guide id="1" orient="horz" pos="2160" userDrawn="1">
           <p15:clr>
             <a:srgbClr val="A4A3A4"/>
@@ -221,7 +221,7 @@
             <a:fld id="{A33333DA-1850-4149-A852-9DE0883580C0}" type="datetimeFigureOut">
               <a:rPr lang="ko-KR" altLang="en-US" smtClean="0"/>
               <a:pPr/>
-              <a:t>2022-06-18</a:t>
+              <a:t>2022-06-20</a:t>
             </a:fld>
             <a:endParaRPr lang="ko-KR" altLang="en-US"/>
           </a:p>
@@ -437,7 +437,7 @@
             <a:fld id="{51E7485C-BA9C-437D-8914-F26087319FD8}" type="datetimeFigureOut">
               <a:rPr lang="ko-KR" altLang="en-US" smtClean="0"/>
               <a:pPr/>
-              <a:t>2022-06-18</a:t>
+              <a:t>2022-06-20</a:t>
             </a:fld>
             <a:endParaRPr lang="ko-KR" altLang="en-US"/>
           </a:p>
@@ -609,7 +609,7 @@
             <a:fld id="{51E7485C-BA9C-437D-8914-F26087319FD8}" type="datetimeFigureOut">
               <a:rPr lang="ko-KR" altLang="en-US" smtClean="0"/>
               <a:pPr/>
-              <a:t>2022-06-18</a:t>
+              <a:t>2022-06-20</a:t>
             </a:fld>
             <a:endParaRPr lang="ko-KR" altLang="en-US"/>
           </a:p>
@@ -791,7 +791,7 @@
             <a:fld id="{51E7485C-BA9C-437D-8914-F26087319FD8}" type="datetimeFigureOut">
               <a:rPr lang="ko-KR" altLang="en-US" smtClean="0"/>
               <a:pPr/>
-              <a:t>2022-06-18</a:t>
+              <a:t>2022-06-20</a:t>
             </a:fld>
             <a:endParaRPr lang="ko-KR" altLang="en-US"/>
           </a:p>
@@ -963,7 +963,7 @@
             <a:fld id="{51E7485C-BA9C-437D-8914-F26087319FD8}" type="datetimeFigureOut">
               <a:rPr lang="ko-KR" altLang="en-US" smtClean="0"/>
               <a:pPr/>
-              <a:t>2022-06-18</a:t>
+              <a:t>2022-06-20</a:t>
             </a:fld>
             <a:endParaRPr lang="ko-KR" altLang="en-US"/>
           </a:p>
@@ -1211,7 +1211,7 @@
             <a:fld id="{51E7485C-BA9C-437D-8914-F26087319FD8}" type="datetimeFigureOut">
               <a:rPr lang="ko-KR" altLang="en-US" smtClean="0"/>
               <a:pPr/>
-              <a:t>2022-06-18</a:t>
+              <a:t>2022-06-20</a:t>
             </a:fld>
             <a:endParaRPr lang="ko-KR" altLang="en-US"/>
           </a:p>
@@ -1445,7 +1445,7 @@
             <a:fld id="{51E7485C-BA9C-437D-8914-F26087319FD8}" type="datetimeFigureOut">
               <a:rPr lang="ko-KR" altLang="en-US" smtClean="0"/>
               <a:pPr/>
-              <a:t>2022-06-18</a:t>
+              <a:t>2022-06-20</a:t>
             </a:fld>
             <a:endParaRPr lang="ko-KR" altLang="en-US"/>
           </a:p>
@@ -1814,7 +1814,7 @@
             <a:fld id="{51E7485C-BA9C-437D-8914-F26087319FD8}" type="datetimeFigureOut">
               <a:rPr lang="ko-KR" altLang="en-US" smtClean="0"/>
               <a:pPr/>
-              <a:t>2022-06-18</a:t>
+              <a:t>2022-06-20</a:t>
             </a:fld>
             <a:endParaRPr lang="ko-KR" altLang="en-US"/>
           </a:p>
@@ -1934,7 +1934,7 @@
             <a:fld id="{51E7485C-BA9C-437D-8914-F26087319FD8}" type="datetimeFigureOut">
               <a:rPr lang="ko-KR" altLang="en-US" smtClean="0"/>
               <a:pPr/>
-              <a:t>2022-06-18</a:t>
+              <a:t>2022-06-20</a:t>
             </a:fld>
             <a:endParaRPr lang="ko-KR" altLang="en-US"/>
           </a:p>
@@ -2031,7 +2031,7 @@
             <a:fld id="{51E7485C-BA9C-437D-8914-F26087319FD8}" type="datetimeFigureOut">
               <a:rPr lang="ko-KR" altLang="en-US" smtClean="0"/>
               <a:pPr/>
-              <a:t>2022-06-18</a:t>
+              <a:t>2022-06-20</a:t>
             </a:fld>
             <a:endParaRPr lang="ko-KR" altLang="en-US"/>
           </a:p>
@@ -2310,7 +2310,7 @@
             <a:fld id="{51E7485C-BA9C-437D-8914-F26087319FD8}" type="datetimeFigureOut">
               <a:rPr lang="ko-KR" altLang="en-US" smtClean="0"/>
               <a:pPr/>
-              <a:t>2022-06-18</a:t>
+              <a:t>2022-06-20</a:t>
             </a:fld>
             <a:endParaRPr lang="ko-KR" altLang="en-US"/>
           </a:p>
@@ -2565,7 +2565,7 @@
             <a:fld id="{51E7485C-BA9C-437D-8914-F26087319FD8}" type="datetimeFigureOut">
               <a:rPr lang="ko-KR" altLang="en-US" smtClean="0"/>
               <a:pPr/>
-              <a:t>2022-06-18</a:t>
+              <a:t>2022-06-20</a:t>
             </a:fld>
             <a:endParaRPr lang="ko-KR" altLang="en-US"/>
           </a:p>
@@ -2783,7 +2783,7 @@
             <a:fld id="{51E7485C-BA9C-437D-8914-F26087319FD8}" type="datetimeFigureOut">
               <a:rPr lang="ko-KR" altLang="en-US" smtClean="0"/>
               <a:pPr/>
-              <a:t>2022-06-18</a:t>
+              <a:t>2022-06-20</a:t>
             </a:fld>
             <a:endParaRPr lang="ko-KR" altLang="en-US"/>
           </a:p>
@@ -5885,7 +5885,93 @@
               </a:rPr>
               <a:t>웃</a:t>
             </a:r>
-            <a:endParaRPr lang="ko-KR" altLang="en-US" sz="4400">
+          </a:p>
+        </p:txBody>
+      </p:sp>
+      <p:pic>
+        <p:nvPicPr>
+          <p:cNvPr id="2" name="Picture 2" descr="C:\Users\jae99\Downloads\2021_Login_with_naver_guidelines_Kr\btnG_완성형.png"/>
+          <p:cNvPicPr>
+            <a:picLocks noChangeAspect="1" noChangeArrowheads="1"/>
+          </p:cNvPicPr>
+          <p:nvPr/>
+        </p:nvPicPr>
+        <p:blipFill>
+          <a:blip r:embed="rId4">
+            <a:extLst>
+              <a:ext uri="{28A0092B-C50C-407E-A947-70E740481C1C}">
+                <a14:useLocalDpi xmlns:a14="http://schemas.microsoft.com/office/drawing/2010/main" val="0"/>
+              </a:ext>
+            </a:extLst>
+          </a:blip>
+          <a:srcRect/>
+          <a:stretch>
+            <a:fillRect/>
+          </a:stretch>
+        </p:blipFill>
+        <p:spPr bwMode="auto">
+          <a:xfrm>
+            <a:off x="8003994" y="5069663"/>
+            <a:ext cx="3569140" cy="951770"/>
+          </a:xfrm>
+          <a:prstGeom prst="rect">
+            <a:avLst/>
+          </a:prstGeom>
+          <a:noFill/>
+          <a:extLst>
+            <a:ext uri="{909E8E84-426E-40DD-AFC4-6F175D3DCCD1}">
+              <a14:hiddenFill xmlns:a14="http://schemas.microsoft.com/office/drawing/2010/main">
+                <a:solidFill>
+                  <a:srgbClr val="FFFFFF"/>
+                </a:solidFill>
+              </a14:hiddenFill>
+            </a:ext>
+          </a:extLst>
+        </p:spPr>
+      </p:pic>
+      <p:sp>
+        <p:nvSpPr>
+          <p:cNvPr id="13" name="직사각형 12"/>
+          <p:cNvSpPr/>
+          <p:nvPr/>
+        </p:nvSpPr>
+        <p:spPr>
+          <a:xfrm>
+            <a:off x="8043108" y="5287182"/>
+            <a:ext cx="3490913" cy="516731"/>
+          </a:xfrm>
+          <a:prstGeom prst="rect">
+            <a:avLst/>
+          </a:prstGeom>
+          <a:noFill/>
+          <a:ln>
+            <a:solidFill>
+              <a:schemeClr val="tx1"/>
+            </a:solidFill>
+          </a:ln>
+        </p:spPr>
+        <p:style>
+          <a:lnRef idx="2">
+            <a:schemeClr val="accent1">
+              <a:shade val="50000"/>
+            </a:schemeClr>
+          </a:lnRef>
+          <a:fillRef idx="1">
+            <a:schemeClr val="accent1"/>
+          </a:fillRef>
+          <a:effectRef idx="0">
+            <a:schemeClr val="accent1"/>
+          </a:effectRef>
+          <a:fontRef idx="minor">
+            <a:schemeClr val="lt1"/>
+          </a:fontRef>
+        </p:style>
+        <p:txBody>
+          <a:bodyPr rtlCol="0" anchor="ctr"/>
+          <a:lstStyle/>
+          <a:p>
+            <a:pPr algn="ctr"/>
+            <a:endParaRPr lang="ko-KR" altLang="en-US" sz="2000">
               <a:latin typeface="HY동녘M" panose="02030600000101010101" pitchFamily="18" charset="-127"/>
               <a:ea typeface="HY동녘M" panose="02030600000101010101" pitchFamily="18" charset="-127"/>
             </a:endParaRPr>
@@ -30701,7 +30787,7 @@
   <a:extraClrSchemeLst/>
   <a:extLst>
     <a:ext uri="{05A4C25C-085E-4340-85A3-A5531E510DB2}">
-      <thm15:themeFamily xmlns:thm15="http://schemas.microsoft.com/office/thememl/2012/main" xmlns="" name="Office Theme" id="{62F939B6-93AF-4DB8-9C6B-D6C7DFDC589F}" vid="{4A3C46E8-61CC-4603-A589-7422A47A8E4A}"/>
+      <thm15:themeFamily xmlns="" xmlns:thm15="http://schemas.microsoft.com/office/thememl/2012/main" name="Office Theme" id="{62F939B6-93AF-4DB8-9C6B-D6C7DFDC589F}" vid="{4A3C46E8-61CC-4603-A589-7422A47A8E4A}"/>
     </a:ext>
   </a:extLst>
 </a:theme>

</xml_diff>

<commit_message>
feat : create BaseEntity
</commit_message>
<xml_diff>
--- a/other/document/DB 설계 및 화면설계 리소스.pptx
+++ b/other/document/DB 설계 및 화면설계 리소스.pptx
@@ -121,7 +121,7 @@
   </p:defaultTextStyle>
   <p:extLst>
     <p:ext uri="{EFAFB233-063F-42B5-8137-9DF3F51BA10A}">
-      <p15:sldGuideLst xmlns="" xmlns:p15="http://schemas.microsoft.com/office/powerpoint/2012/main">
+      <p15:sldGuideLst xmlns:p15="http://schemas.microsoft.com/office/powerpoint/2012/main" xmlns="">
         <p15:guide id="1" orient="horz" pos="2160" userDrawn="1">
           <p15:clr>
             <a:srgbClr val="A4A3A4"/>
@@ -221,7 +221,7 @@
             <a:fld id="{A33333DA-1850-4149-A852-9DE0883580C0}" type="datetimeFigureOut">
               <a:rPr lang="ko-KR" altLang="en-US" smtClean="0"/>
               <a:pPr/>
-              <a:t>2022-06-20</a:t>
+              <a:t>2022-06-23</a:t>
             </a:fld>
             <a:endParaRPr lang="ko-KR" altLang="en-US"/>
           </a:p>
@@ -437,7 +437,7 @@
             <a:fld id="{51E7485C-BA9C-437D-8914-F26087319FD8}" type="datetimeFigureOut">
               <a:rPr lang="ko-KR" altLang="en-US" smtClean="0"/>
               <a:pPr/>
-              <a:t>2022-06-20</a:t>
+              <a:t>2022-06-23</a:t>
             </a:fld>
             <a:endParaRPr lang="ko-KR" altLang="en-US"/>
           </a:p>
@@ -609,7 +609,7 @@
             <a:fld id="{51E7485C-BA9C-437D-8914-F26087319FD8}" type="datetimeFigureOut">
               <a:rPr lang="ko-KR" altLang="en-US" smtClean="0"/>
               <a:pPr/>
-              <a:t>2022-06-20</a:t>
+              <a:t>2022-06-23</a:t>
             </a:fld>
             <a:endParaRPr lang="ko-KR" altLang="en-US"/>
           </a:p>
@@ -791,7 +791,7 @@
             <a:fld id="{51E7485C-BA9C-437D-8914-F26087319FD8}" type="datetimeFigureOut">
               <a:rPr lang="ko-KR" altLang="en-US" smtClean="0"/>
               <a:pPr/>
-              <a:t>2022-06-20</a:t>
+              <a:t>2022-06-23</a:t>
             </a:fld>
             <a:endParaRPr lang="ko-KR" altLang="en-US"/>
           </a:p>
@@ -963,7 +963,7 @@
             <a:fld id="{51E7485C-BA9C-437D-8914-F26087319FD8}" type="datetimeFigureOut">
               <a:rPr lang="ko-KR" altLang="en-US" smtClean="0"/>
               <a:pPr/>
-              <a:t>2022-06-20</a:t>
+              <a:t>2022-06-23</a:t>
             </a:fld>
             <a:endParaRPr lang="ko-KR" altLang="en-US"/>
           </a:p>
@@ -1211,7 +1211,7 @@
             <a:fld id="{51E7485C-BA9C-437D-8914-F26087319FD8}" type="datetimeFigureOut">
               <a:rPr lang="ko-KR" altLang="en-US" smtClean="0"/>
               <a:pPr/>
-              <a:t>2022-06-20</a:t>
+              <a:t>2022-06-23</a:t>
             </a:fld>
             <a:endParaRPr lang="ko-KR" altLang="en-US"/>
           </a:p>
@@ -1445,7 +1445,7 @@
             <a:fld id="{51E7485C-BA9C-437D-8914-F26087319FD8}" type="datetimeFigureOut">
               <a:rPr lang="ko-KR" altLang="en-US" smtClean="0"/>
               <a:pPr/>
-              <a:t>2022-06-20</a:t>
+              <a:t>2022-06-23</a:t>
             </a:fld>
             <a:endParaRPr lang="ko-KR" altLang="en-US"/>
           </a:p>
@@ -1814,7 +1814,7 @@
             <a:fld id="{51E7485C-BA9C-437D-8914-F26087319FD8}" type="datetimeFigureOut">
               <a:rPr lang="ko-KR" altLang="en-US" smtClean="0"/>
               <a:pPr/>
-              <a:t>2022-06-20</a:t>
+              <a:t>2022-06-23</a:t>
             </a:fld>
             <a:endParaRPr lang="ko-KR" altLang="en-US"/>
           </a:p>
@@ -1934,7 +1934,7 @@
             <a:fld id="{51E7485C-BA9C-437D-8914-F26087319FD8}" type="datetimeFigureOut">
               <a:rPr lang="ko-KR" altLang="en-US" smtClean="0"/>
               <a:pPr/>
-              <a:t>2022-06-20</a:t>
+              <a:t>2022-06-23</a:t>
             </a:fld>
             <a:endParaRPr lang="ko-KR" altLang="en-US"/>
           </a:p>
@@ -2031,7 +2031,7 @@
             <a:fld id="{51E7485C-BA9C-437D-8914-F26087319FD8}" type="datetimeFigureOut">
               <a:rPr lang="ko-KR" altLang="en-US" smtClean="0"/>
               <a:pPr/>
-              <a:t>2022-06-20</a:t>
+              <a:t>2022-06-23</a:t>
             </a:fld>
             <a:endParaRPr lang="ko-KR" altLang="en-US"/>
           </a:p>
@@ -2310,7 +2310,7 @@
             <a:fld id="{51E7485C-BA9C-437D-8914-F26087319FD8}" type="datetimeFigureOut">
               <a:rPr lang="ko-KR" altLang="en-US" smtClean="0"/>
               <a:pPr/>
-              <a:t>2022-06-20</a:t>
+              <a:t>2022-06-23</a:t>
             </a:fld>
             <a:endParaRPr lang="ko-KR" altLang="en-US"/>
           </a:p>
@@ -2565,7 +2565,7 @@
             <a:fld id="{51E7485C-BA9C-437D-8914-F26087319FD8}" type="datetimeFigureOut">
               <a:rPr lang="ko-KR" altLang="en-US" smtClean="0"/>
               <a:pPr/>
-              <a:t>2022-06-20</a:t>
+              <a:t>2022-06-23</a:t>
             </a:fld>
             <a:endParaRPr lang="ko-KR" altLang="en-US"/>
           </a:p>
@@ -2783,7 +2783,7 @@
             <a:fld id="{51E7485C-BA9C-437D-8914-F26087319FD8}" type="datetimeFigureOut">
               <a:rPr lang="ko-KR" altLang="en-US" smtClean="0"/>
               <a:pPr/>
-              <a:t>2022-06-20</a:t>
+              <a:t>2022-06-23</a:t>
             </a:fld>
             <a:endParaRPr lang="ko-KR" altLang="en-US"/>
           </a:p>
@@ -11186,7 +11186,7 @@
           <p:nvPr>
             <p:extLst>
               <p:ext uri="{D42A27DB-BD31-4B8C-83A1-F6EECF244321}">
-                <p14:modId xmlns:p14="http://schemas.microsoft.com/office/powerpoint/2010/main" val="3092210383"/>
+                <p14:modId xmlns:p14="http://schemas.microsoft.com/office/powerpoint/2010/main" val="1729288801"/>
               </p:ext>
             </p:extLst>
           </p:nvPr>
@@ -14811,6 +14811,717 @@
         <p:cxnSp>
           <p:nvCxnSpPr>
             <p:cNvPr id="239" name="직선 연결선 238"/>
+            <p:cNvCxnSpPr/>
+            <p:nvPr/>
+          </p:nvCxnSpPr>
+          <p:spPr>
+            <a:xfrm rot="16200000" flipH="1" flipV="1">
+              <a:off x="5369950" y="3045300"/>
+              <a:ext cx="0" cy="177800"/>
+            </a:xfrm>
+            <a:prstGeom prst="line">
+              <a:avLst/>
+            </a:prstGeom>
+            <a:ln w="12700"/>
+          </p:spPr>
+          <p:style>
+            <a:lnRef idx="1">
+              <a:schemeClr val="accent1"/>
+            </a:lnRef>
+            <a:fillRef idx="0">
+              <a:schemeClr val="accent1"/>
+            </a:fillRef>
+            <a:effectRef idx="0">
+              <a:schemeClr val="accent1"/>
+            </a:effectRef>
+            <a:fontRef idx="minor">
+              <a:schemeClr val="tx1"/>
+            </a:fontRef>
+          </p:style>
+        </p:cxnSp>
+      </p:grpSp>
+      <p:graphicFrame>
+        <p:nvGraphicFramePr>
+          <p:cNvPr id="101" name="표 100"/>
+          <p:cNvGraphicFramePr>
+            <a:graphicFrameLocks noGrp="1"/>
+          </p:cNvGraphicFramePr>
+          <p:nvPr>
+            <p:extLst>
+              <p:ext uri="{D42A27DB-BD31-4B8C-83A1-F6EECF244321}">
+                <p14:modId xmlns:p14="http://schemas.microsoft.com/office/powerpoint/2010/main" val="1392795905"/>
+              </p:ext>
+            </p:extLst>
+          </p:nvPr>
+        </p:nvGraphicFramePr>
+        <p:xfrm>
+          <a:off x="7765985" y="2171142"/>
+          <a:ext cx="1515229" cy="1004812"/>
+        </p:xfrm>
+        <a:graphic>
+          <a:graphicData uri="http://schemas.openxmlformats.org/drawingml/2006/table">
+            <a:tbl>
+              <a:tblPr/>
+              <a:tblGrid>
+                <a:gridCol w="1515229"/>
+              </a:tblGrid>
+              <a:tr h="126618">
+                <a:tc>
+                  <a:txBody>
+                    <a:bodyPr/>
+                    <a:lstStyle/>
+                    <a:p>
+                      <a:pPr marL="0" marR="0" indent="0" algn="ctr" fontAlgn="base" latinLnBrk="0">
+                        <a:lnSpc>
+                          <a:spcPct val="160000"/>
+                        </a:lnSpc>
+                        <a:spcBef>
+                          <a:spcPts val="0"/>
+                        </a:spcBef>
+                        <a:spcAft>
+                          <a:spcPts val="0"/>
+                        </a:spcAft>
+                      </a:pPr>
+                      <a:r>
+                        <a:rPr lang="en-US" altLang="ko-KR" sz="800" b="1" kern="0" spc="0" smtClean="0">
+                          <a:solidFill>
+                            <a:srgbClr val="315F97"/>
+                          </a:solidFill>
+                          <a:effectLst/>
+                          <a:ea typeface="맑은 고딕"/>
+                        </a:rPr>
+                        <a:t>RECEIPE_IMG</a:t>
+                      </a:r>
+                      <a:endParaRPr lang="en-US" altLang="ko-KR" sz="800" b="1" kern="0" spc="0" smtClean="0">
+                        <a:solidFill>
+                          <a:srgbClr val="315F97"/>
+                        </a:solidFill>
+                        <a:effectLst/>
+                        <a:ea typeface="맑은 고딕"/>
+                      </a:endParaRPr>
+                    </a:p>
+                  </a:txBody>
+                  <a:tcPr marL="64933" marR="64933" marT="17952" marB="17952" anchor="ctr">
+                    <a:lnL w="3556" cap="flat" cmpd="sng" algn="ctr">
+                      <a:solidFill>
+                        <a:srgbClr val="000000"/>
+                      </a:solidFill>
+                      <a:prstDash val="solid"/>
+                      <a:round/>
+                      <a:headEnd type="none" w="med" len="med"/>
+                      <a:tailEnd type="none" w="med" len="med"/>
+                    </a:lnL>
+                    <a:lnR w="3556" cap="flat" cmpd="sng" algn="ctr">
+                      <a:solidFill>
+                        <a:srgbClr val="000000"/>
+                      </a:solidFill>
+                      <a:prstDash val="solid"/>
+                      <a:round/>
+                      <a:headEnd type="none" w="med" len="med"/>
+                      <a:tailEnd type="none" w="med" len="med"/>
+                    </a:lnR>
+                    <a:lnT w="3556" cap="flat" cmpd="sng" algn="ctr">
+                      <a:solidFill>
+                        <a:srgbClr val="000000"/>
+                      </a:solidFill>
+                      <a:prstDash val="solid"/>
+                      <a:round/>
+                      <a:headEnd type="none" w="med" len="med"/>
+                      <a:tailEnd type="none" w="med" len="med"/>
+                    </a:lnT>
+                    <a:lnB w="3556" cap="flat" cmpd="sng" algn="ctr">
+                      <a:solidFill>
+                        <a:srgbClr val="000000"/>
+                      </a:solidFill>
+                      <a:prstDash val="solid"/>
+                      <a:round/>
+                      <a:headEnd type="none" w="med" len="med"/>
+                      <a:tailEnd type="none" w="med" len="med"/>
+                    </a:lnB>
+                  </a:tcPr>
+                </a:tc>
+              </a:tr>
+              <a:tr h="800442">
+                <a:tc>
+                  <a:txBody>
+                    <a:bodyPr/>
+                    <a:lstStyle/>
+                    <a:p>
+                      <a:pPr marL="0" marR="0" indent="0" algn="l" defTabSz="914400" rtl="0" eaLnBrk="1" fontAlgn="base" latinLnBrk="1" hangingPunct="1">
+                        <a:lnSpc>
+                          <a:spcPct val="100000"/>
+                        </a:lnSpc>
+                        <a:spcBef>
+                          <a:spcPts val="0"/>
+                        </a:spcBef>
+                        <a:spcAft>
+                          <a:spcPts val="0"/>
+                        </a:spcAft>
+                        <a:buClrTx/>
+                        <a:buSzTx/>
+                        <a:buFontTx/>
+                        <a:buNone/>
+                        <a:tabLst/>
+                        <a:defRPr/>
+                      </a:pPr>
+                      <a:r>
+                        <a:rPr lang="en-US" altLang="ko-KR" sz="600" b="1" kern="1200" smtClean="0">
+                          <a:solidFill>
+                            <a:schemeClr val="tx1"/>
+                          </a:solidFill>
+                          <a:effectLst/>
+                          <a:latin typeface="+mn-lt"/>
+                          <a:ea typeface="+mn-ea"/>
+                          <a:cs typeface="+mn-cs"/>
+                        </a:rPr>
+                        <a:t>RECEIPE_IMG_ID </a:t>
+                      </a:r>
+                      <a:r>
+                        <a:rPr lang="en-US" altLang="ko-KR" sz="600" b="1" kern="1200" smtClean="0">
+                          <a:solidFill>
+                            <a:schemeClr val="tx1"/>
+                          </a:solidFill>
+                          <a:effectLst/>
+                          <a:latin typeface="+mn-lt"/>
+                          <a:ea typeface="+mn-ea"/>
+                          <a:cs typeface="+mn-cs"/>
+                        </a:rPr>
+                        <a:t>: BIGINT (PK)</a:t>
+                      </a:r>
+                      <a:endParaRPr lang="en-US" altLang="ko-KR" sz="600" kern="1200" baseline="0" smtClean="0">
+                        <a:solidFill>
+                          <a:schemeClr val="tx1"/>
+                        </a:solidFill>
+                        <a:effectLst/>
+                        <a:latin typeface="+mn-lt"/>
+                        <a:ea typeface="+mn-ea"/>
+                        <a:cs typeface="+mn-cs"/>
+                      </a:endParaRPr>
+                    </a:p>
+                    <a:p>
+                      <a:pPr algn="l" fontAlgn="base" latinLnBrk="1"/>
+                      <a:r>
+                        <a:rPr lang="en-US" altLang="ko-KR" sz="600" b="1" kern="1200" baseline="0" smtClean="0">
+                          <a:solidFill>
+                            <a:schemeClr val="tx1"/>
+                          </a:solidFill>
+                          <a:effectLst/>
+                          <a:latin typeface="+mn-lt"/>
+                          <a:ea typeface="+mn-ea"/>
+                          <a:cs typeface="+mn-cs"/>
+                        </a:rPr>
+                        <a:t>RECEIPE_ID </a:t>
+                      </a:r>
+                      <a:r>
+                        <a:rPr lang="en-US" altLang="ko-KR" sz="600" b="1" kern="1200" baseline="0" smtClean="0">
+                          <a:solidFill>
+                            <a:schemeClr val="tx1"/>
+                          </a:solidFill>
+                          <a:effectLst/>
+                          <a:latin typeface="+mn-lt"/>
+                          <a:ea typeface="+mn-ea"/>
+                          <a:cs typeface="+mn-cs"/>
+                        </a:rPr>
+                        <a:t>: BIGINT (FK)</a:t>
+                      </a:r>
+                    </a:p>
+                    <a:p>
+                      <a:pPr algn="l" fontAlgn="base" latinLnBrk="1"/>
+                      <a:r>
+                        <a:rPr lang="en-US" altLang="ko-KR" sz="600" b="0" kern="1200" baseline="0" smtClean="0">
+                          <a:solidFill>
+                            <a:schemeClr val="tx1"/>
+                          </a:solidFill>
+                          <a:effectLst/>
+                          <a:latin typeface="+mn-lt"/>
+                          <a:ea typeface="+mn-ea"/>
+                          <a:cs typeface="+mn-cs"/>
+                        </a:rPr>
+                        <a:t>IMG_NAME</a:t>
+                      </a:r>
+                      <a:r>
+                        <a:rPr lang="en-US" altLang="ko-KR" sz="600" kern="1200" baseline="0" smtClean="0">
+                          <a:solidFill>
+                            <a:schemeClr val="tx1"/>
+                          </a:solidFill>
+                          <a:effectLst/>
+                          <a:latin typeface="+mn-lt"/>
+                          <a:ea typeface="+mn-ea"/>
+                          <a:cs typeface="+mn-cs"/>
+                        </a:rPr>
+                        <a:t>: </a:t>
+                      </a:r>
+                      <a:r>
+                        <a:rPr lang="en-US" altLang="ko-KR" sz="600" kern="1200" baseline="0" smtClean="0">
+                          <a:solidFill>
+                            <a:schemeClr val="tx1"/>
+                          </a:solidFill>
+                          <a:effectLst/>
+                          <a:latin typeface="+mn-lt"/>
+                          <a:ea typeface="+mn-ea"/>
+                          <a:cs typeface="+mn-cs"/>
+                        </a:rPr>
+                        <a:t>VARCHAR(255</a:t>
+                      </a:r>
+                      <a:r>
+                        <a:rPr lang="en-US" altLang="ko-KR" sz="600" kern="1200" baseline="0" smtClean="0">
+                          <a:solidFill>
+                            <a:schemeClr val="tx1"/>
+                          </a:solidFill>
+                          <a:effectLst/>
+                          <a:latin typeface="+mn-lt"/>
+                          <a:ea typeface="+mn-ea"/>
+                          <a:cs typeface="+mn-cs"/>
+                        </a:rPr>
+                        <a:t>)</a:t>
+                      </a:r>
+                    </a:p>
+                    <a:p>
+                      <a:pPr marL="0" marR="0" indent="0" algn="l" defTabSz="914400" rtl="0" eaLnBrk="1" fontAlgn="base" latinLnBrk="1" hangingPunct="1">
+                        <a:lnSpc>
+                          <a:spcPct val="100000"/>
+                        </a:lnSpc>
+                        <a:spcBef>
+                          <a:spcPts val="0"/>
+                        </a:spcBef>
+                        <a:spcAft>
+                          <a:spcPts val="0"/>
+                        </a:spcAft>
+                        <a:buClrTx/>
+                        <a:buSzTx/>
+                        <a:buFontTx/>
+                        <a:buNone/>
+                        <a:tabLst/>
+                        <a:defRPr/>
+                      </a:pPr>
+                      <a:r>
+                        <a:rPr lang="en-US" altLang="ko-KR" sz="600" b="0" kern="1200" baseline="0" smtClean="0">
+                          <a:solidFill>
+                            <a:schemeClr val="tx1"/>
+                          </a:solidFill>
+                          <a:effectLst/>
+                          <a:latin typeface="+mn-lt"/>
+                          <a:ea typeface="+mn-ea"/>
+                          <a:cs typeface="+mn-cs"/>
+                        </a:rPr>
+                        <a:t>ORI_IMAGE_NAME</a:t>
+                      </a:r>
+                      <a:r>
+                        <a:rPr lang="en-US" altLang="ko-KR" sz="600" kern="1200" baseline="0" smtClean="0">
+                          <a:solidFill>
+                            <a:schemeClr val="tx1"/>
+                          </a:solidFill>
+                          <a:effectLst/>
+                          <a:latin typeface="+mn-lt"/>
+                          <a:ea typeface="+mn-ea"/>
+                          <a:cs typeface="+mn-cs"/>
+                        </a:rPr>
+                        <a:t>: VARCHAR(255)</a:t>
+                      </a:r>
+                    </a:p>
+                    <a:p>
+                      <a:pPr marL="0" marR="0" indent="0" algn="l" defTabSz="914400" rtl="0" eaLnBrk="1" fontAlgn="base" latinLnBrk="1" hangingPunct="1">
+                        <a:lnSpc>
+                          <a:spcPct val="100000"/>
+                        </a:lnSpc>
+                        <a:spcBef>
+                          <a:spcPts val="0"/>
+                        </a:spcBef>
+                        <a:spcAft>
+                          <a:spcPts val="0"/>
+                        </a:spcAft>
+                        <a:buClrTx/>
+                        <a:buSzTx/>
+                        <a:buFontTx/>
+                        <a:buNone/>
+                        <a:tabLst/>
+                        <a:defRPr/>
+                      </a:pPr>
+                      <a:r>
+                        <a:rPr lang="en-US" altLang="ko-KR" sz="600" kern="1200" baseline="0" smtClean="0">
+                          <a:solidFill>
+                            <a:schemeClr val="tx1"/>
+                          </a:solidFill>
+                          <a:effectLst/>
+                          <a:latin typeface="+mn-lt"/>
+                          <a:ea typeface="+mn-ea"/>
+                          <a:cs typeface="+mn-cs"/>
+                        </a:rPr>
+                        <a:t>IMG_URL: VARCHAR(255)</a:t>
+                      </a:r>
+                    </a:p>
+                    <a:p>
+                      <a:pPr marL="0" marR="0" indent="0" algn="l" defTabSz="914400" rtl="0" eaLnBrk="1" fontAlgn="base" latinLnBrk="1" hangingPunct="1">
+                        <a:lnSpc>
+                          <a:spcPct val="100000"/>
+                        </a:lnSpc>
+                        <a:spcBef>
+                          <a:spcPts val="0"/>
+                        </a:spcBef>
+                        <a:spcAft>
+                          <a:spcPts val="0"/>
+                        </a:spcAft>
+                        <a:buClrTx/>
+                        <a:buSzTx/>
+                        <a:buFontTx/>
+                        <a:buNone/>
+                        <a:tabLst/>
+                        <a:defRPr/>
+                      </a:pPr>
+                      <a:r>
+                        <a:rPr lang="en-US" altLang="ko-KR" sz="600" kern="1200" baseline="0" smtClean="0">
+                          <a:solidFill>
+                            <a:schemeClr val="tx1"/>
+                          </a:solidFill>
+                          <a:effectLst/>
+                          <a:latin typeface="+mn-lt"/>
+                          <a:ea typeface="+mn-ea"/>
+                          <a:cs typeface="+mn-cs"/>
+                        </a:rPr>
+                        <a:t>REP_IMG_YN : VARCHAR(255)</a:t>
+                      </a:r>
+                    </a:p>
+                  </a:txBody>
+                  <a:tcPr marL="64933" marR="64933" marT="17952" marB="17952" anchor="ctr">
+                    <a:lnL w="3556" cap="flat" cmpd="sng" algn="ctr">
+                      <a:solidFill>
+                        <a:srgbClr val="000000"/>
+                      </a:solidFill>
+                      <a:prstDash val="solid"/>
+                      <a:round/>
+                      <a:headEnd type="none" w="med" len="med"/>
+                      <a:tailEnd type="none" w="med" len="med"/>
+                    </a:lnL>
+                    <a:lnR w="3556" cap="flat" cmpd="sng" algn="ctr">
+                      <a:solidFill>
+                        <a:srgbClr val="000000"/>
+                      </a:solidFill>
+                      <a:prstDash val="solid"/>
+                      <a:round/>
+                      <a:headEnd type="none" w="med" len="med"/>
+                      <a:tailEnd type="none" w="med" len="med"/>
+                    </a:lnR>
+                    <a:lnT w="3556" cap="flat" cmpd="sng" algn="ctr">
+                      <a:solidFill>
+                        <a:srgbClr val="000000"/>
+                      </a:solidFill>
+                      <a:prstDash val="solid"/>
+                      <a:round/>
+                      <a:headEnd type="none" w="med" len="med"/>
+                      <a:tailEnd type="none" w="med" len="med"/>
+                    </a:lnT>
+                    <a:lnB w="3556" cap="flat" cmpd="sng" algn="ctr">
+                      <a:solidFill>
+                        <a:srgbClr val="000000"/>
+                      </a:solidFill>
+                      <a:prstDash val="solid"/>
+                      <a:round/>
+                      <a:headEnd type="none" w="med" len="med"/>
+                      <a:tailEnd type="none" w="med" len="med"/>
+                    </a:lnB>
+                  </a:tcPr>
+                </a:tc>
+              </a:tr>
+            </a:tbl>
+          </a:graphicData>
+        </a:graphic>
+      </p:graphicFrame>
+      <p:grpSp>
+        <p:nvGrpSpPr>
+          <p:cNvPr id="102" name="그룹 101"/>
+          <p:cNvGrpSpPr/>
+          <p:nvPr/>
+        </p:nvGrpSpPr>
+        <p:grpSpPr>
+          <a:xfrm rot="5400000">
+            <a:off x="7399023" y="2414695"/>
+            <a:ext cx="186690" cy="547682"/>
+            <a:chOff x="5281050" y="3021012"/>
+            <a:chExt cx="186690" cy="900667"/>
+          </a:xfrm>
+        </p:grpSpPr>
+        <p:cxnSp>
+          <p:nvCxnSpPr>
+            <p:cNvPr id="103" name="직선 연결선 102"/>
+            <p:cNvCxnSpPr/>
+            <p:nvPr/>
+          </p:nvCxnSpPr>
+          <p:spPr>
+            <a:xfrm flipV="1">
+              <a:off x="5378222" y="3021012"/>
+              <a:ext cx="0" cy="194734"/>
+            </a:xfrm>
+            <a:prstGeom prst="line">
+              <a:avLst/>
+            </a:prstGeom>
+            <a:ln w="12700"/>
+          </p:spPr>
+          <p:style>
+            <a:lnRef idx="1">
+              <a:schemeClr val="accent1"/>
+            </a:lnRef>
+            <a:fillRef idx="0">
+              <a:schemeClr val="accent1"/>
+            </a:fillRef>
+            <a:effectRef idx="0">
+              <a:schemeClr val="accent1"/>
+            </a:effectRef>
+            <a:fontRef idx="minor">
+              <a:schemeClr val="tx1"/>
+            </a:fontRef>
+          </p:style>
+        </p:cxnSp>
+        <p:cxnSp>
+          <p:nvCxnSpPr>
+            <p:cNvPr id="104" name="직선 연결선 103"/>
+            <p:cNvCxnSpPr/>
+            <p:nvPr/>
+          </p:nvCxnSpPr>
+          <p:spPr>
+            <a:xfrm flipV="1">
+              <a:off x="5378222" y="3259613"/>
+              <a:ext cx="0" cy="113188"/>
+            </a:xfrm>
+            <a:prstGeom prst="line">
+              <a:avLst/>
+            </a:prstGeom>
+            <a:ln w="12700"/>
+          </p:spPr>
+          <p:style>
+            <a:lnRef idx="1">
+              <a:schemeClr val="accent1"/>
+            </a:lnRef>
+            <a:fillRef idx="0">
+              <a:schemeClr val="accent1"/>
+            </a:fillRef>
+            <a:effectRef idx="0">
+              <a:schemeClr val="accent1"/>
+            </a:effectRef>
+            <a:fontRef idx="minor">
+              <a:schemeClr val="tx1"/>
+            </a:fontRef>
+          </p:style>
+        </p:cxnSp>
+        <p:cxnSp>
+          <p:nvCxnSpPr>
+            <p:cNvPr id="105" name="직선 연결선 104"/>
+            <p:cNvCxnSpPr/>
+            <p:nvPr/>
+          </p:nvCxnSpPr>
+          <p:spPr>
+            <a:xfrm flipV="1">
+              <a:off x="5378222" y="3416713"/>
+              <a:ext cx="0" cy="113188"/>
+            </a:xfrm>
+            <a:prstGeom prst="line">
+              <a:avLst/>
+            </a:prstGeom>
+            <a:ln w="12700"/>
+          </p:spPr>
+          <p:style>
+            <a:lnRef idx="1">
+              <a:schemeClr val="accent1"/>
+            </a:lnRef>
+            <a:fillRef idx="0">
+              <a:schemeClr val="accent1"/>
+            </a:fillRef>
+            <a:effectRef idx="0">
+              <a:schemeClr val="accent1"/>
+            </a:effectRef>
+            <a:fontRef idx="minor">
+              <a:schemeClr val="tx1"/>
+            </a:fontRef>
+          </p:style>
+        </p:cxnSp>
+        <p:cxnSp>
+          <p:nvCxnSpPr>
+            <p:cNvPr id="106" name="직선 연결선 105"/>
+            <p:cNvCxnSpPr/>
+            <p:nvPr/>
+          </p:nvCxnSpPr>
+          <p:spPr>
+            <a:xfrm flipV="1">
+              <a:off x="5378222" y="3724670"/>
+              <a:ext cx="0" cy="136835"/>
+            </a:xfrm>
+            <a:prstGeom prst="line">
+              <a:avLst/>
+            </a:prstGeom>
+            <a:ln w="12700"/>
+          </p:spPr>
+          <p:style>
+            <a:lnRef idx="1">
+              <a:schemeClr val="accent1"/>
+            </a:lnRef>
+            <a:fillRef idx="0">
+              <a:schemeClr val="accent1"/>
+            </a:fillRef>
+            <a:effectRef idx="0">
+              <a:schemeClr val="accent1"/>
+            </a:effectRef>
+            <a:fontRef idx="minor">
+              <a:schemeClr val="tx1"/>
+            </a:fontRef>
+          </p:style>
+        </p:cxnSp>
+        <p:cxnSp>
+          <p:nvCxnSpPr>
+            <p:cNvPr id="107" name="직선 연결선 106"/>
+            <p:cNvCxnSpPr/>
+            <p:nvPr/>
+          </p:nvCxnSpPr>
+          <p:spPr>
+            <a:xfrm flipV="1">
+              <a:off x="5378222" y="3808491"/>
+              <a:ext cx="0" cy="113188"/>
+            </a:xfrm>
+            <a:prstGeom prst="line">
+              <a:avLst/>
+            </a:prstGeom>
+            <a:ln w="12700"/>
+          </p:spPr>
+          <p:style>
+            <a:lnRef idx="1">
+              <a:schemeClr val="accent1"/>
+            </a:lnRef>
+            <a:fillRef idx="0">
+              <a:schemeClr val="accent1"/>
+            </a:fillRef>
+            <a:effectRef idx="0">
+              <a:schemeClr val="accent1"/>
+            </a:effectRef>
+            <a:fontRef idx="minor">
+              <a:schemeClr val="tx1"/>
+            </a:fontRef>
+          </p:style>
+        </p:cxnSp>
+        <p:cxnSp>
+          <p:nvCxnSpPr>
+            <p:cNvPr id="108" name="직선 연결선 107"/>
+            <p:cNvCxnSpPr/>
+            <p:nvPr/>
+          </p:nvCxnSpPr>
+          <p:spPr>
+            <a:xfrm rot="16200000" flipV="1">
+              <a:off x="5364252" y="3821500"/>
+              <a:ext cx="107950" cy="80010"/>
+            </a:xfrm>
+            <a:prstGeom prst="line">
+              <a:avLst/>
+            </a:prstGeom>
+            <a:ln w="12700"/>
+          </p:spPr>
+          <p:style>
+            <a:lnRef idx="1">
+              <a:schemeClr val="accent1"/>
+            </a:lnRef>
+            <a:fillRef idx="0">
+              <a:schemeClr val="accent1"/>
+            </a:fillRef>
+            <a:effectRef idx="0">
+              <a:schemeClr val="accent1"/>
+            </a:effectRef>
+            <a:fontRef idx="minor">
+              <a:schemeClr val="tx1"/>
+            </a:fontRef>
+          </p:style>
+        </p:cxnSp>
+        <p:cxnSp>
+          <p:nvCxnSpPr>
+            <p:cNvPr id="109" name="직선 연결선 108"/>
+            <p:cNvCxnSpPr/>
+            <p:nvPr/>
+          </p:nvCxnSpPr>
+          <p:spPr>
+            <a:xfrm rot="16200000">
+              <a:off x="5275970" y="3822460"/>
+              <a:ext cx="107950" cy="80010"/>
+            </a:xfrm>
+            <a:prstGeom prst="line">
+              <a:avLst/>
+            </a:prstGeom>
+            <a:ln w="12700"/>
+          </p:spPr>
+          <p:style>
+            <a:lnRef idx="1">
+              <a:schemeClr val="accent1"/>
+            </a:lnRef>
+            <a:fillRef idx="0">
+              <a:schemeClr val="accent1"/>
+            </a:fillRef>
+            <a:effectRef idx="0">
+              <a:schemeClr val="accent1"/>
+            </a:effectRef>
+            <a:fontRef idx="minor">
+              <a:schemeClr val="tx1"/>
+            </a:fontRef>
+          </p:style>
+        </p:cxnSp>
+        <p:cxnSp>
+          <p:nvCxnSpPr>
+            <p:cNvPr id="110" name="직선 연결선 109"/>
+            <p:cNvCxnSpPr/>
+            <p:nvPr/>
+          </p:nvCxnSpPr>
+          <p:spPr>
+            <a:xfrm rot="16200000" flipH="1" flipV="1">
+              <a:off x="5378840" y="3719591"/>
+              <a:ext cx="0" cy="177800"/>
+            </a:xfrm>
+            <a:prstGeom prst="line">
+              <a:avLst/>
+            </a:prstGeom>
+            <a:ln w="12700"/>
+          </p:spPr>
+          <p:style>
+            <a:lnRef idx="1">
+              <a:schemeClr val="accent1"/>
+            </a:lnRef>
+            <a:fillRef idx="0">
+              <a:schemeClr val="accent1"/>
+            </a:fillRef>
+            <a:effectRef idx="0">
+              <a:schemeClr val="accent1"/>
+            </a:effectRef>
+            <a:fontRef idx="minor">
+              <a:schemeClr val="tx1"/>
+            </a:fontRef>
+          </p:style>
+        </p:cxnSp>
+        <p:cxnSp>
+          <p:nvCxnSpPr>
+            <p:cNvPr id="111" name="직선 연결선 110"/>
+            <p:cNvCxnSpPr/>
+            <p:nvPr/>
+          </p:nvCxnSpPr>
+          <p:spPr>
+            <a:xfrm flipV="1">
+              <a:off x="5378222" y="3586230"/>
+              <a:ext cx="0" cy="113188"/>
+            </a:xfrm>
+            <a:prstGeom prst="line">
+              <a:avLst/>
+            </a:prstGeom>
+            <a:ln w="12700"/>
+          </p:spPr>
+          <p:style>
+            <a:lnRef idx="1">
+              <a:schemeClr val="accent1"/>
+            </a:lnRef>
+            <a:fillRef idx="0">
+              <a:schemeClr val="accent1"/>
+            </a:fillRef>
+            <a:effectRef idx="0">
+              <a:schemeClr val="accent1"/>
+            </a:effectRef>
+            <a:fontRef idx="minor">
+              <a:schemeClr val="tx1"/>
+            </a:fontRef>
+          </p:style>
+        </p:cxnSp>
+        <p:cxnSp>
+          <p:nvCxnSpPr>
+            <p:cNvPr id="112" name="직선 연결선 111"/>
             <p:cNvCxnSpPr/>
             <p:nvPr/>
           </p:nvCxnSpPr>
@@ -30787,7 +31498,7 @@
   <a:extraClrSchemeLst/>
   <a:extLst>
     <a:ext uri="{05A4C25C-085E-4340-85A3-A5531E510DB2}">
-      <thm15:themeFamily xmlns="" xmlns:thm15="http://schemas.microsoft.com/office/thememl/2012/main" name="Office Theme" id="{62F939B6-93AF-4DB8-9C6B-D6C7DFDC589F}" vid="{4A3C46E8-61CC-4603-A589-7422A47A8E4A}"/>
+      <thm15:themeFamily xmlns:thm15="http://schemas.microsoft.com/office/thememl/2012/main" xmlns="" name="Office Theme" id="{62F939B6-93AF-4DB8-9C6B-D6C7DFDC589F}" vid="{4A3C46E8-61CC-4603-A589-7422A47A8E4A}"/>
     </a:ext>
   </a:extLst>
 </a:theme>

</xml_diff>

<commit_message>
chore : change upload btn resource
</commit_message>
<xml_diff>
--- a/other/document/DB 설계 및 화면설계 리소스.pptx
+++ b/other/document/DB 설계 및 화면설계 리소스.pptx
@@ -121,7 +121,7 @@
   </p:defaultTextStyle>
   <p:extLst>
     <p:ext uri="{EFAFB233-063F-42B5-8137-9DF3F51BA10A}">
-      <p15:sldGuideLst xmlns:p15="http://schemas.microsoft.com/office/powerpoint/2012/main" xmlns="">
+      <p15:sldGuideLst xmlns="" xmlns:p15="http://schemas.microsoft.com/office/powerpoint/2012/main">
         <p15:guide id="1" orient="horz" pos="2160" userDrawn="1">
           <p15:clr>
             <a:srgbClr val="A4A3A4"/>
@@ -221,7 +221,7 @@
             <a:fld id="{A33333DA-1850-4149-A852-9DE0883580C0}" type="datetimeFigureOut">
               <a:rPr lang="ko-KR" altLang="en-US" smtClean="0"/>
               <a:pPr/>
-              <a:t>2022-06-23</a:t>
+              <a:t>2022-06-25</a:t>
             </a:fld>
             <a:endParaRPr lang="ko-KR" altLang="en-US"/>
           </a:p>
@@ -437,7 +437,7 @@
             <a:fld id="{51E7485C-BA9C-437D-8914-F26087319FD8}" type="datetimeFigureOut">
               <a:rPr lang="ko-KR" altLang="en-US" smtClean="0"/>
               <a:pPr/>
-              <a:t>2022-06-23</a:t>
+              <a:t>2022-06-25</a:t>
             </a:fld>
             <a:endParaRPr lang="ko-KR" altLang="en-US"/>
           </a:p>
@@ -609,7 +609,7 @@
             <a:fld id="{51E7485C-BA9C-437D-8914-F26087319FD8}" type="datetimeFigureOut">
               <a:rPr lang="ko-KR" altLang="en-US" smtClean="0"/>
               <a:pPr/>
-              <a:t>2022-06-23</a:t>
+              <a:t>2022-06-25</a:t>
             </a:fld>
             <a:endParaRPr lang="ko-KR" altLang="en-US"/>
           </a:p>
@@ -791,7 +791,7 @@
             <a:fld id="{51E7485C-BA9C-437D-8914-F26087319FD8}" type="datetimeFigureOut">
               <a:rPr lang="ko-KR" altLang="en-US" smtClean="0"/>
               <a:pPr/>
-              <a:t>2022-06-23</a:t>
+              <a:t>2022-06-25</a:t>
             </a:fld>
             <a:endParaRPr lang="ko-KR" altLang="en-US"/>
           </a:p>
@@ -963,7 +963,7 @@
             <a:fld id="{51E7485C-BA9C-437D-8914-F26087319FD8}" type="datetimeFigureOut">
               <a:rPr lang="ko-KR" altLang="en-US" smtClean="0"/>
               <a:pPr/>
-              <a:t>2022-06-23</a:t>
+              <a:t>2022-06-25</a:t>
             </a:fld>
             <a:endParaRPr lang="ko-KR" altLang="en-US"/>
           </a:p>
@@ -1211,7 +1211,7 @@
             <a:fld id="{51E7485C-BA9C-437D-8914-F26087319FD8}" type="datetimeFigureOut">
               <a:rPr lang="ko-KR" altLang="en-US" smtClean="0"/>
               <a:pPr/>
-              <a:t>2022-06-23</a:t>
+              <a:t>2022-06-25</a:t>
             </a:fld>
             <a:endParaRPr lang="ko-KR" altLang="en-US"/>
           </a:p>
@@ -1445,7 +1445,7 @@
             <a:fld id="{51E7485C-BA9C-437D-8914-F26087319FD8}" type="datetimeFigureOut">
               <a:rPr lang="ko-KR" altLang="en-US" smtClean="0"/>
               <a:pPr/>
-              <a:t>2022-06-23</a:t>
+              <a:t>2022-06-25</a:t>
             </a:fld>
             <a:endParaRPr lang="ko-KR" altLang="en-US"/>
           </a:p>
@@ -1814,7 +1814,7 @@
             <a:fld id="{51E7485C-BA9C-437D-8914-F26087319FD8}" type="datetimeFigureOut">
               <a:rPr lang="ko-KR" altLang="en-US" smtClean="0"/>
               <a:pPr/>
-              <a:t>2022-06-23</a:t>
+              <a:t>2022-06-25</a:t>
             </a:fld>
             <a:endParaRPr lang="ko-KR" altLang="en-US"/>
           </a:p>
@@ -1934,7 +1934,7 @@
             <a:fld id="{51E7485C-BA9C-437D-8914-F26087319FD8}" type="datetimeFigureOut">
               <a:rPr lang="ko-KR" altLang="en-US" smtClean="0"/>
               <a:pPr/>
-              <a:t>2022-06-23</a:t>
+              <a:t>2022-06-25</a:t>
             </a:fld>
             <a:endParaRPr lang="ko-KR" altLang="en-US"/>
           </a:p>
@@ -2031,7 +2031,7 @@
             <a:fld id="{51E7485C-BA9C-437D-8914-F26087319FD8}" type="datetimeFigureOut">
               <a:rPr lang="ko-KR" altLang="en-US" smtClean="0"/>
               <a:pPr/>
-              <a:t>2022-06-23</a:t>
+              <a:t>2022-06-25</a:t>
             </a:fld>
             <a:endParaRPr lang="ko-KR" altLang="en-US"/>
           </a:p>
@@ -2310,7 +2310,7 @@
             <a:fld id="{51E7485C-BA9C-437D-8914-F26087319FD8}" type="datetimeFigureOut">
               <a:rPr lang="ko-KR" altLang="en-US" smtClean="0"/>
               <a:pPr/>
-              <a:t>2022-06-23</a:t>
+              <a:t>2022-06-25</a:t>
             </a:fld>
             <a:endParaRPr lang="ko-KR" altLang="en-US"/>
           </a:p>
@@ -2565,7 +2565,7 @@
             <a:fld id="{51E7485C-BA9C-437D-8914-F26087319FD8}" type="datetimeFigureOut">
               <a:rPr lang="ko-KR" altLang="en-US" smtClean="0"/>
               <a:pPr/>
-              <a:t>2022-06-23</a:t>
+              <a:t>2022-06-25</a:t>
             </a:fld>
             <a:endParaRPr lang="ko-KR" altLang="en-US"/>
           </a:p>
@@ -2783,7 +2783,7 @@
             <a:fld id="{51E7485C-BA9C-437D-8914-F26087319FD8}" type="datetimeFigureOut">
               <a:rPr lang="ko-KR" altLang="en-US" smtClean="0"/>
               <a:pPr/>
-              <a:t>2022-06-23</a:t>
+              <a:t>2022-06-25</a:t>
             </a:fld>
             <a:endParaRPr lang="ko-KR" altLang="en-US"/>
           </a:p>
@@ -5972,6 +5972,65 @@
           <a:p>
             <a:pPr algn="ctr"/>
             <a:endParaRPr lang="ko-KR" altLang="en-US" sz="2000">
+              <a:latin typeface="HY동녘M" panose="02030600000101010101" pitchFamily="18" charset="-127"/>
+              <a:ea typeface="HY동녘M" panose="02030600000101010101" pitchFamily="18" charset="-127"/>
+            </a:endParaRPr>
+          </a:p>
+        </p:txBody>
+      </p:sp>
+      <p:sp>
+        <p:nvSpPr>
+          <p:cNvPr id="14" name="직사각형 13"/>
+          <p:cNvSpPr/>
+          <p:nvPr/>
+        </p:nvSpPr>
+        <p:spPr>
+          <a:xfrm>
+            <a:off x="3319660" y="4691458"/>
+            <a:ext cx="3571593" cy="950277"/>
+          </a:xfrm>
+          <a:prstGeom prst="rect">
+            <a:avLst/>
+          </a:prstGeom>
+          <a:solidFill>
+            <a:schemeClr val="accent3">
+              <a:lumMod val="60000"/>
+              <a:lumOff val="40000"/>
+            </a:schemeClr>
+          </a:solidFill>
+          <a:ln>
+            <a:noFill/>
+          </a:ln>
+        </p:spPr>
+        <p:style>
+          <a:lnRef idx="2">
+            <a:schemeClr val="accent1">
+              <a:shade val="50000"/>
+            </a:schemeClr>
+          </a:lnRef>
+          <a:fillRef idx="1">
+            <a:schemeClr val="accent1"/>
+          </a:fillRef>
+          <a:effectRef idx="0">
+            <a:schemeClr val="accent1"/>
+          </a:effectRef>
+          <a:fontRef idx="minor">
+            <a:schemeClr val="lt1"/>
+          </a:fontRef>
+        </p:style>
+        <p:txBody>
+          <a:bodyPr rtlCol="0" anchor="ctr"/>
+          <a:lstStyle/>
+          <a:p>
+            <a:pPr algn="ctr"/>
+            <a:r>
+              <a:rPr lang="ko-KR" altLang="en-US" sz="3200" smtClean="0">
+                <a:latin typeface="HY동녘M" panose="02030600000101010101" pitchFamily="18" charset="-127"/>
+                <a:ea typeface="HY동녘M" panose="02030600000101010101" pitchFamily="18" charset="-127"/>
+              </a:rPr>
+              <a:t>새 레시피 업로드</a:t>
+            </a:r>
+            <a:endParaRPr lang="ko-KR" altLang="en-US" sz="3200">
               <a:latin typeface="HY동녘M" panose="02030600000101010101" pitchFamily="18" charset="-127"/>
               <a:ea typeface="HY동녘M" panose="02030600000101010101" pitchFamily="18" charset="-127"/>
             </a:endParaRPr>
@@ -14856,7 +14915,7 @@
         </p:nvGraphicFramePr>
         <p:xfrm>
           <a:off x="7765985" y="2171142"/>
-          <a:ext cx="1515229" cy="1004812"/>
+          <a:ext cx="1515229" cy="1031418"/>
         </p:xfrm>
         <a:graphic>
           <a:graphicData uri="http://schemas.openxmlformats.org/drawingml/2006/table">
@@ -14892,13 +14951,6 @@
                         </a:rPr>
                         <a:t>RECEIPE_IMG</a:t>
                       </a:r>
-                      <a:endParaRPr lang="en-US" altLang="ko-KR" sz="800" b="1" kern="0" spc="0" smtClean="0">
-                        <a:solidFill>
-                          <a:srgbClr val="315F97"/>
-                        </a:solidFill>
-                        <a:effectLst/>
-                        <a:ea typeface="맑은 고딕"/>
-                      </a:endParaRPr>
                     </a:p>
                   </a:txBody>
                   <a:tcPr marL="64933" marR="64933" marT="17952" marB="17952" anchor="ctr">
@@ -14974,19 +15026,7 @@
                           <a:ea typeface="+mn-ea"/>
                           <a:cs typeface="+mn-cs"/>
                         </a:rPr>
-                        <a:t>RECEIPE_IMG_ID </a:t>
-                      </a:r>
-                      <a:r>
-                        <a:rPr lang="en-US" altLang="ko-KR" sz="600" b="1" kern="1200" smtClean="0">
-                          <a:solidFill>
-                            <a:schemeClr val="tx1"/>
-                          </a:solidFill>
-                          <a:effectLst/>
-                          <a:latin typeface="+mn-lt"/>
-                          <a:ea typeface="+mn-ea"/>
-                          <a:cs typeface="+mn-cs"/>
-                        </a:rPr>
-                        <a:t>: BIGINT (PK)</a:t>
+                        <a:t>RECEIPE_IMG_ID : BIGINT (PK)</a:t>
                       </a:r>
                       <a:endParaRPr lang="en-US" altLang="ko-KR" sz="600" kern="1200" baseline="0" smtClean="0">
                         <a:solidFill>
@@ -15010,19 +15050,7 @@
                           <a:ea typeface="+mn-ea"/>
                           <a:cs typeface="+mn-cs"/>
                         </a:rPr>
-                        <a:t>RECEIPE_ID </a:t>
-                      </a:r>
-                      <a:r>
-                        <a:rPr lang="en-US" altLang="ko-KR" sz="600" b="1" kern="1200" baseline="0" smtClean="0">
-                          <a:solidFill>
-                            <a:schemeClr val="tx1"/>
-                          </a:solidFill>
-                          <a:effectLst/>
-                          <a:latin typeface="+mn-lt"/>
-                          <a:ea typeface="+mn-ea"/>
-                          <a:cs typeface="+mn-cs"/>
-                        </a:rPr>
-                        <a:t>: BIGINT (FK)</a:t>
+                        <a:t>RECEIPE_ID : BIGINT (FK)</a:t>
                       </a:r>
                     </a:p>
                     <a:p>
@@ -15049,31 +15077,7 @@
                           <a:ea typeface="+mn-ea"/>
                           <a:cs typeface="+mn-cs"/>
                         </a:rPr>
-                        <a:t>: </a:t>
-                      </a:r>
-                      <a:r>
-                        <a:rPr lang="en-US" altLang="ko-KR" sz="600" kern="1200" baseline="0" smtClean="0">
-                          <a:solidFill>
-                            <a:schemeClr val="tx1"/>
-                          </a:solidFill>
-                          <a:effectLst/>
-                          <a:latin typeface="+mn-lt"/>
-                          <a:ea typeface="+mn-ea"/>
-                          <a:cs typeface="+mn-cs"/>
-                        </a:rPr>
-                        <a:t>VARCHAR(255</a:t>
-                      </a:r>
-                      <a:r>
-                        <a:rPr lang="en-US" altLang="ko-KR" sz="600" kern="1200" baseline="0" smtClean="0">
-                          <a:solidFill>
-                            <a:schemeClr val="tx1"/>
-                          </a:solidFill>
-                          <a:effectLst/>
-                          <a:latin typeface="+mn-lt"/>
-                          <a:ea typeface="+mn-ea"/>
-                          <a:cs typeface="+mn-cs"/>
-                        </a:rPr>
-                        <a:t>)</a:t>
+                        <a:t>: VARCHAR(255)</a:t>
                       </a:r>
                     </a:p>
                     <a:p>
@@ -31498,7 +31502,7 @@
   <a:extraClrSchemeLst/>
   <a:extLst>
     <a:ext uri="{05A4C25C-085E-4340-85A3-A5531E510DB2}">
-      <thm15:themeFamily xmlns:thm15="http://schemas.microsoft.com/office/thememl/2012/main" xmlns="" name="Office Theme" id="{62F939B6-93AF-4DB8-9C6B-D6C7DFDC589F}" vid="{4A3C46E8-61CC-4603-A589-7422A47A8E4A}"/>
+      <thm15:themeFamily xmlns="" xmlns:thm15="http://schemas.microsoft.com/office/thememl/2012/main" name="Office Theme" id="{62F939B6-93AF-4DB8-9C6B-D6C7DFDC589F}" vid="{4A3C46E8-61CC-4603-A589-7422A47A8E4A}"/>
     </a:ext>
   </a:extLst>
 </a:theme>

</xml_diff>

<commit_message>
chore : modify db key diagram
</commit_message>
<xml_diff>
--- a/other/document/DB 설계 및 화면설계 리소스.pptx
+++ b/other/document/DB 설계 및 화면설계 리소스.pptx
@@ -2,7 +2,7 @@
 <file path=ppt/presentation.xml><?xml version="1.0" encoding="utf-8"?>
 <p:presentation xmlns:r="http://schemas.openxmlformats.org/officeDocument/2006/relationships" xmlns:c="http://schemas.openxmlformats.org/drawingml/2006/chart" xmlns:a="http://schemas.openxmlformats.org/drawingml/2006/main" xmlns:dgm="http://schemas.openxmlformats.org/drawingml/2006/diagram" xmlns:dsp="http://schemas.microsoft.com/office/drawing/2008/diagram" xmlns:p="http://schemas.openxmlformats.org/presentationml/2006/main" saveSubsetFonts="1">
   <p:sldMasterIdLst>
-    <p:sldMasterId id="2147483684" r:id="rId1"/>
+    <p:sldMasterId id="2147483692" r:id="rId1"/>
   </p:sldMasterIdLst>
   <p:handoutMasterIdLst>
     <p:handoutMasterId r:id="rId2"/>
@@ -217,7 +217,7 @@
               <a:pPr lvl="0">
                 <a:defRPr/>
               </a:pPr>
-              <a:t>2022-06-30</a:t>
+              <a:t>2022-07-01</a:t>
             </a:fld>
             <a:endParaRPr lang="ko-KR" altLang="en-US"/>
           </a:p>
@@ -9629,8 +9629,8 @@
           <p:nvPr/>
         </p:nvGraphicFramePr>
         <p:xfrm>
-          <a:off x="3253145" y="2869176"/>
-          <a:ext cx="1365490" cy="1367208"/>
+          <a:off x="2614970" y="2878701"/>
+          <a:ext cx="1365490" cy="1557708"/>
         </p:xfrm>
         <a:graphic>
           <a:graphicData uri="http://schemas.openxmlformats.org/drawingml/2006/table">
@@ -9664,12 +9664,13 @@
                           <a:effectLst/>
                           <a:ea typeface="맑은 고딕"/>
                         </a:rPr>
-                        <a:t>USER</a:t>
+                        <a:t>MEMBER</a:t>
                       </a:r>
                       <a:endParaRPr lang="en-US" altLang="ko-KR" sz="800" b="1" kern="0" spc="0">
                         <a:solidFill>
                           <a:srgbClr val="315f97"/>
                         </a:solidFill>
+                        <a:effectLst/>
                         <a:ea typeface="맑은 고딕"/>
                       </a:endParaRPr>
                     </a:p>
@@ -9982,6 +9983,32 @@
                           <a:ea typeface="+mn-ea"/>
                           <a:cs typeface="+mn-cs"/>
                         </a:rPr>
+                        <a:t>ROLE : ENUM(”USER”,”ADMIN”)</a:t>
+                      </a:r>
+                      <a:endParaRPr lang="en-US" altLang="ko-KR" sz="600" kern="1200" baseline="0">
+                        <a:solidFill>
+                          <a:schemeClr val="tx1"/>
+                        </a:solidFill>
+                        <a:effectLst/>
+                        <a:latin typeface="+mn-lt"/>
+                        <a:ea typeface="+mn-ea"/>
+                        <a:cs typeface="+mn-cs"/>
+                      </a:endParaRPr>
+                    </a:p>
+                    <a:p>
+                      <a:pPr algn="l" latinLnBrk="1">
+                        <a:defRPr/>
+                      </a:pPr>
+                      <a:r>
+                        <a:rPr lang="en-US" altLang="ko-KR" sz="600" kern="1200" baseline="0">
+                          <a:solidFill>
+                            <a:schemeClr val="tx1"/>
+                          </a:solidFill>
+                          <a:effectLst/>
+                          <a:latin typeface="+mn-lt"/>
+                          <a:ea typeface="+mn-ea"/>
+                          <a:cs typeface="+mn-cs"/>
+                        </a:rPr>
                         <a:t>ZIPCODE : VARCHAR(255)</a:t>
                       </a:r>
                       <a:r>
@@ -10046,7 +10073,33 @@
                         </a:rPr>
                         <a:t>DATETIME</a:t>
                       </a:r>
-                      <a:endParaRPr lang="en-US" altLang="ko-KR" sz="600" kern="1200">
+                      <a:endParaRPr lang="en-US" altLang="ko-KR" sz="600" kern="1200" baseline="0">
+                        <a:solidFill>
+                          <a:schemeClr val="tx1"/>
+                        </a:solidFill>
+                        <a:effectLst/>
+                        <a:latin typeface="+mn-lt"/>
+                        <a:ea typeface="+mn-ea"/>
+                        <a:cs typeface="+mn-cs"/>
+                      </a:endParaRPr>
+                    </a:p>
+                    <a:p>
+                      <a:pPr algn="l" latinLnBrk="1">
+                        <a:defRPr/>
+                      </a:pPr>
+                      <a:r>
+                        <a:rPr lang="en-US" altLang="ko-KR" sz="600" kern="1200" baseline="0">
+                          <a:solidFill>
+                            <a:schemeClr val="tx1"/>
+                          </a:solidFill>
+                          <a:effectLst/>
+                          <a:latin typeface="+mn-lt"/>
+                          <a:ea typeface="+mn-ea"/>
+                          <a:cs typeface="+mn-cs"/>
+                        </a:rPr>
+                        <a:t>TERMS_AGREE_DATE : DATETIME</a:t>
+                      </a:r>
+                      <a:endParaRPr lang="en-US" altLang="ko-KR" sz="600" kern="1200" baseline="0">
                         <a:solidFill>
                           <a:schemeClr val="tx1"/>
                         </a:solidFill>
@@ -11136,17 +11189,17 @@
           <p:nvPr/>
         </p:nvGraphicFramePr>
         <p:xfrm>
-          <a:off x="7941236" y="1253568"/>
-          <a:ext cx="1073243" cy="690036"/>
+          <a:off x="7941235" y="1405968"/>
+          <a:ext cx="1072841" cy="876157"/>
         </p:xfrm>
         <a:graphic>
           <a:graphicData uri="http://schemas.openxmlformats.org/drawingml/2006/table">
             <a:tbl>
               <a:tblPr firstRow="1" bandRow="1"/>
               <a:tblGrid>
-                <a:gridCol w="1073243"/>
+                <a:gridCol w="1072841"/>
               </a:tblGrid>
-              <a:tr h="126618">
+              <a:tr h="250776">
                 <a:tc>
                   <a:txBody>
                     <a:bodyPr vert="horz" lIns="64933" tIns="17952" rIns="64933" bIns="17952" anchor="ctr" anchorCtr="0"/>
@@ -11213,7 +11266,7 @@
                   </a:tcPr>
                 </a:tc>
               </a:tr>
-              <a:tr h="454107">
+              <a:tr h="625381">
                 <a:tc>
                   <a:txBody>
                     <a:bodyPr vert="horz" lIns="64933" tIns="17952" rIns="64933" bIns="17952" anchor="ctr" anchorCtr="0"/>
@@ -11333,6 +11386,34 @@
                         <a:cs typeface="+mn-cs"/>
                       </a:endParaRPr>
                     </a:p>
+                    <a:p>
+                      <a:pPr algn="l" latinLnBrk="1">
+                        <a:defRPr/>
+                      </a:pPr>
+                      <a:endParaRPr lang="en-US" altLang="ko-KR" sz="600" kern="1200" baseline="0">
+                        <a:solidFill>
+                          <a:schemeClr val="tx1"/>
+                        </a:solidFill>
+                        <a:effectLst/>
+                        <a:latin typeface="+mn-lt"/>
+                        <a:ea typeface="+mn-ea"/>
+                        <a:cs typeface="+mn-cs"/>
+                      </a:endParaRPr>
+                    </a:p>
+                    <a:p>
+                      <a:pPr algn="l" latinLnBrk="1">
+                        <a:defRPr/>
+                      </a:pPr>
+                      <a:endParaRPr lang="en-US" altLang="ko-KR" sz="600" kern="1200" baseline="0">
+                        <a:solidFill>
+                          <a:schemeClr val="tx1"/>
+                        </a:solidFill>
+                        <a:effectLst/>
+                        <a:latin typeface="+mn-lt"/>
+                        <a:ea typeface="+mn-ea"/>
+                        <a:cs typeface="+mn-cs"/>
+                      </a:endParaRPr>
+                    </a:p>
                   </a:txBody>
                   <a:tcPr marL="64933" marR="64933" marT="17952" marB="17952" anchor="ctr">
                     <a:lnL w="3556" cap="flat" cmpd="sng" algn="ctr">
@@ -11379,8 +11460,8 @@
           <p:nvPr/>
         </p:nvGraphicFramePr>
         <p:xfrm>
-          <a:off x="5522841" y="2171142"/>
-          <a:ext cx="1515229" cy="1036371"/>
+          <a:off x="4884666" y="2031930"/>
+          <a:ext cx="1515229" cy="1181991"/>
         </p:xfrm>
         <a:graphic>
           <a:graphicData uri="http://schemas.openxmlformats.org/drawingml/2006/table">
@@ -11389,7 +11470,7 @@
               <a:tblGrid>
                 <a:gridCol w="1515229"/>
               </a:tblGrid>
-              <a:tr h="126618">
+              <a:tr h="274029">
                 <a:tc>
                   <a:txBody>
                     <a:bodyPr vert="horz" lIns="64933" tIns="17952" rIns="64933" bIns="17952" anchor="ctr" anchorCtr="0"/>
@@ -11456,7 +11537,7 @@
                   </a:tcPr>
                 </a:tc>
               </a:tr>
-              <a:tr h="800442">
+              <a:tr h="907962">
                 <a:tc>
                   <a:txBody>
                     <a:bodyPr vert="horz" lIns="64933" tIns="17952" rIns="64933" bIns="17952" anchor="ctr" anchorCtr="0"/>
@@ -11810,7 +11891,7 @@
           <p:nvPr/>
         </p:nvGraphicFramePr>
         <p:xfrm>
-          <a:off x="5231853" y="3680720"/>
+          <a:off x="4593678" y="3680720"/>
           <a:ext cx="1182430" cy="854167"/>
         </p:xfrm>
         <a:graphic>
@@ -12158,7 +12239,7 @@
         </p:nvGrpSpPr>
         <p:grpSpPr>
           <a:xfrm rot="0">
-            <a:off x="3849901" y="1983659"/>
+            <a:off x="3668926" y="1983659"/>
             <a:ext cx="177800" cy="900667"/>
             <a:chOff x="4368847" y="1974134"/>
             <a:chExt cx="177800" cy="900667"/>
@@ -13052,7 +13133,7 @@
         </p:nvGrpSpPr>
         <p:grpSpPr>
           <a:xfrm rot="16200000">
-            <a:off x="4987415" y="2590250"/>
+            <a:off x="4349240" y="2590250"/>
             <a:ext cx="177800" cy="900667"/>
             <a:chOff x="5281050" y="3021012"/>
             <a:chExt cx="177800" cy="900667"/>
@@ -13634,7 +13715,7 @@
           <p:nvPr/>
         </p:nvGraphicFramePr>
         <p:xfrm>
-          <a:off x="9896620" y="2856245"/>
+          <a:off x="10096645" y="2856245"/>
           <a:ext cx="1242524" cy="621809"/>
         </p:xfrm>
         <a:graphic>
@@ -14106,7 +14187,7 @@
         </p:nvGrpSpPr>
         <p:grpSpPr>
           <a:xfrm rot="16200000">
-            <a:off x="4836287" y="3568625"/>
+            <a:off x="4198112" y="3568625"/>
             <a:ext cx="186690" cy="614917"/>
             <a:chOff x="5281050" y="3021012"/>
             <a:chExt cx="186690" cy="614917"/>
@@ -14361,300 +14442,6 @@
           </p:style>
         </p:cxnSp>
       </p:grpSp>
-      <p:grpSp>
-        <p:nvGrpSpPr>
-          <p:cNvPr id="229" name="그룹 228"/>
-          <p:cNvGrpSpPr/>
-          <p:nvPr/>
-        </p:nvGrpSpPr>
-        <p:grpSpPr>
-          <a:xfrm rot="0">
-            <a:off x="5735699" y="3210464"/>
-            <a:ext cx="186690" cy="470256"/>
-            <a:chOff x="5281050" y="3077606"/>
-            <a:chExt cx="186690" cy="470256"/>
-          </a:xfrm>
-        </p:grpSpPr>
-        <p:cxnSp>
-          <p:nvCxnSpPr>
-            <p:cNvPr id="230" name="직선 연결선 229"/>
-            <p:cNvCxnSpPr/>
-            <p:nvPr/>
-          </p:nvCxnSpPr>
-          <p:spPr>
-            <a:xfrm flipV="1">
-              <a:off x="5378222" y="3077606"/>
-              <a:ext cx="0" cy="56594"/>
-            </a:xfrm>
-            <a:prstGeom prst="line">
-              <a:avLst/>
-            </a:prstGeom>
-            <a:ln w="12700"/>
-          </p:spPr>
-          <p:style>
-            <a:lnRef idx="1">
-              <a:schemeClr val="accent1"/>
-            </a:lnRef>
-            <a:fillRef idx="0">
-              <a:schemeClr val="accent1"/>
-            </a:fillRef>
-            <a:effectRef idx="0">
-              <a:schemeClr val="accent1"/>
-            </a:effectRef>
-            <a:fontRef idx="minor">
-              <a:schemeClr val="tx1"/>
-            </a:fontRef>
-          </p:style>
-        </p:cxnSp>
-        <p:cxnSp>
-          <p:nvCxnSpPr>
-            <p:cNvPr id="231" name="직선 연결선 230"/>
-            <p:cNvCxnSpPr/>
-            <p:nvPr/>
-          </p:nvCxnSpPr>
-          <p:spPr>
-            <a:xfrm flipV="1">
-              <a:off x="5378222" y="3160553"/>
-              <a:ext cx="0" cy="56594"/>
-            </a:xfrm>
-            <a:prstGeom prst="line">
-              <a:avLst/>
-            </a:prstGeom>
-            <a:ln w="12700"/>
-          </p:spPr>
-          <p:style>
-            <a:lnRef idx="1">
-              <a:schemeClr val="accent1"/>
-            </a:lnRef>
-            <a:fillRef idx="0">
-              <a:schemeClr val="accent1"/>
-            </a:fillRef>
-            <a:effectRef idx="0">
-              <a:schemeClr val="accent1"/>
-            </a:effectRef>
-            <a:fontRef idx="minor">
-              <a:schemeClr val="tx1"/>
-            </a:fontRef>
-          </p:style>
-        </p:cxnSp>
-        <p:cxnSp>
-          <p:nvCxnSpPr>
-            <p:cNvPr id="232" name="직선 연결선 231"/>
-            <p:cNvCxnSpPr/>
-            <p:nvPr/>
-          </p:nvCxnSpPr>
-          <p:spPr>
-            <a:xfrm flipV="1">
-              <a:off x="5378222" y="3256693"/>
-              <a:ext cx="0" cy="56594"/>
-            </a:xfrm>
-            <a:prstGeom prst="line">
-              <a:avLst/>
-            </a:prstGeom>
-            <a:ln w="12700"/>
-          </p:spPr>
-          <p:style>
-            <a:lnRef idx="1">
-              <a:schemeClr val="accent1"/>
-            </a:lnRef>
-            <a:fillRef idx="0">
-              <a:schemeClr val="accent1"/>
-            </a:fillRef>
-            <a:effectRef idx="0">
-              <a:schemeClr val="accent1"/>
-            </a:effectRef>
-            <a:fontRef idx="minor">
-              <a:schemeClr val="tx1"/>
-            </a:fontRef>
-          </p:style>
-        </p:cxnSp>
-        <p:cxnSp>
-          <p:nvCxnSpPr>
-            <p:cNvPr id="234" name="직선 연결선 233"/>
-            <p:cNvCxnSpPr/>
-            <p:nvPr/>
-          </p:nvCxnSpPr>
-          <p:spPr>
-            <a:xfrm flipV="1">
-              <a:off x="5378222" y="3434674"/>
-              <a:ext cx="0" cy="113188"/>
-            </a:xfrm>
-            <a:prstGeom prst="line">
-              <a:avLst/>
-            </a:prstGeom>
-            <a:ln w="12700"/>
-          </p:spPr>
-          <p:style>
-            <a:lnRef idx="1">
-              <a:schemeClr val="accent1"/>
-            </a:lnRef>
-            <a:fillRef idx="0">
-              <a:schemeClr val="accent1"/>
-            </a:fillRef>
-            <a:effectRef idx="0">
-              <a:schemeClr val="accent1"/>
-            </a:effectRef>
-            <a:fontRef idx="minor">
-              <a:schemeClr val="tx1"/>
-            </a:fontRef>
-          </p:style>
-        </p:cxnSp>
-        <p:cxnSp>
-          <p:nvCxnSpPr>
-            <p:cNvPr id="235" name="직선 연결선 234"/>
-            <p:cNvCxnSpPr/>
-            <p:nvPr/>
-          </p:nvCxnSpPr>
-          <p:spPr>
-            <a:xfrm rot="16200000" flipV="1">
-              <a:off x="5364252" y="3447683"/>
-              <a:ext cx="107950" cy="80010"/>
-            </a:xfrm>
-            <a:prstGeom prst="line">
-              <a:avLst/>
-            </a:prstGeom>
-            <a:ln w="12700"/>
-          </p:spPr>
-          <p:style>
-            <a:lnRef idx="1">
-              <a:schemeClr val="accent1"/>
-            </a:lnRef>
-            <a:fillRef idx="0">
-              <a:schemeClr val="accent1"/>
-            </a:fillRef>
-            <a:effectRef idx="0">
-              <a:schemeClr val="accent1"/>
-            </a:effectRef>
-            <a:fontRef idx="minor">
-              <a:schemeClr val="tx1"/>
-            </a:fontRef>
-          </p:style>
-        </p:cxnSp>
-        <p:cxnSp>
-          <p:nvCxnSpPr>
-            <p:cNvPr id="236" name="직선 연결선 235"/>
-            <p:cNvCxnSpPr/>
-            <p:nvPr/>
-          </p:nvCxnSpPr>
-          <p:spPr>
-            <a:xfrm rot="16200000">
-              <a:off x="5275970" y="3448643"/>
-              <a:ext cx="107950" cy="80010"/>
-            </a:xfrm>
-            <a:prstGeom prst="line">
-              <a:avLst/>
-            </a:prstGeom>
-            <a:ln w="12700"/>
-          </p:spPr>
-          <p:style>
-            <a:lnRef idx="1">
-              <a:schemeClr val="accent1"/>
-            </a:lnRef>
-            <a:fillRef idx="0">
-              <a:schemeClr val="accent1"/>
-            </a:fillRef>
-            <a:effectRef idx="0">
-              <a:schemeClr val="accent1"/>
-            </a:effectRef>
-            <a:fontRef idx="minor">
-              <a:schemeClr val="tx1"/>
-            </a:fontRef>
-          </p:style>
-        </p:cxnSp>
-        <p:cxnSp>
-          <p:nvCxnSpPr>
-            <p:cNvPr id="237" name="직선 연결선 236"/>
-            <p:cNvCxnSpPr/>
-            <p:nvPr/>
-          </p:nvCxnSpPr>
-          <p:spPr>
-            <a:xfrm rot="16200000" flipV="1">
-              <a:off x="5378840" y="3345774"/>
-              <a:ext cx="0" cy="177800"/>
-            </a:xfrm>
-            <a:prstGeom prst="line">
-              <a:avLst/>
-            </a:prstGeom>
-            <a:ln w="12700"/>
-          </p:spPr>
-          <p:style>
-            <a:lnRef idx="1">
-              <a:schemeClr val="accent1"/>
-            </a:lnRef>
-            <a:fillRef idx="0">
-              <a:schemeClr val="accent1"/>
-            </a:fillRef>
-            <a:effectRef idx="0">
-              <a:schemeClr val="accent1"/>
-            </a:effectRef>
-            <a:fontRef idx="minor">
-              <a:schemeClr val="tx1"/>
-            </a:fontRef>
-          </p:style>
-        </p:cxnSp>
-        <p:cxnSp>
-          <p:nvCxnSpPr>
-            <p:cNvPr id="238" name="직선 연결선 237"/>
-            <p:cNvCxnSpPr/>
-            <p:nvPr/>
-          </p:nvCxnSpPr>
-          <p:spPr>
-            <a:xfrm flipV="1">
-              <a:off x="5378222" y="3350010"/>
-              <a:ext cx="0" cy="56594"/>
-            </a:xfrm>
-            <a:prstGeom prst="line">
-              <a:avLst/>
-            </a:prstGeom>
-            <a:ln w="12700"/>
-          </p:spPr>
-          <p:style>
-            <a:lnRef idx="1">
-              <a:schemeClr val="accent1"/>
-            </a:lnRef>
-            <a:fillRef idx="0">
-              <a:schemeClr val="accent1"/>
-            </a:fillRef>
-            <a:effectRef idx="0">
-              <a:schemeClr val="accent1"/>
-            </a:effectRef>
-            <a:fontRef idx="minor">
-              <a:schemeClr val="tx1"/>
-            </a:fontRef>
-          </p:style>
-        </p:cxnSp>
-        <p:cxnSp>
-          <p:nvCxnSpPr>
-            <p:cNvPr id="239" name="직선 연결선 238"/>
-            <p:cNvCxnSpPr/>
-            <p:nvPr/>
-          </p:nvCxnSpPr>
-          <p:spPr>
-            <a:xfrm rot="16200000" flipV="1">
-              <a:off x="5369950" y="3045300"/>
-              <a:ext cx="0" cy="177800"/>
-            </a:xfrm>
-            <a:prstGeom prst="line">
-              <a:avLst/>
-            </a:prstGeom>
-            <a:ln w="12700"/>
-          </p:spPr>
-          <p:style>
-            <a:lnRef idx="1">
-              <a:schemeClr val="accent1"/>
-            </a:lnRef>
-            <a:fillRef idx="0">
-              <a:schemeClr val="accent1"/>
-            </a:fillRef>
-            <a:effectRef idx="0">
-              <a:schemeClr val="accent1"/>
-            </a:effectRef>
-            <a:fontRef idx="minor">
-              <a:schemeClr val="tx1"/>
-            </a:fontRef>
-          </p:style>
-        </p:cxnSp>
-      </p:grpSp>
       <p:graphicFrame>
         <p:nvGraphicFramePr>
           <p:cNvPr id="101" name="표 100"/>
@@ -14664,8 +14451,8 @@
           <p:nvPr/>
         </p:nvGraphicFramePr>
         <p:xfrm>
-          <a:off x="6482460" y="3681534"/>
-          <a:ext cx="1345896" cy="850683"/>
+          <a:off x="5844285" y="3681534"/>
+          <a:ext cx="1345896" cy="850682"/>
         </p:xfrm>
         <a:graphic>
           <a:graphicData uri="http://schemas.openxmlformats.org/drawingml/2006/table">
@@ -15010,404 +14797,6 @@
           </a:graphicData>
         </a:graphic>
       </p:graphicFrame>
-      <p:graphicFrame>
-        <p:nvGraphicFramePr>
-          <p:cNvPr id="240" name="표 1"/>
-          <p:cNvGraphicFramePr>
-            <a:graphicFrameLocks noGrp="1"/>
-          </p:cNvGraphicFramePr>
-          <p:nvPr/>
-        </p:nvGraphicFramePr>
-        <p:xfrm>
-          <a:off x="7897882" y="2846332"/>
-          <a:ext cx="1365490" cy="1165336"/>
-        </p:xfrm>
-        <a:graphic>
-          <a:graphicData uri="http://schemas.openxmlformats.org/drawingml/2006/table">
-            <a:tbl>
-              <a:tblPr firstRow="1" bandRow="1"/>
-              <a:tblGrid>
-                <a:gridCol w="1365490"/>
-              </a:tblGrid>
-              <a:tr h="221156">
-                <a:tc>
-                  <a:txBody>
-                    <a:bodyPr vert="horz" lIns="64933" tIns="17952" rIns="64933" bIns="17952" anchor="ctr" anchorCtr="0"/>
-                    <a:p>
-                      <a:pPr marL="0" marR="0" indent="0" algn="ctr" latinLnBrk="0">
-                        <a:lnSpc>
-                          <a:spcPct val="160000"/>
-                        </a:lnSpc>
-                        <a:spcBef>
-                          <a:spcPts val="0"/>
-                        </a:spcBef>
-                        <a:spcAft>
-                          <a:spcPts val="0"/>
-                        </a:spcAft>
-                        <a:defRPr/>
-                      </a:pPr>
-                      <a:r>
-                        <a:rPr lang="en-US" altLang="ko-KR" sz="800" b="1" kern="0" spc="0">
-                          <a:solidFill>
-                            <a:srgbClr val="315f97"/>
-                          </a:solidFill>
-                          <a:effectLst/>
-                          <a:ea typeface="맑은 고딕"/>
-                        </a:rPr>
-                        <a:t>ADMIN</a:t>
-                      </a:r>
-                      <a:endParaRPr lang="en-US" altLang="ko-KR" sz="800" b="1" kern="0" spc="0">
-                        <a:solidFill>
-                          <a:srgbClr val="315f97"/>
-                        </a:solidFill>
-                        <a:effectLst/>
-                        <a:ea typeface="맑은 고딕"/>
-                      </a:endParaRPr>
-                    </a:p>
-                  </a:txBody>
-                  <a:tcPr marL="64933" marR="64933" marT="17952" marB="17952" anchor="ctr">
-                    <a:lnL w="3556" cap="flat" cmpd="sng" algn="ctr">
-                      <a:solidFill>
-                        <a:srgbClr val="000000"/>
-                      </a:solidFill>
-                      <a:prstDash val="solid"/>
-                      <a:round/>
-                    </a:lnL>
-                    <a:lnR w="3556" cap="flat" cmpd="sng" algn="ctr">
-                      <a:solidFill>
-                        <a:srgbClr val="000000"/>
-                      </a:solidFill>
-                      <a:prstDash val="solid"/>
-                      <a:round/>
-                    </a:lnR>
-                    <a:lnT w="3556" cap="flat" cmpd="sng" algn="ctr">
-                      <a:solidFill>
-                        <a:srgbClr val="000000"/>
-                      </a:solidFill>
-                      <a:prstDash val="solid"/>
-                      <a:round/>
-                    </a:lnT>
-                    <a:lnB w="3556" cap="flat" cmpd="sng" algn="ctr">
-                      <a:solidFill>
-                        <a:srgbClr val="000000"/>
-                      </a:solidFill>
-                      <a:prstDash val="solid"/>
-                      <a:round/>
-                    </a:lnB>
-                  </a:tcPr>
-                </a:tc>
-              </a:tr>
-              <a:tr h="929407">
-                <a:tc>
-                  <a:txBody>
-                    <a:bodyPr vert="horz" lIns="64933" tIns="17952" rIns="64933" bIns="17952" anchor="ctr" anchorCtr="0"/>
-                    <a:p>
-                      <a:pPr marL="0" marR="0" indent="0" algn="l" defTabSz="914400" rtl="0" eaLnBrk="1" latinLnBrk="1" hangingPunct="1">
-                        <a:lnSpc>
-                          <a:spcPct val="100000"/>
-                        </a:lnSpc>
-                        <a:spcBef>
-                          <a:spcPts val="0"/>
-                        </a:spcBef>
-                        <a:spcAft>
-                          <a:spcPts val="0"/>
-                        </a:spcAft>
-                        <a:buClrTx/>
-                        <a:buFontTx/>
-                        <a:buNone/>
-                        <a:defRPr/>
-                      </a:pPr>
-                      <a:r>
-                        <a:rPr lang="en-US" altLang="ko-KR" sz="600" b="1" kern="1200">
-                          <a:solidFill>
-                            <a:schemeClr val="tx1"/>
-                          </a:solidFill>
-                          <a:effectLst/>
-                          <a:latin typeface="+mn-lt"/>
-                          <a:ea typeface="+mn-ea"/>
-                          <a:cs typeface="+mn-cs"/>
-                        </a:rPr>
-                        <a:t>ADMIN_ID : BIGINT (PK)</a:t>
-                      </a:r>
-                      <a:endParaRPr lang="en-US" altLang="ko-KR" sz="600" b="1" kern="1200">
-                        <a:solidFill>
-                          <a:schemeClr val="tx1"/>
-                        </a:solidFill>
-                        <a:effectLst/>
-                        <a:latin typeface="+mn-lt"/>
-                        <a:ea typeface="+mn-ea"/>
-                        <a:cs typeface="+mn-cs"/>
-                      </a:endParaRPr>
-                    </a:p>
-                    <a:p>
-                      <a:pPr algn="l" latinLnBrk="1">
-                        <a:defRPr/>
-                      </a:pPr>
-                      <a:r>
-                        <a:rPr lang="en-US" altLang="ko-KR" sz="600" kern="1200" baseline="0">
-                          <a:solidFill>
-                            <a:schemeClr val="tx1"/>
-                          </a:solidFill>
-                          <a:effectLst/>
-                          <a:latin typeface="+mn-lt"/>
-                          <a:ea typeface="+mn-ea"/>
-                          <a:cs typeface="+mn-cs"/>
-                        </a:rPr>
-                        <a:t>EMAIL : VARCHAR(255)</a:t>
-                      </a:r>
-                      <a:endParaRPr lang="en-US" altLang="ko-KR" sz="600" kern="1200" baseline="0">
-                        <a:solidFill>
-                          <a:schemeClr val="tx1"/>
-                        </a:solidFill>
-                        <a:effectLst/>
-                        <a:latin typeface="+mn-lt"/>
-                        <a:ea typeface="+mn-ea"/>
-                        <a:cs typeface="+mn-cs"/>
-                      </a:endParaRPr>
-                    </a:p>
-                    <a:p>
-                      <a:pPr algn="l" latinLnBrk="1">
-                        <a:defRPr/>
-                      </a:pPr>
-                      <a:r>
-                        <a:rPr lang="en-US" altLang="ko-KR" sz="600" kern="1200" baseline="0">
-                          <a:solidFill>
-                            <a:schemeClr val="tx1"/>
-                          </a:solidFill>
-                          <a:effectLst/>
-                          <a:latin typeface="+mn-lt"/>
-                          <a:ea typeface="+mn-ea"/>
-                          <a:cs typeface="+mn-cs"/>
-                        </a:rPr>
-                        <a:t>PASSWORD : VARCHAR(255)</a:t>
-                      </a:r>
-                      <a:endParaRPr lang="en-US" altLang="ko-KR" sz="600" kern="1200" baseline="0">
-                        <a:solidFill>
-                          <a:schemeClr val="tx1"/>
-                        </a:solidFill>
-                        <a:effectLst/>
-                        <a:latin typeface="+mn-lt"/>
-                        <a:ea typeface="+mn-ea"/>
-                        <a:cs typeface="+mn-cs"/>
-                      </a:endParaRPr>
-                    </a:p>
-                    <a:p>
-                      <a:pPr algn="l" latinLnBrk="1">
-                        <a:defRPr/>
-                      </a:pPr>
-                      <a:r>
-                        <a:rPr lang="en-US" altLang="ko-KR" sz="600" kern="1200" baseline="0">
-                          <a:solidFill>
-                            <a:schemeClr val="tx1"/>
-                          </a:solidFill>
-                          <a:effectLst/>
-                          <a:latin typeface="+mn-lt"/>
-                          <a:ea typeface="+mn-ea"/>
-                          <a:cs typeface="+mn-cs"/>
-                        </a:rPr>
-                        <a:t>NICKNAME : VARCHAR(255)</a:t>
-                      </a:r>
-                      <a:endParaRPr lang="en-US" altLang="ko-KR" sz="600" kern="1200" baseline="0">
-                        <a:solidFill>
-                          <a:schemeClr val="tx1"/>
-                        </a:solidFill>
-                        <a:effectLst/>
-                        <a:latin typeface="+mn-lt"/>
-                        <a:ea typeface="+mn-ea"/>
-                        <a:cs typeface="+mn-cs"/>
-                      </a:endParaRPr>
-                    </a:p>
-                    <a:p>
-                      <a:pPr algn="l" latinLnBrk="1">
-                        <a:defRPr/>
-                      </a:pPr>
-                      <a:r>
-                        <a:rPr lang="en-US" altLang="ko-KR" sz="600" kern="1200" baseline="0">
-                          <a:solidFill>
-                            <a:schemeClr val="tx1"/>
-                          </a:solidFill>
-                          <a:effectLst/>
-                          <a:latin typeface="+mn-lt"/>
-                          <a:ea typeface="+mn-ea"/>
-                          <a:cs typeface="+mn-cs"/>
-                        </a:rPr>
-                        <a:t>USERNAME : VARCHAR(255)</a:t>
-                      </a:r>
-                      <a:endParaRPr lang="en-US" altLang="ko-KR" sz="600" kern="1200" baseline="0">
-                        <a:solidFill>
-                          <a:schemeClr val="tx1"/>
-                        </a:solidFill>
-                        <a:effectLst/>
-                        <a:latin typeface="+mn-lt"/>
-                        <a:ea typeface="+mn-ea"/>
-                        <a:cs typeface="+mn-cs"/>
-                      </a:endParaRPr>
-                    </a:p>
-                    <a:p>
-                      <a:pPr algn="l" latinLnBrk="1">
-                        <a:defRPr/>
-                      </a:pPr>
-                      <a:r>
-                        <a:rPr lang="en-US" altLang="ko-KR" sz="600" kern="1200" baseline="0">
-                          <a:solidFill>
-                            <a:schemeClr val="tx1"/>
-                          </a:solidFill>
-                          <a:effectLst/>
-                          <a:latin typeface="+mn-lt"/>
-                          <a:ea typeface="+mn-ea"/>
-                          <a:cs typeface="+mn-cs"/>
-                        </a:rPr>
-                        <a:t>GENDER : ENUM(“MALE”,”FEMALE”)</a:t>
-                      </a:r>
-                      <a:endParaRPr lang="en-US" altLang="ko-KR" sz="600" kern="1200" baseline="0">
-                        <a:solidFill>
-                          <a:schemeClr val="tx1"/>
-                        </a:solidFill>
-                        <a:effectLst/>
-                        <a:latin typeface="+mn-lt"/>
-                        <a:ea typeface="+mn-ea"/>
-                        <a:cs typeface="+mn-cs"/>
-                      </a:endParaRPr>
-                    </a:p>
-                    <a:p>
-                      <a:pPr algn="l" latinLnBrk="1">
-                        <a:defRPr/>
-                      </a:pPr>
-                      <a:r>
-                        <a:rPr lang="en-US" altLang="ko-KR" sz="600" kern="1200" baseline="0">
-                          <a:solidFill>
-                            <a:schemeClr val="tx1"/>
-                          </a:solidFill>
-                          <a:effectLst/>
-                          <a:latin typeface="+mn-lt"/>
-                          <a:ea typeface="+mn-ea"/>
-                          <a:cs typeface="+mn-cs"/>
-                        </a:rPr>
-                        <a:t>BIRTH_DATE : DATETIME</a:t>
-                      </a:r>
-                      <a:endParaRPr lang="en-US" altLang="ko-KR" sz="600" kern="1200" baseline="0">
-                        <a:solidFill>
-                          <a:schemeClr val="tx1"/>
-                        </a:solidFill>
-                        <a:effectLst/>
-                        <a:latin typeface="+mn-lt"/>
-                        <a:ea typeface="+mn-ea"/>
-                        <a:cs typeface="+mn-cs"/>
-                      </a:endParaRPr>
-                    </a:p>
-                    <a:p>
-                      <a:pPr algn="l" latinLnBrk="1">
-                        <a:defRPr/>
-                      </a:pPr>
-                      <a:r>
-                        <a:rPr lang="en-US" altLang="ko-KR" sz="600" kern="1200">
-                          <a:solidFill>
-                            <a:schemeClr val="tx1"/>
-                          </a:solidFill>
-                          <a:effectLst/>
-                          <a:latin typeface="+mn-lt"/>
-                          <a:ea typeface="+mn-ea"/>
-                          <a:cs typeface="+mn-cs"/>
-                        </a:rPr>
-                        <a:t>CREATED_DATE : </a:t>
-                      </a:r>
-                      <a:r>
-                        <a:rPr lang="en-US" altLang="ko-KR" sz="600" kern="1200" baseline="0">
-                          <a:solidFill>
-                            <a:schemeClr val="tx1"/>
-                          </a:solidFill>
-                          <a:effectLst/>
-                          <a:latin typeface="+mn-lt"/>
-                          <a:ea typeface="+mn-ea"/>
-                          <a:cs typeface="+mn-cs"/>
-                        </a:rPr>
-                        <a:t>DATETIME</a:t>
-                      </a:r>
-                      <a:endParaRPr lang="en-US" altLang="ko-KR" sz="600" kern="1200" baseline="0">
-                        <a:solidFill>
-                          <a:schemeClr val="tx1"/>
-                        </a:solidFill>
-                        <a:effectLst/>
-                        <a:latin typeface="+mn-lt"/>
-                        <a:ea typeface="+mn-ea"/>
-                        <a:cs typeface="+mn-cs"/>
-                      </a:endParaRPr>
-                    </a:p>
-                    <a:p>
-                      <a:pPr algn="l" latinLnBrk="1">
-                        <a:defRPr/>
-                      </a:pPr>
-                      <a:r>
-                        <a:rPr lang="en-US" altLang="ko-KR" sz="600" kern="1200">
-                          <a:solidFill>
-                            <a:schemeClr val="tx1"/>
-                          </a:solidFill>
-                          <a:effectLst/>
-                          <a:latin typeface="+mn-lt"/>
-                          <a:ea typeface="+mn-ea"/>
-                          <a:cs typeface="+mn-cs"/>
-                        </a:rPr>
-                        <a:t>MODIFIED_DATE : </a:t>
-                      </a:r>
-                      <a:r>
-                        <a:rPr lang="en-US" altLang="ko-KR" sz="600" kern="1200" baseline="0">
-                          <a:solidFill>
-                            <a:schemeClr val="tx1"/>
-                          </a:solidFill>
-                          <a:effectLst/>
-                          <a:latin typeface="+mn-lt"/>
-                          <a:ea typeface="+mn-ea"/>
-                          <a:cs typeface="+mn-cs"/>
-                        </a:rPr>
-                        <a:t>DATETIME</a:t>
-                      </a:r>
-                      <a:endParaRPr lang="en-US" altLang="ko-KR" sz="600" kern="1200">
-                        <a:solidFill>
-                          <a:schemeClr val="tx1"/>
-                        </a:solidFill>
-                        <a:effectLst/>
-                        <a:latin typeface="+mn-lt"/>
-                        <a:ea typeface="+mn-ea"/>
-                        <a:cs typeface="+mn-cs"/>
-                      </a:endParaRPr>
-                    </a:p>
-                  </a:txBody>
-                  <a:tcPr marL="64933" marR="64933" marT="17952" marB="17952" anchor="ctr">
-                    <a:lnL w="3556" cap="flat" cmpd="sng" algn="ctr">
-                      <a:solidFill>
-                        <a:srgbClr val="000000"/>
-                      </a:solidFill>
-                      <a:prstDash val="solid"/>
-                      <a:round/>
-                    </a:lnL>
-                    <a:lnR w="3556" cap="flat" cmpd="sng" algn="ctr">
-                      <a:solidFill>
-                        <a:srgbClr val="000000"/>
-                      </a:solidFill>
-                      <a:prstDash val="solid"/>
-                      <a:round/>
-                    </a:lnR>
-                    <a:lnT w="3556" cap="flat" cmpd="sng" algn="ctr">
-                      <a:solidFill>
-                        <a:srgbClr val="000000"/>
-                      </a:solidFill>
-                      <a:prstDash val="solid"/>
-                      <a:round/>
-                    </a:lnT>
-                    <a:lnB w="3556" cap="flat" cmpd="sng" algn="ctr">
-                      <a:solidFill>
-                        <a:srgbClr val="000000"/>
-                      </a:solidFill>
-                      <a:prstDash val="solid"/>
-                      <a:round/>
-                    </a:lnB>
-                  </a:tcPr>
-                </a:tc>
-              </a:tr>
-            </a:tbl>
-          </a:graphicData>
-        </a:graphic>
-      </p:graphicFrame>
       <p:grpSp>
         <p:nvGrpSpPr>
           <p:cNvPr id="241" name="그룹 228"/>
@@ -15416,7 +14805,7 @@
         </p:nvGrpSpPr>
         <p:grpSpPr>
           <a:xfrm rot="12006">
-            <a:off x="6679540" y="3210464"/>
+            <a:off x="6041365" y="3210464"/>
             <a:ext cx="186690" cy="470256"/>
             <a:chOff x="5281050" y="3077606"/>
             <a:chExt cx="186690" cy="470256"/>
@@ -15710,10 +15099,10 @@
         </p:nvGrpSpPr>
         <p:grpSpPr>
           <a:xfrm rot="10800000">
-            <a:off x="8725470" y="1946896"/>
-            <a:ext cx="177800" cy="900667"/>
+            <a:off x="8087295" y="2280271"/>
+            <a:ext cx="177800" cy="567292"/>
             <a:chOff x="5281050" y="3021012"/>
-            <a:chExt cx="177800" cy="900667"/>
+            <a:chExt cx="177800" cy="567292"/>
           </a:xfrm>
         </p:grpSpPr>
         <p:cxnSp>
@@ -15749,106 +15138,13 @@
         </p:cxnSp>
         <p:cxnSp>
           <p:nvCxnSpPr>
-            <p:cNvPr id="253" name="직선 연결선 152"/>
-            <p:cNvCxnSpPr/>
-            <p:nvPr/>
-          </p:nvCxnSpPr>
-          <p:spPr>
-            <a:xfrm flipV="1">
-              <a:off x="5378222" y="3259613"/>
-              <a:ext cx="0" cy="113188"/>
-            </a:xfrm>
-            <a:prstGeom prst="line">
-              <a:avLst/>
-            </a:prstGeom>
-            <a:ln w="12700"/>
-          </p:spPr>
-          <p:style>
-            <a:lnRef idx="1">
-              <a:schemeClr val="accent1"/>
-            </a:lnRef>
-            <a:fillRef idx="0">
-              <a:schemeClr val="accent1"/>
-            </a:fillRef>
-            <a:effectRef idx="0">
-              <a:schemeClr val="accent1"/>
-            </a:effectRef>
-            <a:fontRef idx="minor">
-              <a:schemeClr val="tx1"/>
-            </a:fontRef>
-          </p:style>
-        </p:cxnSp>
-        <p:cxnSp>
-          <p:nvCxnSpPr>
-            <p:cNvPr id="254" name="직선 연결선 153"/>
-            <p:cNvCxnSpPr/>
-            <p:nvPr/>
-          </p:nvCxnSpPr>
-          <p:spPr>
-            <a:xfrm flipV="1">
-              <a:off x="5378222" y="3416713"/>
-              <a:ext cx="0" cy="113188"/>
-            </a:xfrm>
-            <a:prstGeom prst="line">
-              <a:avLst/>
-            </a:prstGeom>
-            <a:ln w="12700"/>
-          </p:spPr>
-          <p:style>
-            <a:lnRef idx="1">
-              <a:schemeClr val="accent1"/>
-            </a:lnRef>
-            <a:fillRef idx="0">
-              <a:schemeClr val="accent1"/>
-            </a:fillRef>
-            <a:effectRef idx="0">
-              <a:schemeClr val="accent1"/>
-            </a:effectRef>
-            <a:fontRef idx="minor">
-              <a:schemeClr val="tx1"/>
-            </a:fontRef>
-          </p:style>
-        </p:cxnSp>
-        <p:cxnSp>
-          <p:nvCxnSpPr>
-            <p:cNvPr id="255" name="직선 연결선 154"/>
-            <p:cNvCxnSpPr/>
-            <p:nvPr/>
-          </p:nvCxnSpPr>
-          <p:spPr>
-            <a:xfrm rot="16200000">
-              <a:off x="5352024" y="3834689"/>
-              <a:ext cx="53015" cy="618"/>
-            </a:xfrm>
-            <a:prstGeom prst="line">
-              <a:avLst/>
-            </a:prstGeom>
-            <a:ln w="12700"/>
-          </p:spPr>
-          <p:style>
-            <a:lnRef idx="1">
-              <a:schemeClr val="accent1"/>
-            </a:lnRef>
-            <a:fillRef idx="0">
-              <a:schemeClr val="accent1"/>
-            </a:fillRef>
-            <a:effectRef idx="0">
-              <a:schemeClr val="accent1"/>
-            </a:effectRef>
-            <a:fontRef idx="minor">
-              <a:schemeClr val="tx1"/>
-            </a:fontRef>
-          </p:style>
-        </p:cxnSp>
-        <p:cxnSp>
-          <p:nvCxnSpPr>
             <p:cNvPr id="256" name="직선 연결선 155"/>
             <p:cNvCxnSpPr/>
             <p:nvPr/>
           </p:nvCxnSpPr>
           <p:spPr>
             <a:xfrm flipV="1">
-              <a:off x="5378222" y="3808491"/>
+              <a:off x="5378222" y="3475116"/>
               <a:ext cx="0" cy="113188"/>
             </a:xfrm>
             <a:prstGeom prst="line">
@@ -15879,7 +15175,7 @@
           </p:nvCxnSpPr>
           <p:spPr>
             <a:xfrm rot="16200000" flipV="1">
-              <a:off x="5364252" y="3821500"/>
+              <a:off x="5364252" y="3488125"/>
               <a:ext cx="107950" cy="80010"/>
             </a:xfrm>
             <a:prstGeom prst="line">
@@ -15910,7 +15206,7 @@
           </p:nvCxnSpPr>
           <p:spPr>
             <a:xfrm rot="16200000">
-              <a:off x="5275970" y="3822460"/>
+              <a:off x="5275970" y="3489085"/>
               <a:ext cx="107950" cy="80010"/>
             </a:xfrm>
             <a:prstGeom prst="line">
@@ -15941,7 +15237,7 @@
           </p:nvSpPr>
           <p:spPr>
             <a:xfrm rot="16200000" flipH="1">
-              <a:off x="5295020" y="3644661"/>
+              <a:off x="5295020" y="3311286"/>
               <a:ext cx="167640" cy="160020"/>
             </a:xfrm>
             <a:prstGeom prst="ellipse">
@@ -15984,7 +15280,7 @@
           </p:nvCxnSpPr>
           <p:spPr>
             <a:xfrm rot="16200000" flipV="1">
-              <a:off x="5351221" y="3613231"/>
+              <a:off x="5351221" y="3279856"/>
               <a:ext cx="54621" cy="618"/>
             </a:xfrm>
             <a:prstGeom prst="line">
@@ -16046,11 +15342,11 @@
           <p:nvPr/>
         </p:nvGrpSpPr>
         <p:grpSpPr>
-          <a:xfrm rot="14878217">
-            <a:off x="7405497" y="1631109"/>
-            <a:ext cx="186690" cy="900667"/>
+          <a:xfrm rot="16200000">
+            <a:off x="7076884" y="1378696"/>
+            <a:ext cx="186690" cy="1519792"/>
             <a:chOff x="5281050" y="3021012"/>
-            <a:chExt cx="186690" cy="900667"/>
+            <a:chExt cx="186690" cy="1519792"/>
           </a:xfrm>
         </p:grpSpPr>
         <p:cxnSp>
@@ -16154,7 +15450,7 @@
           </p:nvCxnSpPr>
           <p:spPr>
             <a:xfrm flipV="1">
-              <a:off x="5378222" y="3724670"/>
+              <a:off x="5378222" y="4343795"/>
               <a:ext cx="0" cy="136835"/>
             </a:xfrm>
             <a:prstGeom prst="line">
@@ -16185,7 +15481,7 @@
           </p:nvCxnSpPr>
           <p:spPr>
             <a:xfrm flipV="1">
-              <a:off x="5378222" y="3808491"/>
+              <a:off x="5378222" y="4427616"/>
               <a:ext cx="0" cy="113188"/>
             </a:xfrm>
             <a:prstGeom prst="line">
@@ -16216,7 +15512,7 @@
           </p:nvCxnSpPr>
           <p:spPr>
             <a:xfrm rot="16200000" flipV="1">
-              <a:off x="5378840" y="3719591"/>
+              <a:off x="5378840" y="4338716"/>
               <a:ext cx="0" cy="177800"/>
             </a:xfrm>
             <a:prstGeom prst="line">
@@ -16301,92 +15597,15 @@
             </a:fontRef>
           </p:style>
         </p:cxnSp>
-      </p:grpSp>
-      <p:grpSp>
-        <p:nvGrpSpPr>
-          <p:cNvPr id="271" name="그룹 150"/>
-          <p:cNvGrpSpPr/>
-          <p:nvPr/>
-        </p:nvGrpSpPr>
-        <p:grpSpPr>
-          <a:xfrm rot="5400000">
-            <a:off x="7374107" y="2609300"/>
-            <a:ext cx="177800" cy="862567"/>
-            <a:chOff x="5281050" y="3402012"/>
-            <a:chExt cx="177800" cy="862567"/>
-          </a:xfrm>
-        </p:grpSpPr>
         <p:cxnSp>
           <p:nvCxnSpPr>
-            <p:cNvPr id="272" name="직선 연결선 151"/>
+            <p:cNvPr id="307" name="직선 연결선 122"/>
             <p:cNvCxnSpPr/>
             <p:nvPr/>
           </p:nvCxnSpPr>
           <p:spPr>
             <a:xfrm flipV="1">
-              <a:off x="5378222" y="3402012"/>
-              <a:ext cx="0" cy="194734"/>
-            </a:xfrm>
-            <a:prstGeom prst="line">
-              <a:avLst/>
-            </a:prstGeom>
-            <a:ln w="12700"/>
-          </p:spPr>
-          <p:style>
-            <a:lnRef idx="1">
-              <a:schemeClr val="accent1"/>
-            </a:lnRef>
-            <a:fillRef idx="0">
-              <a:schemeClr val="accent1"/>
-            </a:fillRef>
-            <a:effectRef idx="0">
-              <a:schemeClr val="accent1"/>
-            </a:effectRef>
-            <a:fontRef idx="minor">
-              <a:schemeClr val="tx1"/>
-            </a:fontRef>
-          </p:style>
-        </p:cxnSp>
-        <p:cxnSp>
-          <p:nvCxnSpPr>
-            <p:cNvPr id="275" name="직선 연결선 154"/>
-            <p:cNvCxnSpPr/>
-            <p:nvPr/>
-          </p:nvCxnSpPr>
-          <p:spPr>
-            <a:xfrm rot="16200000">
-              <a:off x="5330523" y="3832855"/>
-              <a:ext cx="95399" cy="0"/>
-            </a:xfrm>
-            <a:prstGeom prst="line">
-              <a:avLst/>
-            </a:prstGeom>
-            <a:ln w="12700"/>
-          </p:spPr>
-          <p:style>
-            <a:lnRef idx="1">
-              <a:schemeClr val="accent1"/>
-            </a:lnRef>
-            <a:fillRef idx="0">
-              <a:schemeClr val="accent1"/>
-            </a:fillRef>
-            <a:effectRef idx="0">
-              <a:schemeClr val="accent1"/>
-            </a:effectRef>
-            <a:fontRef idx="minor">
-              <a:schemeClr val="tx1"/>
-            </a:fontRef>
-          </p:style>
-        </p:cxnSp>
-        <p:cxnSp>
-          <p:nvCxnSpPr>
-            <p:cNvPr id="276" name="직선 연결선 155"/>
-            <p:cNvCxnSpPr/>
-            <p:nvPr/>
-          </p:nvCxnSpPr>
-          <p:spPr>
-            <a:xfrm flipV="1">
-              <a:off x="5378222" y="4151391"/>
+              <a:off x="5378222" y="3768447"/>
               <a:ext cx="0" cy="113188"/>
             </a:xfrm>
             <a:prstGeom prst="line">
@@ -16411,14 +15630,14 @@
         </p:cxnSp>
         <p:cxnSp>
           <p:nvCxnSpPr>
-            <p:cNvPr id="277" name="직선 연결선 156"/>
+            <p:cNvPr id="308" name="직선 연결선 122"/>
             <p:cNvCxnSpPr/>
             <p:nvPr/>
           </p:nvCxnSpPr>
           <p:spPr>
-            <a:xfrm rot="16200000" flipV="1">
-              <a:off x="5364252" y="4164400"/>
-              <a:ext cx="107950" cy="80010"/>
+            <a:xfrm flipV="1">
+              <a:off x="5378222" y="3934098"/>
+              <a:ext cx="0" cy="113188"/>
             </a:xfrm>
             <a:prstGeom prst="line">
               <a:avLst/>
@@ -16442,14 +15661,14 @@
         </p:cxnSp>
         <p:cxnSp>
           <p:nvCxnSpPr>
-            <p:cNvPr id="278" name="직선 연결선 157"/>
+            <p:cNvPr id="309" name="직선 연결선 122"/>
             <p:cNvCxnSpPr/>
             <p:nvPr/>
           </p:nvCxnSpPr>
           <p:spPr>
-            <a:xfrm rot="16200000">
-              <a:off x="5275970" y="4165360"/>
-              <a:ext cx="107950" cy="80010"/>
+            <a:xfrm flipV="1">
+              <a:off x="5378222" y="4074904"/>
+              <a:ext cx="0" cy="113188"/>
             </a:xfrm>
             <a:prstGeom prst="line">
               <a:avLst/>
@@ -16471,120 +15690,15 @@
             </a:fontRef>
           </p:style>
         </p:cxnSp>
-        <p:sp>
-          <p:nvSpPr>
-            <p:cNvPr id="279" name="타원 159"/>
-            <p:cNvSpPr/>
-            <p:nvPr/>
-          </p:nvSpPr>
-          <p:spPr>
-            <a:xfrm rot="16200000" flipH="1">
-              <a:off x="5295020" y="3987561"/>
-              <a:ext cx="167640" cy="160020"/>
-            </a:xfrm>
-            <a:prstGeom prst="ellipse">
-              <a:avLst/>
-            </a:prstGeom>
-            <a:noFill/>
-          </p:spPr>
-          <p:style>
-            <a:lnRef idx="2">
-              <a:schemeClr val="accent1">
-                <a:shade val="50000"/>
-              </a:schemeClr>
-            </a:lnRef>
-            <a:fillRef idx="1">
-              <a:schemeClr val="accent1"/>
-            </a:fillRef>
-            <a:effectRef idx="0">
-              <a:schemeClr val="accent1"/>
-            </a:effectRef>
-            <a:fontRef idx="minor">
-              <a:schemeClr val="lt1"/>
-            </a:fontRef>
-          </p:style>
-          <p:txBody>
-            <a:bodyPr anchor="ctr"/>
-            <a:lstStyle/>
-            <a:p>
-              <a:pPr algn="ctr">
-                <a:defRPr/>
-              </a:pPr>
-              <a:endParaRPr lang="ko-KR" altLang="en-US"/>
-            </a:p>
-          </p:txBody>
-        </p:sp>
         <p:cxnSp>
           <p:nvCxnSpPr>
-            <p:cNvPr id="280" name="직선 연결선 160"/>
-            <p:cNvCxnSpPr/>
-            <p:nvPr/>
-          </p:nvCxnSpPr>
-          <p:spPr>
-            <a:xfrm rot="16200000" flipV="1">
-              <a:off x="5351221" y="3956131"/>
-              <a:ext cx="54621" cy="618"/>
-            </a:xfrm>
-            <a:prstGeom prst="line">
-              <a:avLst/>
-            </a:prstGeom>
-            <a:ln w="12700"/>
-          </p:spPr>
-          <p:style>
-            <a:lnRef idx="1">
-              <a:schemeClr val="accent1"/>
-            </a:lnRef>
-            <a:fillRef idx="0">
-              <a:schemeClr val="accent1"/>
-            </a:fillRef>
-            <a:effectRef idx="0">
-              <a:schemeClr val="accent1"/>
-            </a:effectRef>
-            <a:fontRef idx="minor">
-              <a:schemeClr val="tx1"/>
-            </a:fontRef>
-          </p:style>
-        </p:cxnSp>
-        <p:cxnSp>
-          <p:nvCxnSpPr>
-            <p:cNvPr id="281" name="직선 연결선 161"/>
-            <p:cNvCxnSpPr/>
-            <p:nvPr/>
-          </p:nvCxnSpPr>
-          <p:spPr>
-            <a:xfrm rot="16200000" flipV="1">
-              <a:off x="5369950" y="3426300"/>
-              <a:ext cx="0" cy="177800"/>
-            </a:xfrm>
-            <a:prstGeom prst="line">
-              <a:avLst/>
-            </a:prstGeom>
-            <a:ln w="12700"/>
-          </p:spPr>
-          <p:style>
-            <a:lnRef idx="1">
-              <a:schemeClr val="accent1"/>
-            </a:lnRef>
-            <a:fillRef idx="0">
-              <a:schemeClr val="accent1"/>
-            </a:fillRef>
-            <a:effectRef idx="0">
-              <a:schemeClr val="accent1"/>
-            </a:effectRef>
-            <a:fontRef idx="minor">
-              <a:schemeClr val="tx1"/>
-            </a:fontRef>
-          </p:style>
-        </p:cxnSp>
-        <p:cxnSp>
-          <p:nvCxnSpPr>
-            <p:cNvPr id="282" name="직선 연결선 153"/>
+            <p:cNvPr id="310" name="직선 연결선 122"/>
             <p:cNvCxnSpPr/>
             <p:nvPr/>
           </p:nvCxnSpPr>
           <p:spPr>
             <a:xfrm flipV="1">
-              <a:off x="5378222" y="3634785"/>
+              <a:off x="5378222" y="4203284"/>
               <a:ext cx="0" cy="113188"/>
             </a:xfrm>
             <a:prstGeom prst="line">
@@ -16617,8 +15731,8 @@
           <p:nvPr/>
         </p:nvGraphicFramePr>
         <p:xfrm>
-          <a:off x="9892410" y="3542893"/>
-          <a:ext cx="1345896" cy="850683"/>
+          <a:off x="8730887" y="2833809"/>
+          <a:ext cx="1345896" cy="850682"/>
         </p:xfrm>
         <a:graphic>
           <a:graphicData uri="http://schemas.openxmlformats.org/drawingml/2006/table">
@@ -17259,6 +16373,575 @@
         <p:cxnSp>
           <p:nvCxnSpPr>
             <p:cNvPr id="306" name="직선 연결선 138"/>
+            <p:cNvCxnSpPr/>
+            <p:nvPr/>
+          </p:nvCxnSpPr>
+          <p:spPr>
+            <a:xfrm rot="16200000" flipV="1">
+              <a:off x="5369950" y="3045300"/>
+              <a:ext cx="0" cy="177800"/>
+            </a:xfrm>
+            <a:prstGeom prst="line">
+              <a:avLst/>
+            </a:prstGeom>
+            <a:ln w="12700"/>
+          </p:spPr>
+          <p:style>
+            <a:lnRef idx="1">
+              <a:schemeClr val="accent1"/>
+            </a:lnRef>
+            <a:fillRef idx="0">
+              <a:schemeClr val="accent1"/>
+            </a:fillRef>
+            <a:effectRef idx="0">
+              <a:schemeClr val="accent1"/>
+            </a:effectRef>
+            <a:fontRef idx="minor">
+              <a:schemeClr val="tx1"/>
+            </a:fontRef>
+          </p:style>
+        </p:cxnSp>
+      </p:grpSp>
+      <p:grpSp>
+        <p:nvGrpSpPr>
+          <p:cNvPr id="322" name="그룹 228"/>
+          <p:cNvGrpSpPr/>
+          <p:nvPr/>
+        </p:nvGrpSpPr>
+        <p:grpSpPr>
+          <a:xfrm rot="12006">
+            <a:off x="8779677" y="2290772"/>
+            <a:ext cx="186949" cy="546456"/>
+            <a:chOff x="5280790" y="3001405"/>
+            <a:chExt cx="186949" cy="546456"/>
+          </a:xfrm>
+        </p:grpSpPr>
+        <p:cxnSp>
+          <p:nvCxnSpPr>
+            <p:cNvPr id="323" name="직선 연결선 229"/>
+            <p:cNvCxnSpPr/>
+            <p:nvPr/>
+          </p:nvCxnSpPr>
+          <p:spPr>
+            <a:xfrm flipV="1">
+              <a:off x="5377954" y="3001405"/>
+              <a:ext cx="0" cy="56594"/>
+            </a:xfrm>
+            <a:prstGeom prst="line">
+              <a:avLst/>
+            </a:prstGeom>
+            <a:ln w="12700"/>
+          </p:spPr>
+          <p:style>
+            <a:lnRef idx="1">
+              <a:schemeClr val="accent1"/>
+            </a:lnRef>
+            <a:fillRef idx="0">
+              <a:schemeClr val="accent1"/>
+            </a:fillRef>
+            <a:effectRef idx="0">
+              <a:schemeClr val="accent1"/>
+            </a:effectRef>
+            <a:fontRef idx="minor">
+              <a:schemeClr val="tx1"/>
+            </a:fontRef>
+          </p:style>
+        </p:cxnSp>
+        <p:cxnSp>
+          <p:nvCxnSpPr>
+            <p:cNvPr id="324" name="직선 연결선 230"/>
+            <p:cNvCxnSpPr/>
+            <p:nvPr/>
+          </p:nvCxnSpPr>
+          <p:spPr>
+            <a:xfrm flipV="1">
+              <a:off x="5377955" y="3084352"/>
+              <a:ext cx="0" cy="56594"/>
+            </a:xfrm>
+            <a:prstGeom prst="line">
+              <a:avLst/>
+            </a:prstGeom>
+            <a:ln w="12700"/>
+          </p:spPr>
+          <p:style>
+            <a:lnRef idx="1">
+              <a:schemeClr val="accent1"/>
+            </a:lnRef>
+            <a:fillRef idx="0">
+              <a:schemeClr val="accent1"/>
+            </a:fillRef>
+            <a:effectRef idx="0">
+              <a:schemeClr val="accent1"/>
+            </a:effectRef>
+            <a:fontRef idx="minor">
+              <a:schemeClr val="tx1"/>
+            </a:fontRef>
+          </p:style>
+        </p:cxnSp>
+        <p:cxnSp>
+          <p:nvCxnSpPr>
+            <p:cNvPr id="325" name="직선 연결선 231"/>
+            <p:cNvCxnSpPr/>
+            <p:nvPr/>
+          </p:nvCxnSpPr>
+          <p:spPr>
+            <a:xfrm flipV="1">
+              <a:off x="5378222" y="3256693"/>
+              <a:ext cx="0" cy="56594"/>
+            </a:xfrm>
+            <a:prstGeom prst="line">
+              <a:avLst/>
+            </a:prstGeom>
+            <a:ln w="12700"/>
+          </p:spPr>
+          <p:style>
+            <a:lnRef idx="1">
+              <a:schemeClr val="accent1"/>
+            </a:lnRef>
+            <a:fillRef idx="0">
+              <a:schemeClr val="accent1"/>
+            </a:fillRef>
+            <a:effectRef idx="0">
+              <a:schemeClr val="accent1"/>
+            </a:effectRef>
+            <a:fontRef idx="minor">
+              <a:schemeClr val="tx1"/>
+            </a:fontRef>
+          </p:style>
+        </p:cxnSp>
+        <p:cxnSp>
+          <p:nvCxnSpPr>
+            <p:cNvPr id="326" name="직선 연결선 233"/>
+            <p:cNvCxnSpPr/>
+            <p:nvPr/>
+          </p:nvCxnSpPr>
+          <p:spPr>
+            <a:xfrm flipV="1">
+              <a:off x="5378222" y="3434674"/>
+              <a:ext cx="0" cy="113188"/>
+            </a:xfrm>
+            <a:prstGeom prst="line">
+              <a:avLst/>
+            </a:prstGeom>
+            <a:ln w="12700"/>
+          </p:spPr>
+          <p:style>
+            <a:lnRef idx="1">
+              <a:schemeClr val="accent1"/>
+            </a:lnRef>
+            <a:fillRef idx="0">
+              <a:schemeClr val="accent1"/>
+            </a:fillRef>
+            <a:effectRef idx="0">
+              <a:schemeClr val="accent1"/>
+            </a:effectRef>
+            <a:fontRef idx="minor">
+              <a:schemeClr val="tx1"/>
+            </a:fontRef>
+          </p:style>
+        </p:cxnSp>
+        <p:cxnSp>
+          <p:nvCxnSpPr>
+            <p:cNvPr id="327" name="직선 연결선 234"/>
+            <p:cNvCxnSpPr/>
+            <p:nvPr/>
+          </p:nvCxnSpPr>
+          <p:spPr>
+            <a:xfrm rot="16200000" flipV="1">
+              <a:off x="5364252" y="3447683"/>
+              <a:ext cx="107950" cy="80010"/>
+            </a:xfrm>
+            <a:prstGeom prst="line">
+              <a:avLst/>
+            </a:prstGeom>
+            <a:ln w="12700"/>
+          </p:spPr>
+          <p:style>
+            <a:lnRef idx="1">
+              <a:schemeClr val="accent1"/>
+            </a:lnRef>
+            <a:fillRef idx="0">
+              <a:schemeClr val="accent1"/>
+            </a:fillRef>
+            <a:effectRef idx="0">
+              <a:schemeClr val="accent1"/>
+            </a:effectRef>
+            <a:fontRef idx="minor">
+              <a:schemeClr val="tx1"/>
+            </a:fontRef>
+          </p:style>
+        </p:cxnSp>
+        <p:cxnSp>
+          <p:nvCxnSpPr>
+            <p:cNvPr id="328" name="직선 연결선 235"/>
+            <p:cNvCxnSpPr/>
+            <p:nvPr/>
+          </p:nvCxnSpPr>
+          <p:spPr>
+            <a:xfrm rot="16200000">
+              <a:off x="5275970" y="3448643"/>
+              <a:ext cx="107950" cy="80010"/>
+            </a:xfrm>
+            <a:prstGeom prst="line">
+              <a:avLst/>
+            </a:prstGeom>
+            <a:ln w="12700"/>
+          </p:spPr>
+          <p:style>
+            <a:lnRef idx="1">
+              <a:schemeClr val="accent1"/>
+            </a:lnRef>
+            <a:fillRef idx="0">
+              <a:schemeClr val="accent1"/>
+            </a:fillRef>
+            <a:effectRef idx="0">
+              <a:schemeClr val="accent1"/>
+            </a:effectRef>
+            <a:fontRef idx="minor">
+              <a:schemeClr val="tx1"/>
+            </a:fontRef>
+          </p:style>
+        </p:cxnSp>
+        <p:cxnSp>
+          <p:nvCxnSpPr>
+            <p:cNvPr id="329" name="직선 연결선 236"/>
+            <p:cNvCxnSpPr/>
+            <p:nvPr/>
+          </p:nvCxnSpPr>
+          <p:spPr>
+            <a:xfrm rot="16200000" flipV="1">
+              <a:off x="5378840" y="3345774"/>
+              <a:ext cx="0" cy="177800"/>
+            </a:xfrm>
+            <a:prstGeom prst="line">
+              <a:avLst/>
+            </a:prstGeom>
+            <a:ln w="12700"/>
+          </p:spPr>
+          <p:style>
+            <a:lnRef idx="1">
+              <a:schemeClr val="accent1"/>
+            </a:lnRef>
+            <a:fillRef idx="0">
+              <a:schemeClr val="accent1"/>
+            </a:fillRef>
+            <a:effectRef idx="0">
+              <a:schemeClr val="accent1"/>
+            </a:effectRef>
+            <a:fontRef idx="minor">
+              <a:schemeClr val="tx1"/>
+            </a:fontRef>
+          </p:style>
+        </p:cxnSp>
+        <p:cxnSp>
+          <p:nvCxnSpPr>
+            <p:cNvPr id="330" name="직선 연결선 237"/>
+            <p:cNvCxnSpPr/>
+            <p:nvPr/>
+          </p:nvCxnSpPr>
+          <p:spPr>
+            <a:xfrm flipV="1">
+              <a:off x="5378222" y="3350010"/>
+              <a:ext cx="0" cy="56594"/>
+            </a:xfrm>
+            <a:prstGeom prst="line">
+              <a:avLst/>
+            </a:prstGeom>
+            <a:ln w="12700"/>
+          </p:spPr>
+          <p:style>
+            <a:lnRef idx="1">
+              <a:schemeClr val="accent1"/>
+            </a:lnRef>
+            <a:fillRef idx="0">
+              <a:schemeClr val="accent1"/>
+            </a:fillRef>
+            <a:effectRef idx="0">
+              <a:schemeClr val="accent1"/>
+            </a:effectRef>
+            <a:fontRef idx="minor">
+              <a:schemeClr val="tx1"/>
+            </a:fontRef>
+          </p:style>
+        </p:cxnSp>
+        <p:cxnSp>
+          <p:nvCxnSpPr>
+            <p:cNvPr id="331" name="직선 연결선 238"/>
+            <p:cNvCxnSpPr/>
+            <p:nvPr/>
+          </p:nvCxnSpPr>
+          <p:spPr>
+            <a:xfrm rot="16200000" flipV="1">
+              <a:off x="5369690" y="2969099"/>
+              <a:ext cx="0" cy="177800"/>
+            </a:xfrm>
+            <a:prstGeom prst="line">
+              <a:avLst/>
+            </a:prstGeom>
+            <a:ln w="12700"/>
+          </p:spPr>
+          <p:style>
+            <a:lnRef idx="1">
+              <a:schemeClr val="accent1"/>
+            </a:lnRef>
+            <a:fillRef idx="0">
+              <a:schemeClr val="accent1"/>
+            </a:fillRef>
+            <a:effectRef idx="0">
+              <a:schemeClr val="accent1"/>
+            </a:effectRef>
+            <a:fontRef idx="minor">
+              <a:schemeClr val="tx1"/>
+            </a:fontRef>
+          </p:style>
+        </p:cxnSp>
+        <p:cxnSp>
+          <p:nvCxnSpPr>
+            <p:cNvPr id="342" name="직선 연결선 231"/>
+            <p:cNvCxnSpPr/>
+            <p:nvPr/>
+          </p:nvCxnSpPr>
+          <p:spPr>
+            <a:xfrm flipV="1">
+              <a:off x="5376507" y="3161448"/>
+              <a:ext cx="0" cy="56594"/>
+            </a:xfrm>
+            <a:prstGeom prst="line">
+              <a:avLst/>
+            </a:prstGeom>
+            <a:ln w="12700"/>
+          </p:spPr>
+          <p:style>
+            <a:lnRef idx="1">
+              <a:schemeClr val="accent1"/>
+            </a:lnRef>
+            <a:fillRef idx="0">
+              <a:schemeClr val="accent1"/>
+            </a:fillRef>
+            <a:effectRef idx="0">
+              <a:schemeClr val="accent1"/>
+            </a:effectRef>
+            <a:fontRef idx="minor">
+              <a:schemeClr val="tx1"/>
+            </a:fontRef>
+          </p:style>
+        </p:cxnSp>
+      </p:grpSp>
+      <p:grpSp>
+        <p:nvGrpSpPr>
+          <p:cNvPr id="343" name="그룹 150"/>
+          <p:cNvGrpSpPr/>
+          <p:nvPr/>
+        </p:nvGrpSpPr>
+        <p:grpSpPr>
+          <a:xfrm rot="0">
+            <a:off x="5182169" y="3220357"/>
+            <a:ext cx="177800" cy="465074"/>
+            <a:chOff x="5281050" y="3096015"/>
+            <a:chExt cx="177800" cy="492288"/>
+          </a:xfrm>
+        </p:grpSpPr>
+        <p:cxnSp>
+          <p:nvCxnSpPr>
+            <p:cNvPr id="344" name="직선 연결선 151"/>
+            <p:cNvCxnSpPr/>
+            <p:nvPr/>
+          </p:nvCxnSpPr>
+          <p:spPr>
+            <a:xfrm rot="5400000" flipH="1" flipV="1">
+              <a:off x="5318471" y="3155765"/>
+              <a:ext cx="119731" cy="231"/>
+            </a:xfrm>
+            <a:prstGeom prst="line">
+              <a:avLst/>
+            </a:prstGeom>
+            <a:ln w="12700"/>
+          </p:spPr>
+          <p:style>
+            <a:lnRef idx="1">
+              <a:schemeClr val="accent1"/>
+            </a:lnRef>
+            <a:fillRef idx="0">
+              <a:schemeClr val="accent1"/>
+            </a:fillRef>
+            <a:effectRef idx="0">
+              <a:schemeClr val="accent1"/>
+            </a:effectRef>
+            <a:fontRef idx="minor">
+              <a:schemeClr val="tx1"/>
+            </a:fontRef>
+          </p:style>
+        </p:cxnSp>
+        <p:cxnSp>
+          <p:nvCxnSpPr>
+            <p:cNvPr id="345" name="직선 연결선 155"/>
+            <p:cNvCxnSpPr/>
+            <p:nvPr/>
+          </p:nvCxnSpPr>
+          <p:spPr>
+            <a:xfrm flipV="1">
+              <a:off x="5378222" y="3475116"/>
+              <a:ext cx="0" cy="113188"/>
+            </a:xfrm>
+            <a:prstGeom prst="line">
+              <a:avLst/>
+            </a:prstGeom>
+            <a:ln w="12700"/>
+          </p:spPr>
+          <p:style>
+            <a:lnRef idx="1">
+              <a:schemeClr val="accent1"/>
+            </a:lnRef>
+            <a:fillRef idx="0">
+              <a:schemeClr val="accent1"/>
+            </a:fillRef>
+            <a:effectRef idx="0">
+              <a:schemeClr val="accent1"/>
+            </a:effectRef>
+            <a:fontRef idx="minor">
+              <a:schemeClr val="tx1"/>
+            </a:fontRef>
+          </p:style>
+        </p:cxnSp>
+        <p:cxnSp>
+          <p:nvCxnSpPr>
+            <p:cNvPr id="346" name="직선 연결선 156"/>
+            <p:cNvCxnSpPr/>
+            <p:nvPr/>
+          </p:nvCxnSpPr>
+          <p:spPr>
+            <a:xfrm rot="16200000" flipV="1">
+              <a:off x="5364252" y="3488125"/>
+              <a:ext cx="107950" cy="80010"/>
+            </a:xfrm>
+            <a:prstGeom prst="line">
+              <a:avLst/>
+            </a:prstGeom>
+            <a:ln w="12700"/>
+          </p:spPr>
+          <p:style>
+            <a:lnRef idx="1">
+              <a:schemeClr val="accent1"/>
+            </a:lnRef>
+            <a:fillRef idx="0">
+              <a:schemeClr val="accent1"/>
+            </a:fillRef>
+            <a:effectRef idx="0">
+              <a:schemeClr val="accent1"/>
+            </a:effectRef>
+            <a:fontRef idx="minor">
+              <a:schemeClr val="tx1"/>
+            </a:fontRef>
+          </p:style>
+        </p:cxnSp>
+        <p:cxnSp>
+          <p:nvCxnSpPr>
+            <p:cNvPr id="347" name="직선 연결선 157"/>
+            <p:cNvCxnSpPr/>
+            <p:nvPr/>
+          </p:nvCxnSpPr>
+          <p:spPr>
+            <a:xfrm rot="16200000">
+              <a:off x="5275970" y="3489085"/>
+              <a:ext cx="107950" cy="80010"/>
+            </a:xfrm>
+            <a:prstGeom prst="line">
+              <a:avLst/>
+            </a:prstGeom>
+            <a:ln w="12700"/>
+          </p:spPr>
+          <p:style>
+            <a:lnRef idx="1">
+              <a:schemeClr val="accent1"/>
+            </a:lnRef>
+            <a:fillRef idx="0">
+              <a:schemeClr val="accent1"/>
+            </a:fillRef>
+            <a:effectRef idx="0">
+              <a:schemeClr val="accent1"/>
+            </a:effectRef>
+            <a:fontRef idx="minor">
+              <a:schemeClr val="tx1"/>
+            </a:fontRef>
+          </p:style>
+        </p:cxnSp>
+        <p:sp>
+          <p:nvSpPr>
+            <p:cNvPr id="348" name="타원 159"/>
+            <p:cNvSpPr/>
+            <p:nvPr/>
+          </p:nvSpPr>
+          <p:spPr>
+            <a:xfrm rot="16200000" flipH="1">
+              <a:off x="5295020" y="3311286"/>
+              <a:ext cx="167640" cy="160020"/>
+            </a:xfrm>
+            <a:prstGeom prst="ellipse">
+              <a:avLst/>
+            </a:prstGeom>
+            <a:noFill/>
+          </p:spPr>
+          <p:style>
+            <a:lnRef idx="2">
+              <a:schemeClr val="accent1">
+                <a:shade val="50000"/>
+              </a:schemeClr>
+            </a:lnRef>
+            <a:fillRef idx="1">
+              <a:schemeClr val="accent1"/>
+            </a:fillRef>
+            <a:effectRef idx="0">
+              <a:schemeClr val="accent1"/>
+            </a:effectRef>
+            <a:fontRef idx="minor">
+              <a:schemeClr val="lt1"/>
+            </a:fontRef>
+          </p:style>
+          <p:txBody>
+            <a:bodyPr anchor="ctr"/>
+            <a:lstStyle/>
+            <a:p>
+              <a:pPr algn="ctr">
+                <a:defRPr/>
+              </a:pPr>
+              <a:endParaRPr lang="ko-KR" altLang="en-US"/>
+            </a:p>
+          </p:txBody>
+        </p:sp>
+        <p:cxnSp>
+          <p:nvCxnSpPr>
+            <p:cNvPr id="349" name="직선 연결선 160"/>
+            <p:cNvCxnSpPr/>
+            <p:nvPr/>
+          </p:nvCxnSpPr>
+          <p:spPr>
+            <a:xfrm rot="16200000" flipV="1">
+              <a:off x="5351221" y="3279856"/>
+              <a:ext cx="54621" cy="618"/>
+            </a:xfrm>
+            <a:prstGeom prst="line">
+              <a:avLst/>
+            </a:prstGeom>
+            <a:ln w="12700"/>
+          </p:spPr>
+          <p:style>
+            <a:lnRef idx="1">
+              <a:schemeClr val="accent1"/>
+            </a:lnRef>
+            <a:fillRef idx="0">
+              <a:schemeClr val="accent1"/>
+            </a:fillRef>
+            <a:effectRef idx="0">
+              <a:schemeClr val="accent1"/>
+            </a:effectRef>
+            <a:fontRef idx="minor">
+              <a:schemeClr val="tx1"/>
+            </a:fontRef>
+          </p:style>
+        </p:cxnSp>
+        <p:cxnSp>
+          <p:nvCxnSpPr>
+            <p:cNvPr id="350" name="직선 연결선 161"/>
             <p:cNvCxnSpPr/>
             <p:nvPr/>
           </p:nvCxnSpPr>

</xml_diff>

<commit_message>
feat, chore : modify DB ERD & create productcontroller
</commit_message>
<xml_diff>
--- a/other/document/DB 설계 및 화면설계 리소스.pptx
+++ b/other/document/DB 설계 및 화면설계 리소스.pptx
@@ -1,26 +1,26 @@
 
 <file path=ppt/presentation.xml><?xml version="1.0" encoding="utf-8"?>
-<p:presentation xmlns:r="http://schemas.openxmlformats.org/officeDocument/2006/relationships" xmlns:c="http://schemas.openxmlformats.org/drawingml/2006/chart" xmlns:a="http://schemas.openxmlformats.org/drawingml/2006/main" xmlns:dgm="http://schemas.openxmlformats.org/drawingml/2006/diagram" xmlns:dsp="http://schemas.microsoft.com/office/drawing/2008/diagram" xmlns:p="http://schemas.openxmlformats.org/presentationml/2006/main" saveSubsetFonts="1">
+<p:presentation xmlns:a="http://schemas.openxmlformats.org/drawingml/2006/main" xmlns:r="http://schemas.openxmlformats.org/officeDocument/2006/relationships" xmlns:p="http://schemas.openxmlformats.org/presentationml/2006/main" saveSubsetFonts="1">
   <p:sldMasterIdLst>
     <p:sldMasterId id="2147483692" r:id="rId1"/>
   </p:sldMasterIdLst>
   <p:handoutMasterIdLst>
-    <p:handoutMasterId r:id="rId2"/>
+    <p:handoutMasterId r:id="rId15"/>
   </p:handoutMasterIdLst>
   <p:sldIdLst>
-    <p:sldId id="256" r:id="rId3"/>
-    <p:sldId id="257" r:id="rId4"/>
-    <p:sldId id="258" r:id="rId5"/>
-    <p:sldId id="259" r:id="rId6"/>
-    <p:sldId id="260" r:id="rId7"/>
-    <p:sldId id="261" r:id="rId8"/>
-    <p:sldId id="262" r:id="rId9"/>
-    <p:sldId id="263" r:id="rId10"/>
-    <p:sldId id="264" r:id="rId11"/>
-    <p:sldId id="265" r:id="rId12"/>
-    <p:sldId id="266" r:id="rId13"/>
-    <p:sldId id="267" r:id="rId14"/>
-    <p:sldId id="268" r:id="rId15"/>
+    <p:sldId id="256" r:id="rId2"/>
+    <p:sldId id="257" r:id="rId3"/>
+    <p:sldId id="258" r:id="rId4"/>
+    <p:sldId id="259" r:id="rId5"/>
+    <p:sldId id="260" r:id="rId6"/>
+    <p:sldId id="261" r:id="rId7"/>
+    <p:sldId id="262" r:id="rId8"/>
+    <p:sldId id="263" r:id="rId9"/>
+    <p:sldId id="264" r:id="rId10"/>
+    <p:sldId id="265" r:id="rId11"/>
+    <p:sldId id="266" r:id="rId12"/>
+    <p:sldId id="267" r:id="rId13"/>
+    <p:sldId id="268" r:id="rId14"/>
   </p:sldIdLst>
   <p:sldSz cx="12192000" cy="6858000"/>
   <p:notesSz cx="6858000" cy="9144000"/>
@@ -123,7 +123,7 @@
 </file>
 
 <file path=ppt/handoutMasters/handoutMaster1.xml><?xml version="1.0" encoding="utf-8"?>
-<p:handoutMaster xmlns:r="http://schemas.openxmlformats.org/officeDocument/2006/relationships" xmlns:c="http://schemas.openxmlformats.org/drawingml/2006/chart" xmlns:a="http://schemas.openxmlformats.org/drawingml/2006/main" xmlns:dgm="http://schemas.openxmlformats.org/drawingml/2006/diagram" xmlns:dsp="http://schemas.microsoft.com/office/drawing/2008/diagram" xmlns:p="http://schemas.openxmlformats.org/presentationml/2006/main">
+<p:handoutMaster xmlns:a="http://schemas.openxmlformats.org/drawingml/2006/main" xmlns:r="http://schemas.openxmlformats.org/officeDocument/2006/relationships" xmlns:p="http://schemas.openxmlformats.org/presentationml/2006/main">
   <p:cSld>
     <p:bg>
       <p:bgRef idx="1001">
@@ -151,7 +151,7 @@
             <a:spLocks noGrp="1"/>
           </p:cNvSpPr>
           <p:nvPr>
-            <p:ph type="hdr" sz="quarter" idx="0"/>
+            <p:ph type="hdr" sz="quarter"/>
           </p:nvPr>
         </p:nvSpPr>
         <p:spPr>
@@ -174,10 +174,6 @@
             <a:pPr lvl="0">
               <a:defRPr/>
             </a:pPr>
-            <a:r>
-              <a:rPr lang="ko-KR" altLang="en-US"/>
-              <a:t/>
-            </a:r>
             <a:endParaRPr lang="ko-KR" altLang="en-US"/>
           </a:p>
         </p:txBody>
@@ -217,7 +213,7 @@
               <a:pPr lvl="0">
                 <a:defRPr/>
               </a:pPr>
-              <a:t>2022-07-01</a:t>
+              <a:t>2022-07-05</a:t>
             </a:fld>
             <a:endParaRPr lang="ko-KR" altLang="en-US"/>
           </a:p>
@@ -253,10 +249,6 @@
             <a:pPr lvl="0">
               <a:defRPr/>
             </a:pPr>
-            <a:r>
-              <a:rPr lang="ko-KR" altLang="en-US"/>
-              <a:t/>
-            </a:r>
             <a:endParaRPr lang="ko-KR" altLang="en-US"/>
           </a:p>
         </p:txBody>
@@ -303,6 +295,11 @@
         </p:txBody>
       </p:sp>
     </p:spTree>
+    <p:extLst>
+      <p:ext uri="{BB962C8B-B14F-4D97-AF65-F5344CB8AC3E}">
+        <p14:creationId xmlns:p14="http://schemas.microsoft.com/office/powerpoint/2010/main" val="942980620"/>
+      </p:ext>
+    </p:extLst>
   </p:cSld>
   <p:clrMap bg1="lt1" tx1="dk1" bg2="lt2" tx2="dk2" accent1="accent1" accent2="accent2" accent3="accent3" accent4="accent4" accent5="accent5" accent6="accent6" hlink="hlink" folHlink="folHlink"/>
 </p:handoutMaster>
@@ -440,7 +437,7 @@
             <a:fld id="{51E7485C-BA9C-437D-8914-F26087319FD8}" type="datetimeFigureOut">
               <a:rPr lang="ko-KR" altLang="en-US" smtClean="0"/>
               <a:pPr/>
-              <a:t>2022-06-25</a:t>
+              <a:t>2022-07-05</a:t>
             </a:fld>
             <a:endParaRPr lang="ko-KR" altLang="en-US"/>
           </a:p>
@@ -612,7 +609,7 @@
             <a:fld id="{51E7485C-BA9C-437D-8914-F26087319FD8}" type="datetimeFigureOut">
               <a:rPr lang="ko-KR" altLang="en-US" smtClean="0"/>
               <a:pPr/>
-              <a:t>2022-06-25</a:t>
+              <a:t>2022-07-05</a:t>
             </a:fld>
             <a:endParaRPr lang="ko-KR" altLang="en-US"/>
           </a:p>
@@ -794,7 +791,7 @@
             <a:fld id="{51E7485C-BA9C-437D-8914-F26087319FD8}" type="datetimeFigureOut">
               <a:rPr lang="ko-KR" altLang="en-US" smtClean="0"/>
               <a:pPr/>
-              <a:t>2022-06-25</a:t>
+              <a:t>2022-07-05</a:t>
             </a:fld>
             <a:endParaRPr lang="ko-KR" altLang="en-US"/>
           </a:p>
@@ -966,7 +963,7 @@
             <a:fld id="{51E7485C-BA9C-437D-8914-F26087319FD8}" type="datetimeFigureOut">
               <a:rPr lang="ko-KR" altLang="en-US" smtClean="0"/>
               <a:pPr/>
-              <a:t>2022-06-25</a:t>
+              <a:t>2022-07-05</a:t>
             </a:fld>
             <a:endParaRPr lang="ko-KR" altLang="en-US"/>
           </a:p>
@@ -1214,7 +1211,7 @@
             <a:fld id="{51E7485C-BA9C-437D-8914-F26087319FD8}" type="datetimeFigureOut">
               <a:rPr lang="ko-KR" altLang="en-US" smtClean="0"/>
               <a:pPr/>
-              <a:t>2022-06-25</a:t>
+              <a:t>2022-07-05</a:t>
             </a:fld>
             <a:endParaRPr lang="ko-KR" altLang="en-US"/>
           </a:p>
@@ -1448,7 +1445,7 @@
             <a:fld id="{51E7485C-BA9C-437D-8914-F26087319FD8}" type="datetimeFigureOut">
               <a:rPr lang="ko-KR" altLang="en-US" smtClean="0"/>
               <a:pPr/>
-              <a:t>2022-06-25</a:t>
+              <a:t>2022-07-05</a:t>
             </a:fld>
             <a:endParaRPr lang="ko-KR" altLang="en-US"/>
           </a:p>
@@ -1817,7 +1814,7 @@
             <a:fld id="{51E7485C-BA9C-437D-8914-F26087319FD8}" type="datetimeFigureOut">
               <a:rPr lang="ko-KR" altLang="en-US" smtClean="0"/>
               <a:pPr/>
-              <a:t>2022-06-25</a:t>
+              <a:t>2022-07-05</a:t>
             </a:fld>
             <a:endParaRPr lang="ko-KR" altLang="en-US"/>
           </a:p>
@@ -1937,7 +1934,7 @@
             <a:fld id="{51E7485C-BA9C-437D-8914-F26087319FD8}" type="datetimeFigureOut">
               <a:rPr lang="ko-KR" altLang="en-US" smtClean="0"/>
               <a:pPr/>
-              <a:t>2022-06-25</a:t>
+              <a:t>2022-07-05</a:t>
             </a:fld>
             <a:endParaRPr lang="ko-KR" altLang="en-US"/>
           </a:p>
@@ -2034,7 +2031,7 @@
             <a:fld id="{51E7485C-BA9C-437D-8914-F26087319FD8}" type="datetimeFigureOut">
               <a:rPr lang="ko-KR" altLang="en-US" smtClean="0"/>
               <a:pPr/>
-              <a:t>2022-06-25</a:t>
+              <a:t>2022-07-05</a:t>
             </a:fld>
             <a:endParaRPr lang="ko-KR" altLang="en-US"/>
           </a:p>
@@ -2313,7 +2310,7 @@
             <a:fld id="{51E7485C-BA9C-437D-8914-F26087319FD8}" type="datetimeFigureOut">
               <a:rPr lang="ko-KR" altLang="en-US" smtClean="0"/>
               <a:pPr/>
-              <a:t>2022-06-25</a:t>
+              <a:t>2022-07-05</a:t>
             </a:fld>
             <a:endParaRPr lang="ko-KR" altLang="en-US"/>
           </a:p>
@@ -2568,7 +2565,7 @@
             <a:fld id="{51E7485C-BA9C-437D-8914-F26087319FD8}" type="datetimeFigureOut">
               <a:rPr lang="ko-KR" altLang="en-US" smtClean="0"/>
               <a:pPr/>
-              <a:t>2022-06-25</a:t>
+              <a:t>2022-07-05</a:t>
             </a:fld>
             <a:endParaRPr lang="ko-KR" altLang="en-US"/>
           </a:p>
@@ -2786,7 +2783,7 @@
             <a:fld id="{51E7485C-BA9C-437D-8914-F26087319FD8}" type="datetimeFigureOut">
               <a:rPr lang="ko-KR" altLang="en-US" smtClean="0"/>
               <a:pPr/>
-              <a:t>2022-06-25</a:t>
+              <a:t>2022-07-05</a:t>
             </a:fld>
             <a:endParaRPr lang="ko-KR" altLang="en-US"/>
           </a:p>
@@ -5574,70 +5571,6 @@
           </a:p>
         </p:txBody>
       </p:sp>
-      <p:pic>
-        <p:nvPicPr>
-          <p:cNvPr id="1043" name="Picture 19"/>
-          <p:cNvPicPr>
-            <a:picLocks noChangeAspect="1" noChangeArrowheads="1"/>
-          </p:cNvPicPr>
-          <p:nvPr/>
-        </p:nvPicPr>
-        <p:blipFill>
-          <a:blip r:embed="rId3" cstate="print">
-            <a:extLst>
-              <a:ext uri="{28A0092B-C50C-407E-A947-70E740481C1C}">
-                <a14:useLocalDpi xmlns:a14="http://schemas.microsoft.com/office/drawing/2010/main" val="0"/>
-              </a:ext>
-            </a:extLst>
-          </a:blip>
-          <a:srcRect/>
-          <a:stretch>
-            <a:fillRect/>
-          </a:stretch>
-        </p:blipFill>
-        <p:spPr bwMode="auto">
-          <a:xfrm>
-            <a:off x="8472327" y="4620609"/>
-            <a:ext cx="2487613" cy="319499"/>
-          </a:xfrm>
-          <a:prstGeom prst="rect">
-            <a:avLst/>
-          </a:prstGeom>
-          <a:noFill/>
-          <a:ln>
-            <a:noFill/>
-          </a:ln>
-          <a:effectLst/>
-          <a:extLst>
-            <a:ext uri="{909E8E84-426E-40DD-AFC4-6F175D3DCCD1}">
-              <a14:hiddenFill xmlns:a14="http://schemas.microsoft.com/office/drawing/2010/main">
-                <a:solidFill>
-                  <a:schemeClr val="accent1"/>
-                </a:solidFill>
-              </a14:hiddenFill>
-            </a:ext>
-            <a:ext uri="{91240B29-F687-4F45-9708-019B960494DF}">
-              <a14:hiddenLine xmlns:a14="http://schemas.microsoft.com/office/drawing/2010/main" w="9525">
-                <a:solidFill>
-                  <a:schemeClr val="tx1"/>
-                </a:solidFill>
-                <a:miter lim="800000"/>
-                <a:headEnd/>
-                <a:tailEnd/>
-              </a14:hiddenLine>
-            </a:ext>
-            <a:ext uri="{AF507438-7753-43E0-B8FC-AC1667EBCBE1}">
-              <a14:hiddenEffects xmlns:a14="http://schemas.microsoft.com/office/drawing/2010/main">
-                <a:effectLst>
-                  <a:outerShdw dist="35921" dir="2700000" algn="ctr" rotWithShape="0">
-                    <a:schemeClr val="bg2"/>
-                  </a:outerShdw>
-                </a:effectLst>
-              </a14:hiddenEffects>
-            </a:ext>
-          </a:extLst>
-        </p:spPr>
-      </p:pic>
       <p:sp>
         <p:nvSpPr>
           <p:cNvPr id="5" name="직사각형 4"/>
@@ -5837,7 +5770,7 @@
         </p:nvSpPr>
         <p:spPr>
           <a:xfrm>
-            <a:off x="3319660" y="5796358"/>
+            <a:off x="4217000" y="5796358"/>
             <a:ext cx="3571593" cy="950277"/>
           </a:xfrm>
           <a:prstGeom prst="rect">
@@ -5891,47 +5824,6 @@
           </a:p>
         </p:txBody>
       </p:sp>
-      <p:pic>
-        <p:nvPicPr>
-          <p:cNvPr id="2" name="Picture 2" descr="C:\Users\jae99\Downloads\2021_Login_with_naver_guidelines_Kr\btnG_완성형.png"/>
-          <p:cNvPicPr>
-            <a:picLocks noChangeAspect="1" noChangeArrowheads="1"/>
-          </p:cNvPicPr>
-          <p:nvPr/>
-        </p:nvPicPr>
-        <p:blipFill>
-          <a:blip r:embed="rId4">
-            <a:extLst>
-              <a:ext uri="{28A0092B-C50C-407E-A947-70E740481C1C}">
-                <a14:useLocalDpi xmlns:a14="http://schemas.microsoft.com/office/drawing/2010/main" val="0"/>
-              </a:ext>
-            </a:extLst>
-          </a:blip>
-          <a:srcRect/>
-          <a:stretch>
-            <a:fillRect/>
-          </a:stretch>
-        </p:blipFill>
-        <p:spPr bwMode="auto">
-          <a:xfrm>
-            <a:off x="8003994" y="5069663"/>
-            <a:ext cx="3569140" cy="951770"/>
-          </a:xfrm>
-          <a:prstGeom prst="rect">
-            <a:avLst/>
-          </a:prstGeom>
-          <a:noFill/>
-          <a:extLst>
-            <a:ext uri="{909E8E84-426E-40DD-AFC4-6F175D3DCCD1}">
-              <a14:hiddenFill xmlns:a14="http://schemas.microsoft.com/office/drawing/2010/main">
-                <a:solidFill>
-                  <a:srgbClr val="FFFFFF"/>
-                </a:solidFill>
-              </a14:hiddenFill>
-            </a:ext>
-          </a:extLst>
-        </p:spPr>
-      </p:pic>
       <p:sp>
         <p:nvSpPr>
           <p:cNvPr id="13" name="직사각형 12"/>
@@ -5989,7 +5881,7 @@
         </p:nvSpPr>
         <p:spPr>
           <a:xfrm>
-            <a:off x="3319660" y="4691458"/>
+            <a:off x="4217000" y="4691458"/>
             <a:ext cx="3571593" cy="950277"/>
           </a:xfrm>
           <a:prstGeom prst="rect">
@@ -6040,6 +5932,256 @@
           </a:p>
         </p:txBody>
       </p:sp>
+      <p:sp>
+        <p:nvSpPr>
+          <p:cNvPr id="15" name="직사각형 14"/>
+          <p:cNvSpPr/>
+          <p:nvPr/>
+        </p:nvSpPr>
+        <p:spPr>
+          <a:xfrm>
+            <a:off x="356200" y="5796358"/>
+            <a:ext cx="3571593" cy="950277"/>
+          </a:xfrm>
+          <a:prstGeom prst="rect">
+            <a:avLst/>
+          </a:prstGeom>
+          <a:solidFill>
+            <a:schemeClr val="accent3">
+              <a:lumMod val="60000"/>
+              <a:lumOff val="40000"/>
+            </a:schemeClr>
+          </a:solidFill>
+          <a:ln>
+            <a:noFill/>
+          </a:ln>
+        </p:spPr>
+        <p:style>
+          <a:lnRef idx="2">
+            <a:schemeClr val="accent1">
+              <a:shade val="50000"/>
+            </a:schemeClr>
+          </a:lnRef>
+          <a:fillRef idx="1">
+            <a:schemeClr val="accent1"/>
+          </a:fillRef>
+          <a:effectRef idx="0">
+            <a:schemeClr val="accent1"/>
+          </a:effectRef>
+          <a:fontRef idx="minor">
+            <a:schemeClr val="lt1"/>
+          </a:fontRef>
+        </p:style>
+        <p:txBody>
+          <a:bodyPr rtlCol="0" anchor="ctr"/>
+          <a:lstStyle/>
+          <a:p>
+            <a:pPr algn="ctr"/>
+            <a:r>
+              <a:rPr lang="ko-KR" altLang="en-US" sz="4400" smtClean="0">
+                <a:latin typeface="HY동녘M" panose="02030600000101010101" pitchFamily="18" charset="-127"/>
+                <a:ea typeface="HY동녘M" panose="02030600000101010101" pitchFamily="18" charset="-127"/>
+              </a:rPr>
+              <a:t>마이페이지</a:t>
+            </a:r>
+            <a:endParaRPr lang="ko-KR" altLang="en-US" sz="4400">
+              <a:latin typeface="HY동녘M" panose="02030600000101010101" pitchFamily="18" charset="-127"/>
+              <a:ea typeface="HY동녘M" panose="02030600000101010101" pitchFamily="18" charset="-127"/>
+            </a:endParaRPr>
+          </a:p>
+        </p:txBody>
+      </p:sp>
+      <p:sp>
+        <p:nvSpPr>
+          <p:cNvPr id="3" name="TextBox 2"/>
+          <p:cNvSpPr txBox="1"/>
+          <p:nvPr/>
+        </p:nvSpPr>
+        <p:spPr>
+          <a:xfrm>
+            <a:off x="8715436" y="5345078"/>
+            <a:ext cx="2672398" cy="400110"/>
+          </a:xfrm>
+          <a:prstGeom prst="rect">
+            <a:avLst/>
+          </a:prstGeom>
+          <a:noFill/>
+        </p:spPr>
+        <p:txBody>
+          <a:bodyPr wrap="square" rtlCol="0">
+            <a:spAutoFit/>
+          </a:bodyPr>
+          <a:lstStyle/>
+          <a:p>
+            <a:r>
+              <a:rPr lang="ko-KR" altLang="en-US" sz="2000" smtClean="0">
+                <a:latin typeface="HY동녘M" panose="02030600000101010101" pitchFamily="18" charset="-127"/>
+                <a:ea typeface="HY동녘M" panose="02030600000101010101" pitchFamily="18" charset="-127"/>
+              </a:rPr>
+              <a:t>네이버로 로그인 하기</a:t>
+            </a:r>
+            <a:endParaRPr lang="ko-KR" altLang="en-US" sz="2000">
+              <a:latin typeface="HY동녘M" panose="02030600000101010101" pitchFamily="18" charset="-127"/>
+              <a:ea typeface="HY동녘M" panose="02030600000101010101" pitchFamily="18" charset="-127"/>
+            </a:endParaRPr>
+          </a:p>
+        </p:txBody>
+      </p:sp>
+      <p:pic>
+        <p:nvPicPr>
+          <p:cNvPr id="1027" name="Picture 3" descr="C:\Users\jae99\Downloads\google.png"/>
+          <p:cNvPicPr>
+            <a:picLocks noChangeAspect="1" noChangeArrowheads="1"/>
+          </p:cNvPicPr>
+          <p:nvPr/>
+        </p:nvPicPr>
+        <p:blipFill>
+          <a:blip r:embed="rId3" cstate="print">
+            <a:extLst>
+              <a:ext uri="{28A0092B-C50C-407E-A947-70E740481C1C}">
+                <a14:useLocalDpi xmlns:a14="http://schemas.microsoft.com/office/drawing/2010/main" val="0"/>
+              </a:ext>
+            </a:extLst>
+          </a:blip>
+          <a:srcRect/>
+          <a:stretch>
+            <a:fillRect/>
+          </a:stretch>
+        </p:blipFill>
+        <p:spPr bwMode="auto">
+          <a:xfrm>
+            <a:off x="8307716" y="4632811"/>
+            <a:ext cx="295096" cy="295096"/>
+          </a:xfrm>
+          <a:prstGeom prst="rect">
+            <a:avLst/>
+          </a:prstGeom>
+          <a:noFill/>
+          <a:extLst>
+            <a:ext uri="{909E8E84-426E-40DD-AFC4-6F175D3DCCD1}">
+              <a14:hiddenFill xmlns:a14="http://schemas.microsoft.com/office/drawing/2010/main">
+                <a:solidFill>
+                  <a:srgbClr val="FFFFFF"/>
+                </a:solidFill>
+              </a14:hiddenFill>
+            </a:ext>
+          </a:extLst>
+        </p:spPr>
+      </p:pic>
+      <p:sp>
+        <p:nvSpPr>
+          <p:cNvPr id="21" name="TextBox 20"/>
+          <p:cNvSpPr txBox="1"/>
+          <p:nvPr/>
+        </p:nvSpPr>
+        <p:spPr>
+          <a:xfrm>
+            <a:off x="8981406" y="4580304"/>
+            <a:ext cx="2406428" cy="400110"/>
+          </a:xfrm>
+          <a:prstGeom prst="rect">
+            <a:avLst/>
+          </a:prstGeom>
+          <a:noFill/>
+        </p:spPr>
+        <p:txBody>
+          <a:bodyPr wrap="none" rtlCol="0">
+            <a:spAutoFit/>
+          </a:bodyPr>
+          <a:lstStyle/>
+          <a:p>
+            <a:r>
+              <a:rPr lang="ko-KR" altLang="en-US" sz="2000" smtClean="0">
+                <a:latin typeface="HY동녘M" panose="02030600000101010101" pitchFamily="18" charset="-127"/>
+                <a:ea typeface="HY동녘M" panose="02030600000101010101" pitchFamily="18" charset="-127"/>
+              </a:rPr>
+              <a:t>구</a:t>
+            </a:r>
+            <a:r>
+              <a:rPr lang="ko-KR" altLang="en-US" sz="2000">
+                <a:latin typeface="HY동녘M" panose="02030600000101010101" pitchFamily="18" charset="-127"/>
+                <a:ea typeface="HY동녘M" panose="02030600000101010101" pitchFamily="18" charset="-127"/>
+              </a:rPr>
+              <a:t>글</a:t>
+            </a:r>
+            <a:r>
+              <a:rPr lang="ko-KR" altLang="en-US" sz="2000" smtClean="0">
+                <a:latin typeface="HY동녘M" panose="02030600000101010101" pitchFamily="18" charset="-127"/>
+                <a:ea typeface="HY동녘M" panose="02030600000101010101" pitchFamily="18" charset="-127"/>
+              </a:rPr>
+              <a:t>로 로그인 하기</a:t>
+            </a:r>
+            <a:endParaRPr lang="ko-KR" altLang="en-US" sz="2000">
+              <a:latin typeface="HY동녘M" panose="02030600000101010101" pitchFamily="18" charset="-127"/>
+              <a:ea typeface="HY동녘M" panose="02030600000101010101" pitchFamily="18" charset="-127"/>
+            </a:endParaRPr>
+          </a:p>
+        </p:txBody>
+      </p:sp>
+      <p:pic>
+        <p:nvPicPr>
+          <p:cNvPr id="1029" name="Picture 5"/>
+          <p:cNvPicPr>
+            <a:picLocks noChangeAspect="1" noChangeArrowheads="1"/>
+          </p:cNvPicPr>
+          <p:nvPr/>
+        </p:nvPicPr>
+        <p:blipFill>
+          <a:blip r:embed="rId4" cstate="print">
+            <a:extLst>
+              <a:ext uri="{28A0092B-C50C-407E-A947-70E740481C1C}">
+                <a14:useLocalDpi xmlns:a14="http://schemas.microsoft.com/office/drawing/2010/main" val="0"/>
+              </a:ext>
+            </a:extLst>
+          </a:blip>
+          <a:srcRect/>
+          <a:stretch>
+            <a:fillRect/>
+          </a:stretch>
+        </p:blipFill>
+        <p:spPr bwMode="auto">
+          <a:xfrm>
+            <a:off x="8332397" y="5415279"/>
+            <a:ext cx="245734" cy="260536"/>
+          </a:xfrm>
+          <a:prstGeom prst="rect">
+            <a:avLst/>
+          </a:prstGeom>
+          <a:noFill/>
+          <a:ln>
+            <a:noFill/>
+          </a:ln>
+          <a:effectLst/>
+          <a:extLst>
+            <a:ext uri="{909E8E84-426E-40DD-AFC4-6F175D3DCCD1}">
+              <a14:hiddenFill xmlns:a14="http://schemas.microsoft.com/office/drawing/2010/main">
+                <a:solidFill>
+                  <a:schemeClr val="accent1"/>
+                </a:solidFill>
+              </a14:hiddenFill>
+            </a:ext>
+            <a:ext uri="{91240B29-F687-4F45-9708-019B960494DF}">
+              <a14:hiddenLine xmlns:a14="http://schemas.microsoft.com/office/drawing/2010/main" w="9525">
+                <a:solidFill>
+                  <a:schemeClr val="tx1"/>
+                </a:solidFill>
+                <a:miter lim="800000"/>
+                <a:headEnd/>
+                <a:tailEnd/>
+              </a14:hiddenLine>
+            </a:ext>
+            <a:ext uri="{AF507438-7753-43E0-B8FC-AC1667EBCBE1}">
+              <a14:hiddenEffects xmlns:a14="http://schemas.microsoft.com/office/drawing/2010/main">
+                <a:effectLst>
+                  <a:outerShdw dist="35921" dir="2700000" algn="ctr" rotWithShape="0">
+                    <a:schemeClr val="bg2"/>
+                  </a:outerShdw>
+                </a:effectLst>
+              </a14:hiddenEffects>
+            </a:ext>
+          </a:extLst>
+        </p:spPr>
+      </p:pic>
     </p:spTree>
     <p:extLst>
       <p:ext uri="{BB962C8B-B14F-4D97-AF65-F5344CB8AC3E}">
@@ -9604,7 +9746,7 @@
 </file>
 
 <file path=ppt/slides/slide3.xml><?xml version="1.0" encoding="utf-8"?>
-<p:sld xmlns:r="http://schemas.openxmlformats.org/officeDocument/2006/relationships" xmlns:c="http://schemas.openxmlformats.org/drawingml/2006/chart" xmlns:a="http://schemas.openxmlformats.org/drawingml/2006/main" xmlns:dgm="http://schemas.openxmlformats.org/drawingml/2006/diagram" xmlns:dsp="http://schemas.microsoft.com/office/drawing/2008/diagram" xmlns:p="http://schemas.openxmlformats.org/presentationml/2006/main">
+<p:sld xmlns:a="http://schemas.openxmlformats.org/drawingml/2006/main" xmlns:r="http://schemas.openxmlformats.org/officeDocument/2006/relationships" xmlns:p="http://schemas.openxmlformats.org/presentationml/2006/main">
   <p:cSld>
     <p:spTree>
       <p:nvGrpSpPr>
@@ -9626,11 +9768,17 @@
           <p:cNvGraphicFramePr>
             <a:graphicFrameLocks noGrp="1"/>
           </p:cNvGraphicFramePr>
-          <p:nvPr/>
+          <p:nvPr>
+            <p:extLst>
+              <p:ext uri="{D42A27DB-BD31-4B8C-83A1-F6EECF244321}">
+                <p14:modId xmlns:p14="http://schemas.microsoft.com/office/powerpoint/2010/main" val="2485256084"/>
+              </p:ext>
+            </p:extLst>
+          </p:nvPr>
         </p:nvGraphicFramePr>
         <p:xfrm>
           <a:off x="2614970" y="2878701"/>
-          <a:ext cx="1365490" cy="1557708"/>
+          <a:ext cx="1365490" cy="1547040"/>
         </p:xfrm>
         <a:graphic>
           <a:graphicData uri="http://schemas.openxmlformats.org/drawingml/2006/table">
@@ -9642,7 +9790,8 @@
               <a:tr h="221156">
                 <a:tc>
                   <a:txBody>
-                    <a:bodyPr vert="horz" lIns="64933" tIns="17952" rIns="64933" bIns="17952" anchor="ctr" anchorCtr="0"/>
+                    <a:bodyPr/>
+                    <a:lstStyle/>
                     <a:p>
                       <a:pPr marL="0" marR="0" indent="0" algn="ctr" latinLnBrk="0">
                         <a:lnSpc>
@@ -9659,20 +9808,13 @@
                       <a:r>
                         <a:rPr lang="en-US" altLang="ko-KR" sz="800" b="1" kern="0" spc="0">
                           <a:solidFill>
-                            <a:srgbClr val="315f97"/>
+                            <a:srgbClr val="315F97"/>
                           </a:solidFill>
                           <a:effectLst/>
                           <a:ea typeface="맑은 고딕"/>
                         </a:rPr>
                         <a:t>MEMBER</a:t>
                       </a:r>
-                      <a:endParaRPr lang="en-US" altLang="ko-KR" sz="800" b="1" kern="0" spc="0">
-                        <a:solidFill>
-                          <a:srgbClr val="315f97"/>
-                        </a:solidFill>
-                        <a:effectLst/>
-                        <a:ea typeface="맑은 고딕"/>
-                      </a:endParaRPr>
                     </a:p>
                   </a:txBody>
                   <a:tcPr marL="64933" marR="64933" marT="17952" marB="17952" anchor="ctr">
@@ -9710,7 +9852,8 @@
               <a:tr h="929407">
                 <a:tc>
                   <a:txBody>
-                    <a:bodyPr vert="horz" lIns="64933" tIns="17952" rIns="64933" bIns="17952" anchor="ctr" anchorCtr="0"/>
+                    <a:bodyPr/>
+                    <a:lstStyle/>
                     <a:p>
                       <a:pPr marL="0" marR="0" indent="0" algn="l" defTabSz="914400" rtl="0" eaLnBrk="1" latinLnBrk="1" hangingPunct="1">
                         <a:lnSpc>
@@ -9728,7 +9871,7 @@
                         <a:defRPr/>
                       </a:pPr>
                       <a:r>
-                        <a:rPr lang="en-US" altLang="ko-KR" sz="600" b="1" kern="1200">
+                        <a:rPr lang="en-US" altLang="ko-KR" sz="600" b="1" kern="1200" smtClean="0">
                           <a:solidFill>
                             <a:schemeClr val="tx1"/>
                           </a:solidFill>
@@ -9737,17 +9880,20 @@
                           <a:ea typeface="+mn-ea"/>
                           <a:cs typeface="+mn-cs"/>
                         </a:rPr>
-                        <a:t>USER_ID : BIGINT (PK)</a:t>
-                      </a:r>
-                      <a:endParaRPr lang="en-US" altLang="ko-KR" sz="600" b="1" kern="1200">
-                        <a:solidFill>
-                          <a:schemeClr val="tx1"/>
-                        </a:solidFill>
-                        <a:effectLst/>
-                        <a:latin typeface="+mn-lt"/>
-                        <a:ea typeface="+mn-ea"/>
-                        <a:cs typeface="+mn-cs"/>
-                      </a:endParaRPr>
+                        <a:t>MEMBER_ID </a:t>
+                      </a:r>
+                      <a:r>
+                        <a:rPr lang="en-US" altLang="ko-KR" sz="600" b="1" kern="1200">
+                          <a:solidFill>
+                            <a:schemeClr val="tx1"/>
+                          </a:solidFill>
+                          <a:effectLst/>
+                          <a:latin typeface="+mn-lt"/>
+                          <a:ea typeface="+mn-ea"/>
+                          <a:cs typeface="+mn-cs"/>
+                        </a:rPr>
+                        <a:t>: BIGINT (PK)</a:t>
+                      </a:r>
                     </a:p>
                     <a:p>
                       <a:pPr algn="l" latinLnBrk="1">
@@ -9765,15 +9911,6 @@
                         </a:rPr>
                         <a:t>EMAIL : VARCHAR(255)</a:t>
                       </a:r>
-                      <a:endParaRPr lang="en-US" altLang="ko-KR" sz="600" kern="1200" baseline="0">
-                        <a:solidFill>
-                          <a:schemeClr val="tx1"/>
-                        </a:solidFill>
-                        <a:effectLst/>
-                        <a:latin typeface="+mn-lt"/>
-                        <a:ea typeface="+mn-ea"/>
-                        <a:cs typeface="+mn-cs"/>
-                      </a:endParaRPr>
                     </a:p>
                     <a:p>
                       <a:pPr algn="l" latinLnBrk="1">
@@ -9791,15 +9928,6 @@
                         </a:rPr>
                         <a:t>PASSWORD : VARCHAR(255)</a:t>
                       </a:r>
-                      <a:endParaRPr lang="en-US" altLang="ko-KR" sz="600" kern="1200" baseline="0">
-                        <a:solidFill>
-                          <a:schemeClr val="tx1"/>
-                        </a:solidFill>
-                        <a:effectLst/>
-                        <a:latin typeface="+mn-lt"/>
-                        <a:ea typeface="+mn-ea"/>
-                        <a:cs typeface="+mn-cs"/>
-                      </a:endParaRPr>
                     </a:p>
                     <a:p>
                       <a:pPr algn="l" latinLnBrk="1">
@@ -9817,15 +9945,6 @@
                         </a:rPr>
                         <a:t>NICKNAME : VARCHAR(255)</a:t>
                       </a:r>
-                      <a:endParaRPr lang="en-US" altLang="ko-KR" sz="600" kern="1200" baseline="0">
-                        <a:solidFill>
-                          <a:schemeClr val="tx1"/>
-                        </a:solidFill>
-                        <a:effectLst/>
-                        <a:latin typeface="+mn-lt"/>
-                        <a:ea typeface="+mn-ea"/>
-                        <a:cs typeface="+mn-cs"/>
-                      </a:endParaRPr>
                     </a:p>
                     <a:p>
                       <a:pPr algn="l" latinLnBrk="1">
@@ -9843,15 +9962,6 @@
                         </a:rPr>
                         <a:t>USERNAME : VARCHAR(255)</a:t>
                       </a:r>
-                      <a:endParaRPr lang="en-US" altLang="ko-KR" sz="600" kern="1200" baseline="0">
-                        <a:solidFill>
-                          <a:schemeClr val="tx1"/>
-                        </a:solidFill>
-                        <a:effectLst/>
-                        <a:latin typeface="+mn-lt"/>
-                        <a:ea typeface="+mn-ea"/>
-                        <a:cs typeface="+mn-cs"/>
-                      </a:endParaRPr>
                     </a:p>
                     <a:p>
                       <a:pPr algn="l" latinLnBrk="1">
@@ -9869,15 +9979,6 @@
                         </a:rPr>
                         <a:t>GENDER : ENUM(“MALE”,”FEMALE”)</a:t>
                       </a:r>
-                      <a:endParaRPr lang="en-US" altLang="ko-KR" sz="600" kern="1200" baseline="0">
-                        <a:solidFill>
-                          <a:schemeClr val="tx1"/>
-                        </a:solidFill>
-                        <a:effectLst/>
-                        <a:latin typeface="+mn-lt"/>
-                        <a:ea typeface="+mn-ea"/>
-                        <a:cs typeface="+mn-cs"/>
-                      </a:endParaRPr>
                     </a:p>
                     <a:p>
                       <a:pPr algn="l" latinLnBrk="1">
@@ -9895,15 +9996,6 @@
                         </a:rPr>
                         <a:t>BIRTH_DATE : DATETIME</a:t>
                       </a:r>
-                      <a:endParaRPr lang="en-US" altLang="ko-KR" sz="600" kern="1200" baseline="0">
-                        <a:solidFill>
-                          <a:schemeClr val="tx1"/>
-                        </a:solidFill>
-                        <a:effectLst/>
-                        <a:latin typeface="+mn-lt"/>
-                        <a:ea typeface="+mn-ea"/>
-                        <a:cs typeface="+mn-cs"/>
-                      </a:endParaRPr>
                     </a:p>
                     <a:p>
                       <a:pPr algn="l" latinLnBrk="1">
@@ -9933,15 +10025,6 @@
                         </a:rPr>
                         <a:t>VARCHAR(255)</a:t>
                       </a:r>
-                      <a:endParaRPr lang="en-US" altLang="ko-KR" sz="600" kern="1200" baseline="0">
-                        <a:solidFill>
-                          <a:schemeClr val="tx1"/>
-                        </a:solidFill>
-                        <a:effectLst/>
-                        <a:latin typeface="+mn-lt"/>
-                        <a:ea typeface="+mn-ea"/>
-                        <a:cs typeface="+mn-cs"/>
-                      </a:endParaRPr>
                     </a:p>
                     <a:p>
                       <a:pPr algn="l" latinLnBrk="1">
@@ -9959,15 +10042,6 @@
                         </a:rPr>
                         <a:t>STREET : VARCHAR(255)</a:t>
                       </a:r>
-                      <a:endParaRPr lang="en-US" altLang="ko-KR" sz="600" kern="1200" baseline="0">
-                        <a:solidFill>
-                          <a:schemeClr val="tx1"/>
-                        </a:solidFill>
-                        <a:effectLst/>
-                        <a:latin typeface="+mn-lt"/>
-                        <a:ea typeface="+mn-ea"/>
-                        <a:cs typeface="+mn-cs"/>
-                      </a:endParaRPr>
                     </a:p>
                     <a:p>
                       <a:pPr algn="l" latinLnBrk="1">
@@ -9985,15 +10059,6 @@
                         </a:rPr>
                         <a:t>ROLE : ENUM(”USER”,”ADMIN”)</a:t>
                       </a:r>
-                      <a:endParaRPr lang="en-US" altLang="ko-KR" sz="600" kern="1200" baseline="0">
-                        <a:solidFill>
-                          <a:schemeClr val="tx1"/>
-                        </a:solidFill>
-                        <a:effectLst/>
-                        <a:latin typeface="+mn-lt"/>
-                        <a:ea typeface="+mn-ea"/>
-                        <a:cs typeface="+mn-cs"/>
-                      </a:endParaRPr>
                     </a:p>
                     <a:p>
                       <a:pPr algn="l" latinLnBrk="1">
@@ -10035,15 +10100,6 @@
                         </a:rPr>
                         <a:t>DATETIME</a:t>
                       </a:r>
-                      <a:endParaRPr lang="en-US" altLang="ko-KR" sz="600" kern="1200" baseline="0">
-                        <a:solidFill>
-                          <a:schemeClr val="tx1"/>
-                        </a:solidFill>
-                        <a:effectLst/>
-                        <a:latin typeface="+mn-lt"/>
-                        <a:ea typeface="+mn-ea"/>
-                        <a:cs typeface="+mn-cs"/>
-                      </a:endParaRPr>
                     </a:p>
                     <a:p>
                       <a:pPr algn="l" latinLnBrk="1">
@@ -10073,15 +10129,6 @@
                         </a:rPr>
                         <a:t>DATETIME</a:t>
                       </a:r>
-                      <a:endParaRPr lang="en-US" altLang="ko-KR" sz="600" kern="1200" baseline="0">
-                        <a:solidFill>
-                          <a:schemeClr val="tx1"/>
-                        </a:solidFill>
-                        <a:effectLst/>
-                        <a:latin typeface="+mn-lt"/>
-                        <a:ea typeface="+mn-ea"/>
-                        <a:cs typeface="+mn-cs"/>
-                      </a:endParaRPr>
                     </a:p>
                     <a:p>
                       <a:pPr algn="l" latinLnBrk="1">
@@ -10099,15 +10146,6 @@
                         </a:rPr>
                         <a:t>TERMS_AGREE_DATE : DATETIME</a:t>
                       </a:r>
-                      <a:endParaRPr lang="en-US" altLang="ko-KR" sz="600" kern="1200" baseline="0">
-                        <a:solidFill>
-                          <a:schemeClr val="tx1"/>
-                        </a:solidFill>
-                        <a:effectLst/>
-                        <a:latin typeface="+mn-lt"/>
-                        <a:ea typeface="+mn-ea"/>
-                        <a:cs typeface="+mn-cs"/>
-                      </a:endParaRPr>
                     </a:p>
                   </a:txBody>
                   <a:tcPr marL="64933" marR="64933" marT="17952" marB="17952" anchor="ctr">
@@ -10168,7 +10206,8 @@
               <a:tr h="244124">
                 <a:tc>
                   <a:txBody>
-                    <a:bodyPr vert="horz" lIns="64933" tIns="17952" rIns="64933" bIns="17952" anchor="ctr" anchorCtr="0"/>
+                    <a:bodyPr/>
+                    <a:lstStyle/>
                     <a:p>
                       <a:pPr marL="0" marR="0" indent="0" algn="ctr" latinLnBrk="0">
                         <a:lnSpc>
@@ -10185,7 +10224,7 @@
                       <a:r>
                         <a:rPr lang="en-US" altLang="ko-KR" sz="800" b="1" kern="0" spc="0">
                           <a:solidFill>
-                            <a:srgbClr val="315f97"/>
+                            <a:srgbClr val="315F97"/>
                           </a:solidFill>
                           <a:effectLst/>
                           <a:ea typeface="맑은 고딕"/>
@@ -10194,7 +10233,7 @@
                       </a:r>
                       <a:endParaRPr lang="en-US" altLang="ko-KR" sz="800" b="1" kern="0" spc="0">
                         <a:solidFill>
-                          <a:srgbClr val="315f97"/>
+                          <a:srgbClr val="315F97"/>
                         </a:solidFill>
                         <a:ea typeface="맑은 고딕"/>
                       </a:endParaRPr>
@@ -10235,7 +10274,8 @@
               <a:tr h="479956">
                 <a:tc>
                   <a:txBody>
-                    <a:bodyPr vert="horz" lIns="64933" tIns="17952" rIns="64933" bIns="17952" anchor="ctr" anchorCtr="0"/>
+                    <a:bodyPr/>
+                    <a:lstStyle/>
                     <a:p>
                       <a:pPr marL="0" marR="0" indent="0" algn="l" defTabSz="914400" rtl="0" eaLnBrk="1" latinLnBrk="1" hangingPunct="1">
                         <a:lnSpc>
@@ -10264,15 +10304,6 @@
                         </a:rPr>
                         <a:t>CATEGORY_ID : BIGINT (FK)</a:t>
                       </a:r>
-                      <a:endParaRPr lang="en-US" altLang="ko-KR" sz="600" b="1" kern="1200">
-                        <a:solidFill>
-                          <a:schemeClr val="tx1"/>
-                        </a:solidFill>
-                        <a:effectLst/>
-                        <a:latin typeface="+mn-lt"/>
-                        <a:ea typeface="+mn-ea"/>
-                        <a:cs typeface="+mn-cs"/>
-                      </a:endParaRPr>
                     </a:p>
                     <a:p>
                       <a:pPr marL="0" marR="0" indent="0" algn="l" defTabSz="914400" rtl="0" eaLnBrk="1" latinLnBrk="1" hangingPunct="1">
@@ -10359,7 +10390,7 @@
         </p:nvGraphicFramePr>
         <p:xfrm>
           <a:off x="1511265" y="1289640"/>
-          <a:ext cx="1168313" cy="729033"/>
+          <a:ext cx="1168313" cy="724080"/>
         </p:xfrm>
         <a:graphic>
           <a:graphicData uri="http://schemas.openxmlformats.org/drawingml/2006/table">
@@ -10371,7 +10402,8 @@
               <a:tr h="126618">
                 <a:tc>
                   <a:txBody>
-                    <a:bodyPr vert="horz" lIns="64933" tIns="17952" rIns="64933" bIns="17952" anchor="ctr" anchorCtr="0"/>
+                    <a:bodyPr/>
+                    <a:lstStyle/>
                     <a:p>
                       <a:pPr marL="0" marR="0" indent="0" algn="ctr" latinLnBrk="0">
                         <a:lnSpc>
@@ -10388,7 +10420,7 @@
                       <a:r>
                         <a:rPr lang="en-US" altLang="ko-KR" sz="800" b="1" kern="0" spc="0">
                           <a:solidFill>
-                            <a:srgbClr val="315f97"/>
+                            <a:srgbClr val="315F97"/>
                           </a:solidFill>
                           <a:effectLst/>
                           <a:ea typeface="맑은 고딕"/>
@@ -10438,7 +10470,8 @@
               <a:tr h="454107">
                 <a:tc>
                   <a:txBody>
-                    <a:bodyPr vert="horz" lIns="64933" tIns="17952" rIns="64933" bIns="17952" anchor="ctr" anchorCtr="0"/>
+                    <a:bodyPr/>
+                    <a:lstStyle/>
                     <a:p>
                       <a:pPr marL="0" marR="0" indent="0" algn="l" defTabSz="914400" rtl="0" eaLnBrk="1" latinLnBrk="1" hangingPunct="1">
                         <a:lnSpc>
@@ -10467,15 +10500,6 @@
                         </a:rPr>
                         <a:t>DELIVERY_ID : BIGINT (PK)</a:t>
                       </a:r>
-                      <a:endParaRPr lang="en-US" altLang="ko-KR" sz="600" b="1" kern="1200">
-                        <a:solidFill>
-                          <a:schemeClr val="tx1"/>
-                        </a:solidFill>
-                        <a:effectLst/>
-                        <a:latin typeface="+mn-lt"/>
-                        <a:ea typeface="+mn-ea"/>
-                        <a:cs typeface="+mn-cs"/>
-                      </a:endParaRPr>
                     </a:p>
                     <a:p>
                       <a:pPr algn="l" latinLnBrk="1">
@@ -10505,15 +10529,6 @@
                         </a:rPr>
                         <a:t>VARCHAR(255)</a:t>
                       </a:r>
-                      <a:endParaRPr lang="en-US" altLang="ko-KR" sz="600" kern="1200" baseline="0">
-                        <a:solidFill>
-                          <a:schemeClr val="tx1"/>
-                        </a:solidFill>
-                        <a:effectLst/>
-                        <a:latin typeface="+mn-lt"/>
-                        <a:ea typeface="+mn-ea"/>
-                        <a:cs typeface="+mn-cs"/>
-                      </a:endParaRPr>
                     </a:p>
                     <a:p>
                       <a:pPr algn="l" latinLnBrk="1">
@@ -10531,15 +10546,6 @@
                         </a:rPr>
                         <a:t>STREET : VARCHAR(255)</a:t>
                       </a:r>
-                      <a:endParaRPr lang="en-US" altLang="ko-KR" sz="600" kern="1200" baseline="0">
-                        <a:solidFill>
-                          <a:schemeClr val="tx1"/>
-                        </a:solidFill>
-                        <a:effectLst/>
-                        <a:latin typeface="+mn-lt"/>
-                        <a:ea typeface="+mn-ea"/>
-                        <a:cs typeface="+mn-cs"/>
-                      </a:endParaRPr>
                     </a:p>
                     <a:p>
                       <a:pPr algn="l" latinLnBrk="1">
@@ -10557,15 +10563,6 @@
                         </a:rPr>
                         <a:t>ZIPCODE : VARCHAR(255)</a:t>
                       </a:r>
-                      <a:endParaRPr lang="en-US" altLang="ko-KR" sz="600" kern="1200" baseline="0">
-                        <a:solidFill>
-                          <a:schemeClr val="tx1"/>
-                        </a:solidFill>
-                        <a:effectLst/>
-                        <a:latin typeface="+mn-lt"/>
-                        <a:ea typeface="+mn-ea"/>
-                        <a:cs typeface="+mn-cs"/>
-                      </a:endParaRPr>
                     </a:p>
                     <a:p>
                       <a:pPr algn="l" latinLnBrk="1">
@@ -10583,15 +10580,6 @@
                         </a:rPr>
                         <a:t>STATUS : ENUM(‘?’,’?’)</a:t>
                       </a:r>
-                      <a:endParaRPr lang="en-US" altLang="ko-KR" sz="600" kern="1200" baseline="0">
-                        <a:solidFill>
-                          <a:schemeClr val="tx1"/>
-                        </a:solidFill>
-                        <a:effectLst/>
-                        <a:latin typeface="+mn-lt"/>
-                        <a:ea typeface="+mn-ea"/>
-                        <a:cs typeface="+mn-cs"/>
-                      </a:endParaRPr>
                     </a:p>
                   </a:txBody>
                   <a:tcPr marL="64933" marR="64933" marT="17952" marB="17952" anchor="ctr">
@@ -10636,23 +10624,30 @@
           <p:cNvGraphicFramePr>
             <a:graphicFrameLocks noGrp="1"/>
           </p:cNvGraphicFramePr>
-          <p:nvPr/>
+          <p:nvPr>
+            <p:extLst>
+              <p:ext uri="{D42A27DB-BD31-4B8C-83A1-F6EECF244321}">
+                <p14:modId xmlns:p14="http://schemas.microsoft.com/office/powerpoint/2010/main" val="3698500625"/>
+              </p:ext>
+            </p:extLst>
+          </p:nvPr>
         </p:nvGraphicFramePr>
         <p:xfrm>
-          <a:off x="3574726" y="1268677"/>
-          <a:ext cx="1117986" cy="729033"/>
+          <a:off x="3574725" y="1268677"/>
+          <a:ext cx="1307549" cy="906960"/>
         </p:xfrm>
         <a:graphic>
           <a:graphicData uri="http://schemas.openxmlformats.org/drawingml/2006/table">
             <a:tbl>
               <a:tblPr firstRow="1" bandRow="1"/>
               <a:tblGrid>
-                <a:gridCol w="1117986"/>
+                <a:gridCol w="1307549"/>
               </a:tblGrid>
               <a:tr h="193848">
                 <a:tc>
                   <a:txBody>
-                    <a:bodyPr vert="horz" lIns="64933" tIns="17952" rIns="64933" bIns="17952" anchor="ctr" anchorCtr="0"/>
+                    <a:bodyPr/>
+                    <a:lstStyle/>
                     <a:p>
                       <a:pPr marL="0" marR="0" indent="0" algn="ctr" latinLnBrk="0">
                         <a:lnSpc>
@@ -10669,7 +10664,7 @@
                       <a:r>
                         <a:rPr lang="en-US" altLang="ko-KR" sz="800" b="1" kern="0" spc="0">
                           <a:solidFill>
-                            <a:srgbClr val="315f97"/>
+                            <a:srgbClr val="315F97"/>
                           </a:solidFill>
                           <a:effectLst/>
                           <a:ea typeface="맑은 고딕"/>
@@ -10678,7 +10673,7 @@
                       </a:r>
                       <a:endParaRPr lang="en-US" altLang="ko-KR" sz="800" b="1" kern="0" spc="0">
                         <a:solidFill>
-                          <a:srgbClr val="315f97"/>
+                          <a:srgbClr val="315F97"/>
                         </a:solidFill>
                         <a:ea typeface="맑은 고딕"/>
                       </a:endParaRPr>
@@ -10719,7 +10714,8 @@
               <a:tr h="454107">
                 <a:tc>
                   <a:txBody>
-                    <a:bodyPr vert="horz" lIns="64933" tIns="17952" rIns="64933" bIns="17952" anchor="ctr" anchorCtr="0"/>
+                    <a:bodyPr/>
+                    <a:lstStyle/>
                     <a:p>
                       <a:pPr marL="0" marR="0" indent="0" algn="l" defTabSz="914400" rtl="0" eaLnBrk="1" latinLnBrk="1" hangingPunct="1">
                         <a:lnSpc>
@@ -10748,15 +10744,6 @@
                         </a:rPr>
                         <a:t>ORDER_ID : BIGINT (PK)</a:t>
                       </a:r>
-                      <a:endParaRPr lang="en-US" altLang="ko-KR" sz="600" b="1" kern="1200">
-                        <a:solidFill>
-                          <a:schemeClr val="tx1"/>
-                        </a:solidFill>
-                        <a:effectLst/>
-                        <a:latin typeface="+mn-lt"/>
-                        <a:ea typeface="+mn-ea"/>
-                        <a:cs typeface="+mn-cs"/>
-                      </a:endParaRPr>
                     </a:p>
                     <a:p>
                       <a:pPr marL="0" marR="0" indent="0" algn="l" defTabSz="914400" rtl="0" eaLnBrk="1" latinLnBrk="1" hangingPunct="1">
@@ -10786,22 +10773,13 @@
                         </a:rPr>
                         <a:t>DELIVERY_ID : BIGINT (FK)</a:t>
                       </a:r>
-                      <a:endParaRPr lang="en-US" altLang="ko-KR" sz="600" b="1" kern="1200" baseline="0">
-                        <a:solidFill>
-                          <a:schemeClr val="tx1"/>
-                        </a:solidFill>
-                        <a:effectLst/>
-                        <a:latin typeface="+mn-lt"/>
-                        <a:ea typeface="+mn-ea"/>
-                        <a:cs typeface="+mn-cs"/>
-                      </a:endParaRPr>
                     </a:p>
                     <a:p>
                       <a:pPr algn="l" latinLnBrk="1">
                         <a:defRPr/>
                       </a:pPr>
                       <a:r>
-                        <a:rPr lang="en-US" altLang="ko-KR" sz="600" b="1" kern="1200" baseline="0">
+                        <a:rPr lang="en-US" altLang="ko-KR" sz="600" b="1" kern="1200" baseline="0" smtClean="0">
                           <a:solidFill>
                             <a:schemeClr val="tx1"/>
                           </a:solidFill>
@@ -10810,17 +10788,20 @@
                           <a:ea typeface="+mn-ea"/>
                           <a:cs typeface="+mn-cs"/>
                         </a:rPr>
-                        <a:t>USER_ID : BIGINT (FK)</a:t>
-                      </a:r>
-                      <a:endParaRPr lang="en-US" altLang="ko-KR" sz="600" b="1" kern="1200" baseline="0">
-                        <a:solidFill>
-                          <a:schemeClr val="tx1"/>
-                        </a:solidFill>
-                        <a:effectLst/>
-                        <a:latin typeface="+mn-lt"/>
-                        <a:ea typeface="+mn-ea"/>
-                        <a:cs typeface="+mn-cs"/>
-                      </a:endParaRPr>
+                        <a:t>MEMBER_ID </a:t>
+                      </a:r>
+                      <a:r>
+                        <a:rPr lang="en-US" altLang="ko-KR" sz="600" b="1" kern="1200" baseline="0">
+                          <a:solidFill>
+                            <a:schemeClr val="tx1"/>
+                          </a:solidFill>
+                          <a:effectLst/>
+                          <a:latin typeface="+mn-lt"/>
+                          <a:ea typeface="+mn-ea"/>
+                          <a:cs typeface="+mn-cs"/>
+                        </a:rPr>
+                        <a:t>: BIGINT (FK)</a:t>
+                      </a:r>
                     </a:p>
                     <a:p>
                       <a:pPr algn="l" latinLnBrk="1">
@@ -10838,22 +10819,13 @@
                         </a:rPr>
                         <a:t>ORDER_DATE : DATETIME</a:t>
                       </a:r>
-                      <a:endParaRPr lang="en-US" altLang="ko-KR" sz="600" kern="1200" baseline="0">
-                        <a:solidFill>
-                          <a:schemeClr val="tx1"/>
-                        </a:solidFill>
-                        <a:effectLst/>
-                        <a:latin typeface="+mn-lt"/>
-                        <a:ea typeface="+mn-ea"/>
-                        <a:cs typeface="+mn-cs"/>
-                      </a:endParaRPr>
                     </a:p>
                     <a:p>
                       <a:pPr algn="l" latinLnBrk="1">
                         <a:defRPr/>
                       </a:pPr>
                       <a:r>
-                        <a:rPr lang="en-US" altLang="ko-KR" sz="600" kern="1200" baseline="0">
+                        <a:rPr lang="en-US" altLang="ko-KR" sz="600" kern="1200" baseline="0" smtClean="0">
                           <a:solidFill>
                             <a:schemeClr val="tx1"/>
                           </a:solidFill>
@@ -10862,9 +10834,91 @@
                           <a:ea typeface="+mn-ea"/>
                           <a:cs typeface="+mn-cs"/>
                         </a:rPr>
-                        <a:t>STATUS : ENUM(‘?’,’?’)</a:t>
-                      </a:r>
-                      <a:endParaRPr lang="en-US" altLang="ko-KR" sz="600" kern="1200" baseline="0">
+                        <a:t>ORDER_STATUS </a:t>
+                      </a:r>
+                      <a:r>
+                        <a:rPr lang="en-US" altLang="ko-KR" sz="600" kern="1200" baseline="0">
+                          <a:solidFill>
+                            <a:schemeClr val="tx1"/>
+                          </a:solidFill>
+                          <a:effectLst/>
+                          <a:latin typeface="+mn-lt"/>
+                          <a:ea typeface="+mn-ea"/>
+                          <a:cs typeface="+mn-cs"/>
+                        </a:rPr>
+                        <a:t>: ENUM</a:t>
+                      </a:r>
+                      <a:r>
+                        <a:rPr lang="en-US" altLang="ko-KR" sz="600" kern="1200" baseline="0" smtClean="0">
+                          <a:solidFill>
+                            <a:schemeClr val="tx1"/>
+                          </a:solidFill>
+                          <a:effectLst/>
+                          <a:latin typeface="+mn-lt"/>
+                          <a:ea typeface="+mn-ea"/>
+                          <a:cs typeface="+mn-cs"/>
+                        </a:rPr>
+                        <a:t>(‘?’,’?’)</a:t>
+                      </a:r>
+                    </a:p>
+                    <a:p>
+                      <a:pPr algn="l" latinLnBrk="1">
+                        <a:defRPr/>
+                      </a:pPr>
+                      <a:r>
+                        <a:rPr lang="en-US" altLang="ko-KR" sz="600" kern="1200" smtClean="0">
+                          <a:solidFill>
+                            <a:schemeClr val="tx1"/>
+                          </a:solidFill>
+                          <a:effectLst/>
+                          <a:latin typeface="+mn-lt"/>
+                          <a:ea typeface="+mn-ea"/>
+                          <a:cs typeface="+mn-cs"/>
+                        </a:rPr>
+                        <a:t>CREATED_DATE : </a:t>
+                      </a:r>
+                      <a:r>
+                        <a:rPr lang="en-US" altLang="ko-KR" sz="600" kern="1200" baseline="0" smtClean="0">
+                          <a:solidFill>
+                            <a:schemeClr val="tx1"/>
+                          </a:solidFill>
+                          <a:effectLst/>
+                          <a:latin typeface="+mn-lt"/>
+                          <a:ea typeface="+mn-ea"/>
+                          <a:cs typeface="+mn-cs"/>
+                        </a:rPr>
+                        <a:t>DATETIME</a:t>
+                      </a:r>
+                    </a:p>
+                    <a:p>
+                      <a:pPr algn="l" latinLnBrk="1">
+                        <a:defRPr/>
+                      </a:pPr>
+                      <a:r>
+                        <a:rPr lang="en-US" altLang="ko-KR" sz="600" kern="1200" smtClean="0">
+                          <a:solidFill>
+                            <a:schemeClr val="tx1"/>
+                          </a:solidFill>
+                          <a:effectLst/>
+                          <a:latin typeface="+mn-lt"/>
+                          <a:ea typeface="+mn-ea"/>
+                          <a:cs typeface="+mn-cs"/>
+                        </a:rPr>
+                        <a:t>MODIFIED_DATE : </a:t>
+                      </a:r>
+                      <a:r>
+                        <a:rPr lang="en-US" altLang="ko-KR" sz="600" kern="1200" baseline="0" smtClean="0">
+                          <a:solidFill>
+                            <a:schemeClr val="tx1"/>
+                          </a:solidFill>
+                          <a:effectLst/>
+                          <a:latin typeface="+mn-lt"/>
+                          <a:ea typeface="+mn-ea"/>
+                          <a:cs typeface="+mn-cs"/>
+                        </a:rPr>
+                        <a:t>DATETIME</a:t>
+                      </a:r>
+                      <a:endParaRPr lang="en-US" altLang="ko-KR" sz="600" kern="1200" smtClean="0">
                         <a:solidFill>
                           <a:schemeClr val="tx1"/>
                         </a:solidFill>
@@ -10917,11 +10971,17 @@
           <p:cNvGraphicFramePr>
             <a:graphicFrameLocks noGrp="1"/>
           </p:cNvGraphicFramePr>
-          <p:nvPr/>
+          <p:nvPr>
+            <p:extLst>
+              <p:ext uri="{D42A27DB-BD31-4B8C-83A1-F6EECF244321}">
+                <p14:modId xmlns:p14="http://schemas.microsoft.com/office/powerpoint/2010/main" val="245803000"/>
+              </p:ext>
+            </p:extLst>
+          </p:nvPr>
         </p:nvGraphicFramePr>
         <p:xfrm>
           <a:off x="5589684" y="1250054"/>
-          <a:ext cx="1444433" cy="729033"/>
+          <a:ext cx="1444433" cy="998400"/>
         </p:xfrm>
         <a:graphic>
           <a:graphicData uri="http://schemas.openxmlformats.org/drawingml/2006/table">
@@ -10933,7 +10993,8 @@
               <a:tr h="126618">
                 <a:tc>
                   <a:txBody>
-                    <a:bodyPr vert="horz" lIns="64933" tIns="17952" rIns="64933" bIns="17952" anchor="ctr" anchorCtr="0"/>
+                    <a:bodyPr/>
+                    <a:lstStyle/>
                     <a:p>
                       <a:pPr marL="0" marR="0" indent="0" algn="ctr" latinLnBrk="0">
                         <a:lnSpc>
@@ -10950,7 +11011,7 @@
                       <a:r>
                         <a:rPr lang="en-US" altLang="ko-KR" sz="800" b="1" kern="0" spc="0">
                           <a:solidFill>
-                            <a:srgbClr val="315f97"/>
+                            <a:srgbClr val="315F97"/>
                           </a:solidFill>
                           <a:effectLst/>
                           <a:ea typeface="맑은 고딕"/>
@@ -10959,7 +11020,7 @@
                       </a:r>
                       <a:endParaRPr lang="en-US" altLang="ko-KR" sz="800" b="1" kern="0" spc="0">
                         <a:solidFill>
-                          <a:srgbClr val="315f97"/>
+                          <a:srgbClr val="315F97"/>
                         </a:solidFill>
                         <a:ea typeface="맑은 고딕"/>
                       </a:endParaRPr>
@@ -11000,7 +11061,8 @@
               <a:tr h="454107">
                 <a:tc>
                   <a:txBody>
-                    <a:bodyPr vert="horz" lIns="64933" tIns="17952" rIns="64933" bIns="17952" anchor="ctr" anchorCtr="0"/>
+                    <a:bodyPr/>
+                    <a:lstStyle/>
                     <a:p>
                       <a:pPr marL="0" marR="0" indent="0" algn="l" defTabSz="914400" rtl="0" eaLnBrk="1" latinLnBrk="1" hangingPunct="1">
                         <a:lnSpc>
@@ -11029,7 +11091,157 @@
                         </a:rPr>
                         <a:t>ORDER_PRODUCT_ID : BIGINT (PK)</a:t>
                       </a:r>
-                      <a:endParaRPr lang="en-US" altLang="ko-KR" sz="600" b="1" kern="1200">
+                    </a:p>
+                    <a:p>
+                      <a:pPr algn="l" latinLnBrk="1">
+                        <a:defRPr/>
+                      </a:pPr>
+                      <a:r>
+                        <a:rPr lang="en-US" altLang="ko-KR" sz="600" b="1" kern="1200" baseline="0">
+                          <a:solidFill>
+                            <a:schemeClr val="tx1"/>
+                          </a:solidFill>
+                          <a:effectLst/>
+                          <a:latin typeface="+mn-lt"/>
+                          <a:ea typeface="+mn-ea"/>
+                          <a:cs typeface="+mn-cs"/>
+                        </a:rPr>
+                        <a:t>PRODUCT_ID : BIGINT (FK)</a:t>
+                      </a:r>
+                    </a:p>
+                    <a:p>
+                      <a:pPr algn="l" latinLnBrk="1">
+                        <a:defRPr/>
+                      </a:pPr>
+                      <a:r>
+                        <a:rPr lang="en-US" altLang="ko-KR" sz="600" b="1" kern="1200" baseline="0">
+                          <a:solidFill>
+                            <a:schemeClr val="tx1"/>
+                          </a:solidFill>
+                          <a:effectLst/>
+                          <a:latin typeface="+mn-lt"/>
+                          <a:ea typeface="+mn-ea"/>
+                          <a:cs typeface="+mn-cs"/>
+                        </a:rPr>
+                        <a:t>ORDER_ID : BIGINT (FK)</a:t>
+                      </a:r>
+                    </a:p>
+                    <a:p>
+                      <a:pPr algn="l" latinLnBrk="1">
+                        <a:defRPr/>
+                      </a:pPr>
+                      <a:r>
+                        <a:rPr lang="en-US" altLang="ko-KR" sz="600" kern="1200" baseline="0">
+                          <a:solidFill>
+                            <a:schemeClr val="tx1"/>
+                          </a:solidFill>
+                          <a:effectLst/>
+                          <a:latin typeface="+mn-lt"/>
+                          <a:ea typeface="+mn-ea"/>
+                          <a:cs typeface="+mn-cs"/>
+                        </a:rPr>
+                        <a:t>ORDER_PRICE : INT</a:t>
+                      </a:r>
+                    </a:p>
+                    <a:p>
+                      <a:pPr algn="l" latinLnBrk="1">
+                        <a:defRPr/>
+                      </a:pPr>
+                      <a:r>
+                        <a:rPr lang="en-US" altLang="ko-KR" sz="600" kern="1200" baseline="0" smtClean="0">
+                          <a:solidFill>
+                            <a:schemeClr val="tx1"/>
+                          </a:solidFill>
+                          <a:effectLst/>
+                          <a:latin typeface="+mn-lt"/>
+                          <a:ea typeface="+mn-ea"/>
+                          <a:cs typeface="+mn-cs"/>
+                        </a:rPr>
+                        <a:t>ORDER_COUNT </a:t>
+                      </a:r>
+                      <a:r>
+                        <a:rPr lang="en-US" altLang="ko-KR" sz="600" kern="1200" baseline="0">
+                          <a:solidFill>
+                            <a:schemeClr val="tx1"/>
+                          </a:solidFill>
+                          <a:effectLst/>
+                          <a:latin typeface="+mn-lt"/>
+                          <a:ea typeface="+mn-ea"/>
+                          <a:cs typeface="+mn-cs"/>
+                        </a:rPr>
+                        <a:t>: </a:t>
+                      </a:r>
+                      <a:r>
+                        <a:rPr lang="en-US" altLang="ko-KR" sz="600" kern="1200" baseline="0" smtClean="0">
+                          <a:solidFill>
+                            <a:schemeClr val="tx1"/>
+                          </a:solidFill>
+                          <a:effectLst/>
+                          <a:latin typeface="+mn-lt"/>
+                          <a:ea typeface="+mn-ea"/>
+                          <a:cs typeface="+mn-cs"/>
+                        </a:rPr>
+                        <a:t>INT</a:t>
+                      </a:r>
+                    </a:p>
+                    <a:p>
+                      <a:pPr algn="l" latinLnBrk="1">
+                        <a:defRPr/>
+                      </a:pPr>
+                      <a:r>
+                        <a:rPr lang="en-US" altLang="ko-KR" sz="600" kern="1200" smtClean="0">
+                          <a:solidFill>
+                            <a:schemeClr val="tx1"/>
+                          </a:solidFill>
+                          <a:effectLst/>
+                          <a:latin typeface="+mn-lt"/>
+                          <a:ea typeface="+mn-ea"/>
+                          <a:cs typeface="+mn-cs"/>
+                        </a:rPr>
+                        <a:t>CREATED_DATE : </a:t>
+                      </a:r>
+                      <a:r>
+                        <a:rPr lang="en-US" altLang="ko-KR" sz="600" kern="1200" baseline="0" smtClean="0">
+                          <a:solidFill>
+                            <a:schemeClr val="tx1"/>
+                          </a:solidFill>
+                          <a:effectLst/>
+                          <a:latin typeface="+mn-lt"/>
+                          <a:ea typeface="+mn-ea"/>
+                          <a:cs typeface="+mn-cs"/>
+                        </a:rPr>
+                        <a:t>DATETIME</a:t>
+                      </a:r>
+                    </a:p>
+                    <a:p>
+                      <a:pPr algn="l" latinLnBrk="1">
+                        <a:defRPr/>
+                      </a:pPr>
+                      <a:r>
+                        <a:rPr lang="en-US" altLang="ko-KR" sz="600" kern="1200" smtClean="0">
+                          <a:solidFill>
+                            <a:schemeClr val="tx1"/>
+                          </a:solidFill>
+                          <a:effectLst/>
+                          <a:latin typeface="+mn-lt"/>
+                          <a:ea typeface="+mn-ea"/>
+                          <a:cs typeface="+mn-cs"/>
+                        </a:rPr>
+                        <a:t>MODIFIED_DATE : </a:t>
+                      </a:r>
+                      <a:r>
+                        <a:rPr lang="en-US" altLang="ko-KR" sz="600" kern="1200" baseline="0" smtClean="0">
+                          <a:solidFill>
+                            <a:schemeClr val="tx1"/>
+                          </a:solidFill>
+                          <a:effectLst/>
+                          <a:latin typeface="+mn-lt"/>
+                          <a:ea typeface="+mn-ea"/>
+                          <a:cs typeface="+mn-cs"/>
+                        </a:rPr>
+                        <a:t>DATETIME</a:t>
+                      </a:r>
+                      <a:endParaRPr lang="en-US" altLang="ko-KR" sz="600" kern="1200" smtClean="0">
                         <a:solidFill>
                           <a:schemeClr val="tx1"/>
                         </a:solidFill>
@@ -11043,96 +11255,6 @@
                       <a:pPr algn="l" latinLnBrk="1">
                         <a:defRPr/>
                       </a:pPr>
-                      <a:r>
-                        <a:rPr lang="en-US" altLang="ko-KR" sz="600" b="1" kern="1200" baseline="0">
-                          <a:solidFill>
-                            <a:schemeClr val="tx1"/>
-                          </a:solidFill>
-                          <a:effectLst/>
-                          <a:latin typeface="+mn-lt"/>
-                          <a:ea typeface="+mn-ea"/>
-                          <a:cs typeface="+mn-cs"/>
-                        </a:rPr>
-                        <a:t>PRODUCT_ID : BIGINT (FK)</a:t>
-                      </a:r>
-                      <a:endParaRPr lang="en-US" altLang="ko-KR" sz="600" b="1" kern="1200" baseline="0">
-                        <a:solidFill>
-                          <a:schemeClr val="tx1"/>
-                        </a:solidFill>
-                        <a:effectLst/>
-                        <a:latin typeface="+mn-lt"/>
-                        <a:ea typeface="+mn-ea"/>
-                        <a:cs typeface="+mn-cs"/>
-                      </a:endParaRPr>
-                    </a:p>
-                    <a:p>
-                      <a:pPr algn="l" latinLnBrk="1">
-                        <a:defRPr/>
-                      </a:pPr>
-                      <a:r>
-                        <a:rPr lang="en-US" altLang="ko-KR" sz="600" b="1" kern="1200" baseline="0">
-                          <a:solidFill>
-                            <a:schemeClr val="tx1"/>
-                          </a:solidFill>
-                          <a:effectLst/>
-                          <a:latin typeface="+mn-lt"/>
-                          <a:ea typeface="+mn-ea"/>
-                          <a:cs typeface="+mn-cs"/>
-                        </a:rPr>
-                        <a:t>ORDER_ID : BIGINT (FK)</a:t>
-                      </a:r>
-                      <a:endParaRPr lang="en-US" altLang="ko-KR" sz="600" b="1" kern="1200" baseline="0">
-                        <a:solidFill>
-                          <a:schemeClr val="tx1"/>
-                        </a:solidFill>
-                        <a:effectLst/>
-                        <a:latin typeface="+mn-lt"/>
-                        <a:ea typeface="+mn-ea"/>
-                        <a:cs typeface="+mn-cs"/>
-                      </a:endParaRPr>
-                    </a:p>
-                    <a:p>
-                      <a:pPr algn="l" latinLnBrk="1">
-                        <a:defRPr/>
-                      </a:pPr>
-                      <a:r>
-                        <a:rPr lang="en-US" altLang="ko-KR" sz="600" kern="1200" baseline="0">
-                          <a:solidFill>
-                            <a:schemeClr val="tx1"/>
-                          </a:solidFill>
-                          <a:effectLst/>
-                          <a:latin typeface="+mn-lt"/>
-                          <a:ea typeface="+mn-ea"/>
-                          <a:cs typeface="+mn-cs"/>
-                        </a:rPr>
-                        <a:t>ORDER_PRICE : INT</a:t>
-                      </a:r>
-                      <a:endParaRPr lang="en-US" altLang="ko-KR" sz="600" kern="1200" baseline="0">
-                        <a:solidFill>
-                          <a:schemeClr val="tx1"/>
-                        </a:solidFill>
-                        <a:effectLst/>
-                        <a:latin typeface="+mn-lt"/>
-                        <a:ea typeface="+mn-ea"/>
-                        <a:cs typeface="+mn-cs"/>
-                      </a:endParaRPr>
-                    </a:p>
-                    <a:p>
-                      <a:pPr algn="l" latinLnBrk="1">
-                        <a:defRPr/>
-                      </a:pPr>
-                      <a:r>
-                        <a:rPr lang="en-US" altLang="ko-KR" sz="600" kern="1200" baseline="0">
-                          <a:solidFill>
-                            <a:schemeClr val="tx1"/>
-                          </a:solidFill>
-                          <a:effectLst/>
-                          <a:latin typeface="+mn-lt"/>
-                          <a:ea typeface="+mn-ea"/>
-                          <a:cs typeface="+mn-cs"/>
-                        </a:rPr>
-                        <a:t>COUNT : INT</a:t>
-                      </a:r>
                       <a:endParaRPr lang="en-US" altLang="ko-KR" sz="600" kern="1200" baseline="0">
                         <a:solidFill>
                           <a:schemeClr val="tx1"/>
@@ -11186,7 +11308,13 @@
           <p:cNvGraphicFramePr>
             <a:graphicFrameLocks noGrp="1"/>
           </p:cNvGraphicFramePr>
-          <p:nvPr/>
+          <p:nvPr>
+            <p:extLst>
+              <p:ext uri="{D42A27DB-BD31-4B8C-83A1-F6EECF244321}">
+                <p14:modId xmlns:p14="http://schemas.microsoft.com/office/powerpoint/2010/main" val="2287498520"/>
+              </p:ext>
+            </p:extLst>
+          </p:nvPr>
         </p:nvGraphicFramePr>
         <p:xfrm>
           <a:off x="7941235" y="1405968"/>
@@ -11202,7 +11330,8 @@
               <a:tr h="250776">
                 <a:tc>
                   <a:txBody>
-                    <a:bodyPr vert="horz" lIns="64933" tIns="17952" rIns="64933" bIns="17952" anchor="ctr" anchorCtr="0"/>
+                    <a:bodyPr/>
+                    <a:lstStyle/>
                     <a:p>
                       <a:pPr marL="0" marR="0" indent="0" algn="ctr" latinLnBrk="0">
                         <a:lnSpc>
@@ -11219,7 +11348,7 @@
                       <a:r>
                         <a:rPr lang="en-US" altLang="ko-KR" sz="800" b="1" kern="0" spc="0">
                           <a:solidFill>
-                            <a:srgbClr val="315f97"/>
+                            <a:srgbClr val="315F97"/>
                           </a:solidFill>
                           <a:effectLst/>
                           <a:ea typeface="맑은 고딕"/>
@@ -11228,7 +11357,7 @@
                       </a:r>
                       <a:endParaRPr lang="en-US" altLang="ko-KR" sz="800" b="1" kern="0" spc="0">
                         <a:solidFill>
-                          <a:srgbClr val="315f97"/>
+                          <a:srgbClr val="315F97"/>
                         </a:solidFill>
                         <a:ea typeface="맑은 고딕"/>
                       </a:endParaRPr>
@@ -11269,7 +11398,8 @@
               <a:tr h="625381">
                 <a:tc>
                   <a:txBody>
-                    <a:bodyPr vert="horz" lIns="64933" tIns="17952" rIns="64933" bIns="17952" anchor="ctr" anchorCtr="0"/>
+                    <a:bodyPr/>
+                    <a:lstStyle/>
                     <a:p>
                       <a:pPr marL="0" marR="0" indent="0" algn="l" defTabSz="914400" rtl="0" eaLnBrk="1" latinLnBrk="1" hangingPunct="1">
                         <a:lnSpc>
@@ -11298,15 +11428,6 @@
                         </a:rPr>
                         <a:t>ID : BIGINT (PK)</a:t>
                       </a:r>
-                      <a:endParaRPr lang="en-US" altLang="ko-KR" sz="600" b="1" kern="1200">
-                        <a:solidFill>
-                          <a:schemeClr val="tx1"/>
-                        </a:solidFill>
-                        <a:effectLst/>
-                        <a:latin typeface="+mn-lt"/>
-                        <a:ea typeface="+mn-ea"/>
-                        <a:cs typeface="+mn-cs"/>
-                      </a:endParaRPr>
                     </a:p>
                     <a:p>
                       <a:pPr algn="l" latinLnBrk="1">
@@ -11324,15 +11445,6 @@
                         </a:rPr>
                         <a:t>NAME : VARCHAR(255)</a:t>
                       </a:r>
-                      <a:endParaRPr lang="en-US" altLang="ko-KR" sz="600" kern="1200" baseline="0">
-                        <a:solidFill>
-                          <a:schemeClr val="tx1"/>
-                        </a:solidFill>
-                        <a:effectLst/>
-                        <a:latin typeface="+mn-lt"/>
-                        <a:ea typeface="+mn-ea"/>
-                        <a:cs typeface="+mn-cs"/>
-                      </a:endParaRPr>
                     </a:p>
                     <a:p>
                       <a:pPr algn="l" latinLnBrk="1">
@@ -11350,15 +11462,6 @@
                         </a:rPr>
                         <a:t>PRICE : INT</a:t>
                       </a:r>
-                      <a:endParaRPr lang="en-US" altLang="ko-KR" sz="600" kern="1200" baseline="0">
-                        <a:solidFill>
-                          <a:schemeClr val="tx1"/>
-                        </a:solidFill>
-                        <a:effectLst/>
-                        <a:latin typeface="+mn-lt"/>
-                        <a:ea typeface="+mn-ea"/>
-                        <a:cs typeface="+mn-cs"/>
-                      </a:endParaRPr>
                     </a:p>
                     <a:p>
                       <a:pPr algn="l" latinLnBrk="1">
@@ -11376,15 +11479,6 @@
                         </a:rPr>
                         <a:t>STOCKQUANTITY : INT</a:t>
                       </a:r>
-                      <a:endParaRPr lang="en-US" altLang="ko-KR" sz="600" kern="1200" baseline="0">
-                        <a:solidFill>
-                          <a:schemeClr val="tx1"/>
-                        </a:solidFill>
-                        <a:effectLst/>
-                        <a:latin typeface="+mn-lt"/>
-                        <a:ea typeface="+mn-ea"/>
-                        <a:cs typeface="+mn-cs"/>
-                      </a:endParaRPr>
                     </a:p>
                     <a:p>
                       <a:pPr algn="l" latinLnBrk="1">
@@ -11457,7 +11551,13 @@
           <p:cNvGraphicFramePr>
             <a:graphicFrameLocks noGrp="1"/>
           </p:cNvGraphicFramePr>
-          <p:nvPr/>
+          <p:nvPr>
+            <p:extLst>
+              <p:ext uri="{D42A27DB-BD31-4B8C-83A1-F6EECF244321}">
+                <p14:modId xmlns:p14="http://schemas.microsoft.com/office/powerpoint/2010/main" val="1673215640"/>
+              </p:ext>
+            </p:extLst>
+          </p:nvPr>
         </p:nvGraphicFramePr>
         <p:xfrm>
           <a:off x="4884666" y="2031930"/>
@@ -11473,7 +11573,8 @@
               <a:tr h="274029">
                 <a:tc>
                   <a:txBody>
-                    <a:bodyPr vert="horz" lIns="64933" tIns="17952" rIns="64933" bIns="17952" anchor="ctr" anchorCtr="0"/>
+                    <a:bodyPr/>
+                    <a:lstStyle/>
                     <a:p>
                       <a:pPr marL="0" marR="0" indent="0" algn="ctr" latinLnBrk="0">
                         <a:lnSpc>
@@ -11490,7 +11591,7 @@
                       <a:r>
                         <a:rPr lang="en-US" altLang="ko-KR" sz="800" b="1" kern="0" spc="0">
                           <a:solidFill>
-                            <a:srgbClr val="315f97"/>
+                            <a:srgbClr val="315F97"/>
                           </a:solidFill>
                           <a:effectLst/>
                           <a:ea typeface="맑은 고딕"/>
@@ -11499,7 +11600,7 @@
                       </a:r>
                       <a:endParaRPr lang="en-US" altLang="ko-KR" sz="800" b="1" kern="0" spc="0">
                         <a:solidFill>
-                          <a:srgbClr val="315f97"/>
+                          <a:srgbClr val="315F97"/>
                         </a:solidFill>
                         <a:ea typeface="맑은 고딕"/>
                       </a:endParaRPr>
@@ -11540,7 +11641,8 @@
               <a:tr h="907962">
                 <a:tc>
                   <a:txBody>
-                    <a:bodyPr vert="horz" lIns="64933" tIns="17952" rIns="64933" bIns="17952" anchor="ctr" anchorCtr="0"/>
+                    <a:bodyPr/>
+                    <a:lstStyle/>
                     <a:p>
                       <a:pPr marL="0" marR="0" indent="0" algn="l" defTabSz="914400" rtl="0" eaLnBrk="1" latinLnBrk="1" hangingPunct="1">
                         <a:lnSpc>
@@ -11569,22 +11671,13 @@
                         </a:rPr>
                         <a:t>RECEIPE_ID : BIGINT (PK)</a:t>
                       </a:r>
-                      <a:endParaRPr lang="en-US" altLang="ko-KR" sz="600" b="1" kern="1200">
-                        <a:solidFill>
-                          <a:schemeClr val="tx1"/>
-                        </a:solidFill>
-                        <a:effectLst/>
-                        <a:latin typeface="+mn-lt"/>
-                        <a:ea typeface="+mn-ea"/>
-                        <a:cs typeface="+mn-cs"/>
-                      </a:endParaRPr>
                     </a:p>
                     <a:p>
                       <a:pPr algn="l" latinLnBrk="1">
                         <a:defRPr/>
                       </a:pPr>
                       <a:r>
-                        <a:rPr lang="en-US" altLang="ko-KR" sz="600" b="1" kern="1200" baseline="0">
+                        <a:rPr lang="en-US" altLang="ko-KR" sz="600" b="1" kern="1200" baseline="0" smtClean="0">
                           <a:solidFill>
                             <a:schemeClr val="tx1"/>
                           </a:solidFill>
@@ -11593,17 +11686,20 @@
                           <a:ea typeface="+mn-ea"/>
                           <a:cs typeface="+mn-cs"/>
                         </a:rPr>
-                        <a:t>USER_ID : BIGINT (FK)</a:t>
-                      </a:r>
-                      <a:endParaRPr lang="en-US" altLang="ko-KR" sz="600" b="1" kern="1200" baseline="0">
-                        <a:solidFill>
-                          <a:schemeClr val="tx1"/>
-                        </a:solidFill>
-                        <a:effectLst/>
-                        <a:latin typeface="+mn-lt"/>
-                        <a:ea typeface="+mn-ea"/>
-                        <a:cs typeface="+mn-cs"/>
-                      </a:endParaRPr>
+                        <a:t>MEMBER_ID </a:t>
+                      </a:r>
+                      <a:r>
+                        <a:rPr lang="en-US" altLang="ko-KR" sz="600" b="1" kern="1200" baseline="0">
+                          <a:solidFill>
+                            <a:schemeClr val="tx1"/>
+                          </a:solidFill>
+                          <a:effectLst/>
+                          <a:latin typeface="+mn-lt"/>
+                          <a:ea typeface="+mn-ea"/>
+                          <a:cs typeface="+mn-cs"/>
+                        </a:rPr>
+                        <a:t>: BIGINT (FK)</a:t>
+                      </a:r>
                     </a:p>
                     <a:p>
                       <a:pPr algn="l" latinLnBrk="1">
@@ -11633,15 +11729,6 @@
                         </a:rPr>
                         <a:t>: VARCHAR(255)</a:t>
                       </a:r>
-                      <a:endParaRPr lang="en-US" altLang="ko-KR" sz="600" kern="1200" baseline="0">
-                        <a:solidFill>
-                          <a:schemeClr val="tx1"/>
-                        </a:solidFill>
-                        <a:effectLst/>
-                        <a:latin typeface="+mn-lt"/>
-                        <a:ea typeface="+mn-ea"/>
-                        <a:cs typeface="+mn-cs"/>
-                      </a:endParaRPr>
                     </a:p>
                     <a:p>
                       <a:pPr algn="l" latinLnBrk="1">
@@ -11659,15 +11746,6 @@
                         </a:rPr>
                         <a:t>CONTNET : TEXT</a:t>
                       </a:r>
-                      <a:endParaRPr lang="en-US" altLang="ko-KR" sz="600" b="0" kern="1200" baseline="0">
-                        <a:solidFill>
-                          <a:schemeClr val="tx1"/>
-                        </a:solidFill>
-                        <a:effectLst/>
-                        <a:latin typeface="+mn-lt"/>
-                        <a:ea typeface="+mn-ea"/>
-                        <a:cs typeface="+mn-cs"/>
-                      </a:endParaRPr>
                     </a:p>
                     <a:p>
                       <a:pPr marL="0" marR="0" indent="0" algn="l" defTabSz="914400" rtl="0" eaLnBrk="1" latinLnBrk="1" hangingPunct="1">
@@ -11709,15 +11787,6 @@
                         </a:rPr>
                         <a:t>: VARCHAR(255)</a:t>
                       </a:r>
-                      <a:endParaRPr lang="en-US" altLang="ko-KR" sz="600" kern="1200" baseline="0">
-                        <a:solidFill>
-                          <a:schemeClr val="tx1"/>
-                        </a:solidFill>
-                        <a:effectLst/>
-                        <a:latin typeface="+mn-lt"/>
-                        <a:ea typeface="+mn-ea"/>
-                        <a:cs typeface="+mn-cs"/>
-                      </a:endParaRPr>
                     </a:p>
                     <a:p>
                       <a:pPr marL="0" marR="0" indent="0" algn="l" defTabSz="914400" rtl="0" eaLnBrk="1" latinLnBrk="1" hangingPunct="1">
@@ -11759,15 +11828,6 @@
                         </a:rPr>
                         <a:t>INT</a:t>
                       </a:r>
-                      <a:endParaRPr lang="en-US" altLang="ko-KR" sz="600" kern="1200" baseline="0">
-                        <a:solidFill>
-                          <a:schemeClr val="tx1"/>
-                        </a:solidFill>
-                        <a:effectLst/>
-                        <a:latin typeface="+mn-lt"/>
-                        <a:ea typeface="+mn-ea"/>
-                        <a:cs typeface="+mn-cs"/>
-                      </a:endParaRPr>
                     </a:p>
                     <a:p>
                       <a:pPr algn="l" latinLnBrk="1">
@@ -11797,15 +11857,6 @@
                         </a:rPr>
                         <a:t>DATETIME</a:t>
                       </a:r>
-                      <a:endParaRPr lang="en-US" altLang="ko-KR" sz="600" kern="1200" baseline="0">
-                        <a:solidFill>
-                          <a:schemeClr val="tx1"/>
-                        </a:solidFill>
-                        <a:effectLst/>
-                        <a:latin typeface="+mn-lt"/>
-                        <a:ea typeface="+mn-ea"/>
-                        <a:cs typeface="+mn-cs"/>
-                      </a:endParaRPr>
                     </a:p>
                     <a:p>
                       <a:pPr algn="l" latinLnBrk="1">
@@ -11888,7 +11939,13 @@
           <p:cNvGraphicFramePr>
             <a:graphicFrameLocks noGrp="1"/>
           </p:cNvGraphicFramePr>
-          <p:nvPr/>
+          <p:nvPr>
+            <p:extLst>
+              <p:ext uri="{D42A27DB-BD31-4B8C-83A1-F6EECF244321}">
+                <p14:modId xmlns:p14="http://schemas.microsoft.com/office/powerpoint/2010/main" val="3754924089"/>
+              </p:ext>
+            </p:extLst>
+          </p:nvPr>
         </p:nvGraphicFramePr>
         <p:xfrm>
           <a:off x="4593678" y="3680720"/>
@@ -11904,7 +11961,8 @@
               <a:tr h="235793">
                 <a:tc>
                   <a:txBody>
-                    <a:bodyPr vert="horz" lIns="64933" tIns="17952" rIns="64933" bIns="17952" anchor="ctr" anchorCtr="0"/>
+                    <a:bodyPr/>
+                    <a:lstStyle/>
                     <a:p>
                       <a:pPr marL="0" marR="0" indent="0" algn="ctr" latinLnBrk="0">
                         <a:lnSpc>
@@ -11921,7 +11979,7 @@
                       <a:r>
                         <a:rPr lang="en-US" altLang="ko-KR" sz="800" b="1" kern="0" spc="0">
                           <a:solidFill>
-                            <a:srgbClr val="315f97"/>
+                            <a:srgbClr val="315F97"/>
                           </a:solidFill>
                           <a:effectLst/>
                           <a:ea typeface="맑은 고딕"/>
@@ -11930,7 +11988,7 @@
                       </a:r>
                       <a:endParaRPr lang="en-US" altLang="ko-KR" sz="800" b="1" kern="0" spc="0">
                         <a:solidFill>
-                          <a:srgbClr val="315f97"/>
+                          <a:srgbClr val="315F97"/>
                         </a:solidFill>
                         <a:ea typeface="맑은 고딕"/>
                       </a:endParaRPr>
@@ -11971,7 +12029,8 @@
               <a:tr h="618374">
                 <a:tc>
                   <a:txBody>
-                    <a:bodyPr vert="horz" lIns="64933" tIns="17952" rIns="64933" bIns="17952" anchor="ctr" anchorCtr="0"/>
+                    <a:bodyPr/>
+                    <a:lstStyle/>
                     <a:p>
                       <a:pPr marL="0" marR="0" indent="0" algn="l" defTabSz="914400" rtl="0" eaLnBrk="1" latinLnBrk="1" hangingPunct="1">
                         <a:lnSpc>
@@ -12000,15 +12059,6 @@
                         </a:rPr>
                         <a:t>REVIEW_ID : BIGINT (PK)</a:t>
                       </a:r>
-                      <a:endParaRPr lang="en-US" altLang="ko-KR" sz="600" b="1" kern="1200">
-                        <a:solidFill>
-                          <a:schemeClr val="tx1"/>
-                        </a:solidFill>
-                        <a:effectLst/>
-                        <a:latin typeface="+mn-lt"/>
-                        <a:ea typeface="+mn-ea"/>
-                        <a:cs typeface="+mn-cs"/>
-                      </a:endParaRPr>
                     </a:p>
                     <a:p>
                       <a:pPr algn="l" latinLnBrk="1">
@@ -12026,22 +12076,13 @@
                         </a:rPr>
                         <a:t>RECEIPE_ID : BIGINT (FK)</a:t>
                       </a:r>
-                      <a:endParaRPr lang="en-US" altLang="ko-KR" sz="600" b="1" kern="1200" baseline="0">
-                        <a:solidFill>
-                          <a:schemeClr val="tx1"/>
-                        </a:solidFill>
-                        <a:effectLst/>
-                        <a:latin typeface="+mn-lt"/>
-                        <a:ea typeface="+mn-ea"/>
-                        <a:cs typeface="+mn-cs"/>
-                      </a:endParaRPr>
                     </a:p>
                     <a:p>
                       <a:pPr algn="l" latinLnBrk="1">
                         <a:defRPr/>
                       </a:pPr>
                       <a:r>
-                        <a:rPr lang="en-US" altLang="ko-KR" sz="600" b="1" kern="1200" baseline="0">
+                        <a:rPr lang="en-US" altLang="ko-KR" sz="600" b="1" kern="1200" baseline="0" smtClean="0">
                           <a:solidFill>
                             <a:schemeClr val="tx1"/>
                           </a:solidFill>
@@ -12050,17 +12091,20 @@
                           <a:ea typeface="+mn-ea"/>
                           <a:cs typeface="+mn-cs"/>
                         </a:rPr>
-                        <a:t>USER_ID : BIGINT (FK)</a:t>
-                      </a:r>
-                      <a:endParaRPr lang="en-US" altLang="ko-KR" sz="600" b="1" kern="1200" baseline="0">
-                        <a:solidFill>
-                          <a:schemeClr val="tx1"/>
-                        </a:solidFill>
-                        <a:effectLst/>
-                        <a:latin typeface="+mn-lt"/>
-                        <a:ea typeface="+mn-ea"/>
-                        <a:cs typeface="+mn-cs"/>
-                      </a:endParaRPr>
+                        <a:t>MEMBER_ID </a:t>
+                      </a:r>
+                      <a:r>
+                        <a:rPr lang="en-US" altLang="ko-KR" sz="600" b="1" kern="1200" baseline="0">
+                          <a:solidFill>
+                            <a:schemeClr val="tx1"/>
+                          </a:solidFill>
+                          <a:effectLst/>
+                          <a:latin typeface="+mn-lt"/>
+                          <a:ea typeface="+mn-ea"/>
+                          <a:cs typeface="+mn-cs"/>
+                        </a:rPr>
+                        <a:t>: BIGINT (FK)</a:t>
+                      </a:r>
                     </a:p>
                     <a:p>
                       <a:pPr algn="l" latinLnBrk="1">
@@ -12078,15 +12122,6 @@
                         </a:rPr>
                         <a:t>REVIEW_CONTENT : TEXT</a:t>
                       </a:r>
-                      <a:endParaRPr lang="en-US" altLang="ko-KR" sz="600" b="0" kern="1200" baseline="0">
-                        <a:solidFill>
-                          <a:schemeClr val="tx1"/>
-                        </a:solidFill>
-                        <a:effectLst/>
-                        <a:latin typeface="+mn-lt"/>
-                        <a:ea typeface="+mn-ea"/>
-                        <a:cs typeface="+mn-cs"/>
-                      </a:endParaRPr>
                     </a:p>
                     <a:p>
                       <a:pPr algn="l" latinLnBrk="1">
@@ -12116,15 +12151,6 @@
                         </a:rPr>
                         <a:t>DATETIME</a:t>
                       </a:r>
-                      <a:endParaRPr lang="en-US" altLang="ko-KR" sz="600" kern="1200" baseline="0">
-                        <a:solidFill>
-                          <a:schemeClr val="tx1"/>
-                        </a:solidFill>
-                        <a:effectLst/>
-                        <a:latin typeface="+mn-lt"/>
-                        <a:ea typeface="+mn-ea"/>
-                        <a:cs typeface="+mn-cs"/>
-                      </a:endParaRPr>
                     </a:p>
                     <a:p>
                       <a:pPr algn="l" latinLnBrk="1">
@@ -12238,7 +12264,7 @@
           <p:nvPr/>
         </p:nvGrpSpPr>
         <p:grpSpPr>
-          <a:xfrm rot="0">
+          <a:xfrm>
             <a:off x="3668926" y="1983659"/>
             <a:ext cx="177800" cy="900667"/>
             <a:chOff x="4368847" y="1974134"/>
@@ -13716,7 +13742,7 @@
         </p:nvGraphicFramePr>
         <p:xfrm>
           <a:off x="10096645" y="2856245"/>
-          <a:ext cx="1242524" cy="621809"/>
+          <a:ext cx="1242524" cy="616856"/>
         </p:xfrm>
         <a:graphic>
           <a:graphicData uri="http://schemas.openxmlformats.org/drawingml/2006/table">
@@ -13728,7 +13754,8 @@
               <a:tr h="173664">
                 <a:tc>
                   <a:txBody>
-                    <a:bodyPr vert="horz" lIns="64933" tIns="17952" rIns="64933" bIns="17952" anchor="ctr" anchorCtr="0"/>
+                    <a:bodyPr/>
+                    <a:lstStyle/>
                     <a:p>
                       <a:pPr marL="0" marR="0" indent="0" algn="ctr" latinLnBrk="0">
                         <a:lnSpc>
@@ -13745,7 +13772,7 @@
                       <a:r>
                         <a:rPr lang="en-US" altLang="ko-KR" sz="800" b="1" kern="0" spc="0">
                           <a:solidFill>
-                            <a:srgbClr val="315f97"/>
+                            <a:srgbClr val="315F97"/>
                           </a:solidFill>
                           <a:effectLst/>
                           <a:ea typeface="맑은 고딕"/>
@@ -13754,7 +13781,7 @@
                       </a:r>
                       <a:endParaRPr lang="en-US" altLang="ko-KR" sz="800" b="1" kern="0" spc="0">
                         <a:solidFill>
-                          <a:srgbClr val="315f97"/>
+                          <a:srgbClr val="315F97"/>
                         </a:solidFill>
                         <a:ea typeface="맑은 고딕"/>
                       </a:endParaRPr>
@@ -13795,7 +13822,8 @@
               <a:tr h="385880">
                 <a:tc>
                   <a:txBody>
-                    <a:bodyPr vert="horz" lIns="64933" tIns="17952" rIns="64933" bIns="17952" anchor="ctr" anchorCtr="0"/>
+                    <a:bodyPr/>
+                    <a:lstStyle/>
                     <a:p>
                       <a:pPr marL="0" marR="0" indent="0" algn="l" defTabSz="914400" rtl="0" eaLnBrk="1" latinLnBrk="1" hangingPunct="1">
                         <a:lnSpc>
@@ -13824,15 +13852,6 @@
                         </a:rPr>
                         <a:t>CATEGORY_ID : BIGINT (PK)</a:t>
                       </a:r>
-                      <a:endParaRPr lang="en-US" altLang="ko-KR" sz="600" b="1" kern="1200">
-                        <a:solidFill>
-                          <a:schemeClr val="tx1"/>
-                        </a:solidFill>
-                        <a:effectLst/>
-                        <a:latin typeface="+mn-lt"/>
-                        <a:ea typeface="+mn-ea"/>
-                        <a:cs typeface="+mn-cs"/>
-                      </a:endParaRPr>
                     </a:p>
                     <a:p>
                       <a:pPr marL="0" marR="0" indent="0" algn="l" defTabSz="914400" rtl="0" eaLnBrk="1" latinLnBrk="1" hangingPunct="1">
@@ -13862,15 +13881,6 @@
                         </a:rPr>
                         <a:t>PARENT_ID (FK)</a:t>
                       </a:r>
-                      <a:endParaRPr lang="en-US" altLang="ko-KR" sz="600" b="1" kern="1200" baseline="0">
-                        <a:solidFill>
-                          <a:schemeClr val="tx1"/>
-                        </a:solidFill>
-                        <a:effectLst/>
-                        <a:latin typeface="+mn-lt"/>
-                        <a:ea typeface="+mn-ea"/>
-                        <a:cs typeface="+mn-cs"/>
-                      </a:endParaRPr>
                     </a:p>
                     <a:p>
                       <a:pPr algn="l" latinLnBrk="1">
@@ -13888,15 +13898,6 @@
                         </a:rPr>
                         <a:t>NAME : VARCHAR(255)</a:t>
                       </a:r>
-                      <a:endParaRPr lang="en-US" altLang="ko-KR" sz="600" kern="1200" baseline="0">
-                        <a:solidFill>
-                          <a:schemeClr val="tx1"/>
-                        </a:solidFill>
-                        <a:effectLst/>
-                        <a:latin typeface="+mn-lt"/>
-                        <a:ea typeface="+mn-ea"/>
-                        <a:cs typeface="+mn-cs"/>
-                      </a:endParaRPr>
                     </a:p>
                   </a:txBody>
                   <a:tcPr marL="64933" marR="64933" marT="17952" marB="17952" anchor="ctr">
@@ -14464,7 +14465,8 @@
               <a:tr h="233551">
                 <a:tc>
                   <a:txBody>
-                    <a:bodyPr vert="horz" lIns="64933" tIns="17952" rIns="64933" bIns="17952" anchor="ctr" anchorCtr="0"/>
+                    <a:bodyPr/>
+                    <a:lstStyle/>
                     <a:p>
                       <a:pPr marL="0" marR="0" indent="0" algn="ctr" latinLnBrk="0">
                         <a:lnSpc>
@@ -14481,7 +14483,7 @@
                       <a:r>
                         <a:rPr lang="en-US" altLang="ko-KR" sz="800" b="1" kern="0" spc="0">
                           <a:solidFill>
-                            <a:srgbClr val="315f97"/>
+                            <a:srgbClr val="315F97"/>
                           </a:solidFill>
                           <a:effectLst/>
                           <a:ea typeface="맑은 고딕"/>
@@ -14490,7 +14492,7 @@
                       </a:r>
                       <a:endParaRPr lang="en-US" altLang="ko-KR" sz="800" b="1" kern="0" spc="0">
                         <a:solidFill>
-                          <a:srgbClr val="315f97"/>
+                          <a:srgbClr val="315F97"/>
                         </a:solidFill>
                         <a:ea typeface="맑은 고딕"/>
                       </a:endParaRPr>
@@ -14531,7 +14533,8 @@
               <a:tr h="617131">
                 <a:tc>
                   <a:txBody>
-                    <a:bodyPr vert="horz" lIns="64933" tIns="17952" rIns="64933" bIns="17952" anchor="ctr" anchorCtr="0"/>
+                    <a:bodyPr/>
+                    <a:lstStyle/>
                     <a:p>
                       <a:pPr marL="0" marR="0" indent="0" algn="l" defTabSz="914400" rtl="0" eaLnBrk="1" latinLnBrk="1" hangingPunct="1">
                         <a:lnSpc>
@@ -14560,15 +14563,6 @@
                         </a:rPr>
                         <a:t>RECEIPE_IMG_ID : BIGINT (PK)</a:t>
                       </a:r>
-                      <a:endParaRPr lang="en-US" altLang="ko-KR" sz="600" b="1" kern="1200">
-                        <a:solidFill>
-                          <a:schemeClr val="tx1"/>
-                        </a:solidFill>
-                        <a:effectLst/>
-                        <a:latin typeface="+mn-lt"/>
-                        <a:ea typeface="+mn-ea"/>
-                        <a:cs typeface="+mn-cs"/>
-                      </a:endParaRPr>
                     </a:p>
                     <a:p>
                       <a:pPr algn="l" latinLnBrk="1">
@@ -14586,15 +14580,6 @@
                         </a:rPr>
                         <a:t>RECEIPE_ID : BIGINT (FK)</a:t>
                       </a:r>
-                      <a:endParaRPr lang="en-US" altLang="ko-KR" sz="600" b="1" kern="1200" baseline="0">
-                        <a:solidFill>
-                          <a:schemeClr val="tx1"/>
-                        </a:solidFill>
-                        <a:effectLst/>
-                        <a:latin typeface="+mn-lt"/>
-                        <a:ea typeface="+mn-ea"/>
-                        <a:cs typeface="+mn-cs"/>
-                      </a:endParaRPr>
                     </a:p>
                     <a:p>
                       <a:pPr algn="l" latinLnBrk="1">
@@ -14624,15 +14609,6 @@
                         </a:rPr>
                         <a:t>: VARCHAR(255)</a:t>
                       </a:r>
-                      <a:endParaRPr lang="en-US" altLang="ko-KR" sz="600" kern="1200" baseline="0">
-                        <a:solidFill>
-                          <a:schemeClr val="tx1"/>
-                        </a:solidFill>
-                        <a:effectLst/>
-                        <a:latin typeface="+mn-lt"/>
-                        <a:ea typeface="+mn-ea"/>
-                        <a:cs typeface="+mn-cs"/>
-                      </a:endParaRPr>
                     </a:p>
                     <a:p>
                       <a:pPr marL="0" marR="0" indent="0" algn="l" defTabSz="914400" rtl="0" eaLnBrk="1" latinLnBrk="1" hangingPunct="1">
@@ -14674,15 +14650,6 @@
                         </a:rPr>
                         <a:t>: VARCHAR(255)</a:t>
                       </a:r>
-                      <a:endParaRPr lang="en-US" altLang="ko-KR" sz="600" kern="1200" baseline="0">
-                        <a:solidFill>
-                          <a:schemeClr val="tx1"/>
-                        </a:solidFill>
-                        <a:effectLst/>
-                        <a:latin typeface="+mn-lt"/>
-                        <a:ea typeface="+mn-ea"/>
-                        <a:cs typeface="+mn-cs"/>
-                      </a:endParaRPr>
                     </a:p>
                     <a:p>
                       <a:pPr marL="0" marR="0" indent="0" algn="l" defTabSz="914400" rtl="0" eaLnBrk="1" latinLnBrk="1" hangingPunct="1">
@@ -14712,15 +14679,6 @@
                         </a:rPr>
                         <a:t>IMG_URL: VARCHAR(255)</a:t>
                       </a:r>
-                      <a:endParaRPr lang="en-US" altLang="ko-KR" sz="600" kern="1200" baseline="0">
-                        <a:solidFill>
-                          <a:schemeClr val="tx1"/>
-                        </a:solidFill>
-                        <a:effectLst/>
-                        <a:latin typeface="+mn-lt"/>
-                        <a:ea typeface="+mn-ea"/>
-                        <a:cs typeface="+mn-cs"/>
-                      </a:endParaRPr>
                     </a:p>
                     <a:p>
                       <a:pPr marL="0" marR="0" indent="0" algn="l" defTabSz="914400" rtl="0" eaLnBrk="1" latinLnBrk="1" hangingPunct="1">
@@ -14750,15 +14708,6 @@
                         </a:rPr>
                         <a:t>REP_IMG_YN : VARCHAR(255)</a:t>
                       </a:r>
-                      <a:endParaRPr lang="en-US" altLang="ko-KR" sz="600" kern="1200" baseline="0">
-                        <a:solidFill>
-                          <a:schemeClr val="tx1"/>
-                        </a:solidFill>
-                        <a:effectLst/>
-                        <a:latin typeface="+mn-lt"/>
-                        <a:ea typeface="+mn-ea"/>
-                        <a:cs typeface="+mn-cs"/>
-                      </a:endParaRPr>
                     </a:p>
                   </a:txBody>
                   <a:tcPr marL="64933" marR="64933" marT="17952" marB="17952" anchor="ctr">
@@ -15744,7 +15693,8 @@
               <a:tr h="233551">
                 <a:tc>
                   <a:txBody>
-                    <a:bodyPr vert="horz" lIns="64933" tIns="17952" rIns="64933" bIns="17952" anchor="ctr" anchorCtr="0"/>
+                    <a:bodyPr/>
+                    <a:lstStyle/>
                     <a:p>
                       <a:pPr marL="0" marR="0" indent="0" algn="ctr" latinLnBrk="0">
                         <a:lnSpc>
@@ -15761,7 +15711,7 @@
                       <a:r>
                         <a:rPr lang="en-US" altLang="ko-KR" sz="800" b="1" kern="0" spc="0">
                           <a:solidFill>
-                            <a:srgbClr val="315f97"/>
+                            <a:srgbClr val="315F97"/>
                           </a:solidFill>
                           <a:effectLst/>
                           <a:ea typeface="맑은 고딕"/>
@@ -15770,7 +15720,7 @@
                       </a:r>
                       <a:endParaRPr lang="en-US" altLang="ko-KR" sz="800" b="1" kern="0" spc="0">
                         <a:solidFill>
-                          <a:srgbClr val="315f97"/>
+                          <a:srgbClr val="315F97"/>
                         </a:solidFill>
                         <a:ea typeface="맑은 고딕"/>
                       </a:endParaRPr>
@@ -15811,7 +15761,8 @@
               <a:tr h="617131">
                 <a:tc>
                   <a:txBody>
-                    <a:bodyPr vert="horz" lIns="64933" tIns="17952" rIns="64933" bIns="17952" anchor="ctr" anchorCtr="0"/>
+                    <a:bodyPr/>
+                    <a:lstStyle/>
                     <a:p>
                       <a:pPr marL="0" marR="0" indent="0" algn="l" defTabSz="914400" rtl="0" eaLnBrk="1" latinLnBrk="1" hangingPunct="1">
                         <a:lnSpc>
@@ -15840,15 +15791,6 @@
                         </a:rPr>
                         <a:t>PRODUCT_IMG_ID : BIGINT (PK)</a:t>
                       </a:r>
-                      <a:endParaRPr lang="en-US" altLang="ko-KR" sz="600" b="1" kern="1200">
-                        <a:solidFill>
-                          <a:schemeClr val="tx1"/>
-                        </a:solidFill>
-                        <a:effectLst/>
-                        <a:latin typeface="+mn-lt"/>
-                        <a:ea typeface="+mn-ea"/>
-                        <a:cs typeface="+mn-cs"/>
-                      </a:endParaRPr>
                     </a:p>
                     <a:p>
                       <a:pPr algn="l" latinLnBrk="1">
@@ -15866,15 +15808,6 @@
                         </a:rPr>
                         <a:t>PRODUCT_ID : BIGINT (FK)</a:t>
                       </a:r>
-                      <a:endParaRPr lang="en-US" altLang="ko-KR" sz="600" b="1" kern="1200" baseline="0">
-                        <a:solidFill>
-                          <a:schemeClr val="tx1"/>
-                        </a:solidFill>
-                        <a:effectLst/>
-                        <a:latin typeface="+mn-lt"/>
-                        <a:ea typeface="+mn-ea"/>
-                        <a:cs typeface="+mn-cs"/>
-                      </a:endParaRPr>
                     </a:p>
                     <a:p>
                       <a:pPr algn="l" latinLnBrk="1">
@@ -15904,15 +15837,6 @@
                         </a:rPr>
                         <a:t>: VARCHAR(255)</a:t>
                       </a:r>
-                      <a:endParaRPr lang="en-US" altLang="ko-KR" sz="600" kern="1200" baseline="0">
-                        <a:solidFill>
-                          <a:schemeClr val="tx1"/>
-                        </a:solidFill>
-                        <a:effectLst/>
-                        <a:latin typeface="+mn-lt"/>
-                        <a:ea typeface="+mn-ea"/>
-                        <a:cs typeface="+mn-cs"/>
-                      </a:endParaRPr>
                     </a:p>
                     <a:p>
                       <a:pPr marL="0" marR="0" indent="0" algn="l" defTabSz="914400" rtl="0" eaLnBrk="1" latinLnBrk="1" hangingPunct="1">
@@ -15954,15 +15878,6 @@
                         </a:rPr>
                         <a:t>: VARCHAR(255)</a:t>
                       </a:r>
-                      <a:endParaRPr lang="en-US" altLang="ko-KR" sz="600" kern="1200" baseline="0">
-                        <a:solidFill>
-                          <a:schemeClr val="tx1"/>
-                        </a:solidFill>
-                        <a:effectLst/>
-                        <a:latin typeface="+mn-lt"/>
-                        <a:ea typeface="+mn-ea"/>
-                        <a:cs typeface="+mn-cs"/>
-                      </a:endParaRPr>
                     </a:p>
                     <a:p>
                       <a:pPr marL="0" marR="0" indent="0" algn="l" defTabSz="914400" rtl="0" eaLnBrk="1" latinLnBrk="1" hangingPunct="1">
@@ -15992,15 +15907,6 @@
                         </a:rPr>
                         <a:t>IMG_URL: VARCHAR(255)</a:t>
                       </a:r>
-                      <a:endParaRPr lang="en-US" altLang="ko-KR" sz="600" kern="1200" baseline="0">
-                        <a:solidFill>
-                          <a:schemeClr val="tx1"/>
-                        </a:solidFill>
-                        <a:effectLst/>
-                        <a:latin typeface="+mn-lt"/>
-                        <a:ea typeface="+mn-ea"/>
-                        <a:cs typeface="+mn-cs"/>
-                      </a:endParaRPr>
                     </a:p>
                     <a:p>
                       <a:pPr marL="0" marR="0" indent="0" algn="l" defTabSz="914400" rtl="0" eaLnBrk="1" latinLnBrk="1" hangingPunct="1">
@@ -16030,15 +15936,6 @@
                         </a:rPr>
                         <a:t>REP_IMG_YN : VARCHAR(255)</a:t>
                       </a:r>
-                      <a:endParaRPr lang="en-US" altLang="ko-KR" sz="600" kern="1200" baseline="0">
-                        <a:solidFill>
-                          <a:schemeClr val="tx1"/>
-                        </a:solidFill>
-                        <a:effectLst/>
-                        <a:latin typeface="+mn-lt"/>
-                        <a:ea typeface="+mn-ea"/>
-                        <a:cs typeface="+mn-cs"/>
-                      </a:endParaRPr>
                     </a:p>
                   </a:txBody>
                   <a:tcPr marL="64933" marR="64933" marT="17952" marB="17952" anchor="ctr">
@@ -16734,7 +16631,7 @@
           <p:nvPr/>
         </p:nvGrpSpPr>
         <p:grpSpPr>
-          <a:xfrm rot="0">
+          <a:xfrm>
             <a:off x="5182169" y="3220357"/>
             <a:ext cx="177800" cy="465074"/>
             <a:chOff x="5281050" y="3096015"/>
@@ -16971,16 +16868,1550 @@
           </p:style>
         </p:cxnSp>
       </p:grpSp>
+      <p:graphicFrame>
+        <p:nvGraphicFramePr>
+          <p:cNvPr id="141" name="표 140"/>
+          <p:cNvGraphicFramePr>
+            <a:graphicFrameLocks noGrp="1"/>
+          </p:cNvGraphicFramePr>
+          <p:nvPr>
+            <p:extLst>
+              <p:ext uri="{D42A27DB-BD31-4B8C-83A1-F6EECF244321}">
+                <p14:modId xmlns:p14="http://schemas.microsoft.com/office/powerpoint/2010/main" val="743308854"/>
+              </p:ext>
+            </p:extLst>
+          </p:nvPr>
+        </p:nvGraphicFramePr>
+        <p:xfrm>
+          <a:off x="2614970" y="4744540"/>
+          <a:ext cx="1365490" cy="593998"/>
+        </p:xfrm>
+        <a:graphic>
+          <a:graphicData uri="http://schemas.openxmlformats.org/drawingml/2006/table">
+            <a:tbl>
+              <a:tblPr firstRow="1" bandRow="1"/>
+              <a:tblGrid>
+                <a:gridCol w="1365490"/>
+              </a:tblGrid>
+              <a:tr h="173098">
+                <a:tc>
+                  <a:txBody>
+                    <a:bodyPr/>
+                    <a:lstStyle/>
+                    <a:p>
+                      <a:pPr marL="0" marR="0" indent="0" algn="ctr" latinLnBrk="0">
+                        <a:lnSpc>
+                          <a:spcPct val="160000"/>
+                        </a:lnSpc>
+                        <a:spcBef>
+                          <a:spcPts val="0"/>
+                        </a:spcBef>
+                        <a:spcAft>
+                          <a:spcPts val="0"/>
+                        </a:spcAft>
+                        <a:defRPr/>
+                      </a:pPr>
+                      <a:r>
+                        <a:rPr lang="en-US" altLang="ko-KR" sz="800" b="1" kern="0" spc="0" smtClean="0">
+                          <a:solidFill>
+                            <a:srgbClr val="315F97"/>
+                          </a:solidFill>
+                          <a:effectLst/>
+                          <a:ea typeface="맑은 고딕"/>
+                        </a:rPr>
+                        <a:t>USER_CART</a:t>
+                      </a:r>
+                      <a:endParaRPr lang="en-US" altLang="ko-KR" sz="800" b="1" kern="0" spc="0">
+                        <a:solidFill>
+                          <a:srgbClr val="315F97"/>
+                        </a:solidFill>
+                        <a:effectLst/>
+                        <a:ea typeface="맑은 고딕"/>
+                      </a:endParaRPr>
+                    </a:p>
+                  </a:txBody>
+                  <a:tcPr marL="64933" marR="64933" marT="17952" marB="17952" anchor="ctr">
+                    <a:lnL w="3556" cap="flat" cmpd="sng" algn="ctr">
+                      <a:solidFill>
+                        <a:srgbClr val="000000"/>
+                      </a:solidFill>
+                      <a:prstDash val="solid"/>
+                      <a:round/>
+                    </a:lnL>
+                    <a:lnR w="3556" cap="flat" cmpd="sng" algn="ctr">
+                      <a:solidFill>
+                        <a:srgbClr val="000000"/>
+                      </a:solidFill>
+                      <a:prstDash val="solid"/>
+                      <a:round/>
+                    </a:lnR>
+                    <a:lnT w="3556" cap="flat" cmpd="sng" algn="ctr">
+                      <a:solidFill>
+                        <a:srgbClr val="000000"/>
+                      </a:solidFill>
+                      <a:prstDash val="solid"/>
+                      <a:round/>
+                    </a:lnT>
+                    <a:lnB w="3556" cap="flat" cmpd="sng" algn="ctr">
+                      <a:solidFill>
+                        <a:srgbClr val="000000"/>
+                      </a:solidFill>
+                      <a:prstDash val="solid"/>
+                      <a:round/>
+                    </a:lnB>
+                  </a:tcPr>
+                </a:tc>
+              </a:tr>
+              <a:tr h="363022">
+                <a:tc>
+                  <a:txBody>
+                    <a:bodyPr/>
+                    <a:lstStyle/>
+                    <a:p>
+                      <a:pPr marL="0" marR="0" indent="0" algn="l" defTabSz="914400" rtl="0" eaLnBrk="1" latinLnBrk="1" hangingPunct="1">
+                        <a:lnSpc>
+                          <a:spcPct val="100000"/>
+                        </a:lnSpc>
+                        <a:spcBef>
+                          <a:spcPts val="0"/>
+                        </a:spcBef>
+                        <a:spcAft>
+                          <a:spcPts val="0"/>
+                        </a:spcAft>
+                        <a:buClrTx/>
+                        <a:buFontTx/>
+                        <a:buNone/>
+                        <a:defRPr/>
+                      </a:pPr>
+                      <a:r>
+                        <a:rPr lang="en-US" altLang="ko-KR" sz="600" b="1" kern="1200" smtClean="0">
+                          <a:solidFill>
+                            <a:schemeClr val="tx1"/>
+                          </a:solidFill>
+                          <a:effectLst/>
+                          <a:latin typeface="+mn-lt"/>
+                          <a:ea typeface="+mn-ea"/>
+                          <a:cs typeface="+mn-cs"/>
+                        </a:rPr>
+                        <a:t>CART_ID </a:t>
+                      </a:r>
+                      <a:r>
+                        <a:rPr lang="en-US" altLang="ko-KR" sz="600" b="1" kern="1200">
+                          <a:solidFill>
+                            <a:schemeClr val="tx1"/>
+                          </a:solidFill>
+                          <a:effectLst/>
+                          <a:latin typeface="+mn-lt"/>
+                          <a:ea typeface="+mn-ea"/>
+                          <a:cs typeface="+mn-cs"/>
+                        </a:rPr>
+                        <a:t>: BIGINT (PK</a:t>
+                      </a:r>
+                      <a:r>
+                        <a:rPr lang="en-US" altLang="ko-KR" sz="600" b="1" kern="1200" smtClean="0">
+                          <a:solidFill>
+                            <a:schemeClr val="tx1"/>
+                          </a:solidFill>
+                          <a:effectLst/>
+                          <a:latin typeface="+mn-lt"/>
+                          <a:ea typeface="+mn-ea"/>
+                          <a:cs typeface="+mn-cs"/>
+                        </a:rPr>
+                        <a:t>)</a:t>
+                      </a:r>
+                    </a:p>
+                    <a:p>
+                      <a:pPr marL="0" marR="0" indent="0" algn="l" defTabSz="914400" rtl="0" eaLnBrk="1" fontAlgn="auto" latinLnBrk="1" hangingPunct="1">
+                        <a:lnSpc>
+                          <a:spcPct val="100000"/>
+                        </a:lnSpc>
+                        <a:spcBef>
+                          <a:spcPts val="0"/>
+                        </a:spcBef>
+                        <a:spcAft>
+                          <a:spcPts val="0"/>
+                        </a:spcAft>
+                        <a:buClrTx/>
+                        <a:buSzTx/>
+                        <a:buFontTx/>
+                        <a:buNone/>
+                        <a:tabLst/>
+                        <a:defRPr/>
+                      </a:pPr>
+                      <a:r>
+                        <a:rPr lang="en-US" altLang="ko-KR" sz="600" b="1" kern="1200" baseline="0" smtClean="0">
+                          <a:solidFill>
+                            <a:schemeClr val="tx1"/>
+                          </a:solidFill>
+                          <a:effectLst/>
+                          <a:latin typeface="+mn-lt"/>
+                          <a:ea typeface="+mn-ea"/>
+                          <a:cs typeface="+mn-cs"/>
+                        </a:rPr>
+                        <a:t>MEMBER_ID : BIGINT (FK)</a:t>
+                      </a:r>
+                      <a:endParaRPr lang="en-US" altLang="ko-KR" sz="600" b="1" kern="1200">
+                        <a:solidFill>
+                          <a:schemeClr val="tx1"/>
+                        </a:solidFill>
+                        <a:effectLst/>
+                        <a:latin typeface="+mn-lt"/>
+                        <a:ea typeface="+mn-ea"/>
+                        <a:cs typeface="+mn-cs"/>
+                      </a:endParaRPr>
+                    </a:p>
+                  </a:txBody>
+                  <a:tcPr marL="64933" marR="64933" marT="17952" marB="17952" anchor="ctr">
+                    <a:lnL w="3556" cap="flat" cmpd="sng" algn="ctr">
+                      <a:solidFill>
+                        <a:srgbClr val="000000"/>
+                      </a:solidFill>
+                      <a:prstDash val="solid"/>
+                      <a:round/>
+                    </a:lnL>
+                    <a:lnR w="3556" cap="flat" cmpd="sng" algn="ctr">
+                      <a:solidFill>
+                        <a:srgbClr val="000000"/>
+                      </a:solidFill>
+                      <a:prstDash val="solid"/>
+                      <a:round/>
+                    </a:lnR>
+                    <a:lnT w="3556" cap="flat" cmpd="sng" algn="ctr">
+                      <a:solidFill>
+                        <a:srgbClr val="000000"/>
+                      </a:solidFill>
+                      <a:prstDash val="solid"/>
+                      <a:round/>
+                    </a:lnT>
+                    <a:lnB w="3556" cap="flat" cmpd="sng" algn="ctr">
+                      <a:solidFill>
+                        <a:srgbClr val="000000"/>
+                      </a:solidFill>
+                      <a:prstDash val="solid"/>
+                      <a:round/>
+                    </a:lnB>
+                  </a:tcPr>
+                </a:tc>
+              </a:tr>
+            </a:tbl>
+          </a:graphicData>
+        </a:graphic>
+      </p:graphicFrame>
+      <p:graphicFrame>
+        <p:nvGraphicFramePr>
+          <p:cNvPr id="142" name="표 141"/>
+          <p:cNvGraphicFramePr>
+            <a:graphicFrameLocks noGrp="1"/>
+          </p:cNvGraphicFramePr>
+          <p:nvPr>
+            <p:extLst>
+              <p:ext uri="{D42A27DB-BD31-4B8C-83A1-F6EECF244321}">
+                <p14:modId xmlns:p14="http://schemas.microsoft.com/office/powerpoint/2010/main" val="4272661620"/>
+              </p:ext>
+            </p:extLst>
+          </p:nvPr>
+        </p:nvGraphicFramePr>
+        <p:xfrm>
+          <a:off x="4882275" y="4744540"/>
+          <a:ext cx="1371689" cy="593998"/>
+        </p:xfrm>
+        <a:graphic>
+          <a:graphicData uri="http://schemas.openxmlformats.org/drawingml/2006/table">
+            <a:tbl>
+              <a:tblPr firstRow="1" bandRow="1"/>
+              <a:tblGrid>
+                <a:gridCol w="1371689"/>
+              </a:tblGrid>
+              <a:tr h="173098">
+                <a:tc>
+                  <a:txBody>
+                    <a:bodyPr/>
+                    <a:lstStyle/>
+                    <a:p>
+                      <a:pPr marL="0" marR="0" indent="0" algn="ctr" latinLnBrk="0">
+                        <a:lnSpc>
+                          <a:spcPct val="160000"/>
+                        </a:lnSpc>
+                        <a:spcBef>
+                          <a:spcPts val="0"/>
+                        </a:spcBef>
+                        <a:spcAft>
+                          <a:spcPts val="0"/>
+                        </a:spcAft>
+                        <a:defRPr/>
+                      </a:pPr>
+                      <a:r>
+                        <a:rPr lang="en-US" altLang="ko-KR" sz="800" b="1" kern="0" spc="0" smtClean="0">
+                          <a:solidFill>
+                            <a:srgbClr val="315F97"/>
+                          </a:solidFill>
+                          <a:effectLst/>
+                          <a:ea typeface="맑은 고딕"/>
+                        </a:rPr>
+                        <a:t>USER_CART_PRODUCT</a:t>
+                      </a:r>
+                      <a:endParaRPr lang="en-US" altLang="ko-KR" sz="800" b="1" kern="0" spc="0">
+                        <a:solidFill>
+                          <a:srgbClr val="315F97"/>
+                        </a:solidFill>
+                        <a:effectLst/>
+                        <a:ea typeface="맑은 고딕"/>
+                      </a:endParaRPr>
+                    </a:p>
+                  </a:txBody>
+                  <a:tcPr marL="64933" marR="64933" marT="17952" marB="17952" anchor="ctr">
+                    <a:lnL w="3556" cap="flat" cmpd="sng" algn="ctr">
+                      <a:solidFill>
+                        <a:srgbClr val="000000"/>
+                      </a:solidFill>
+                      <a:prstDash val="solid"/>
+                      <a:round/>
+                    </a:lnL>
+                    <a:lnR w="3556" cap="flat" cmpd="sng" algn="ctr">
+                      <a:solidFill>
+                        <a:srgbClr val="000000"/>
+                      </a:solidFill>
+                      <a:prstDash val="solid"/>
+                      <a:round/>
+                    </a:lnR>
+                    <a:lnT w="3556" cap="flat" cmpd="sng" algn="ctr">
+                      <a:solidFill>
+                        <a:srgbClr val="000000"/>
+                      </a:solidFill>
+                      <a:prstDash val="solid"/>
+                      <a:round/>
+                    </a:lnT>
+                    <a:lnB w="3556" cap="flat" cmpd="sng" algn="ctr">
+                      <a:solidFill>
+                        <a:srgbClr val="000000"/>
+                      </a:solidFill>
+                      <a:prstDash val="solid"/>
+                      <a:round/>
+                    </a:lnB>
+                  </a:tcPr>
+                </a:tc>
+              </a:tr>
+              <a:tr h="363022">
+                <a:tc>
+                  <a:txBody>
+                    <a:bodyPr/>
+                    <a:lstStyle/>
+                    <a:p>
+                      <a:pPr marL="0" marR="0" indent="0" algn="l" defTabSz="914400" rtl="0" eaLnBrk="1" latinLnBrk="1" hangingPunct="1">
+                        <a:lnSpc>
+                          <a:spcPct val="100000"/>
+                        </a:lnSpc>
+                        <a:spcBef>
+                          <a:spcPts val="0"/>
+                        </a:spcBef>
+                        <a:spcAft>
+                          <a:spcPts val="0"/>
+                        </a:spcAft>
+                        <a:buClrTx/>
+                        <a:buFontTx/>
+                        <a:buNone/>
+                        <a:defRPr/>
+                      </a:pPr>
+                      <a:r>
+                        <a:rPr lang="en-US" altLang="ko-KR" sz="600" b="1" kern="1200" smtClean="0">
+                          <a:solidFill>
+                            <a:schemeClr val="tx1"/>
+                          </a:solidFill>
+                          <a:effectLst/>
+                          <a:latin typeface="+mn-lt"/>
+                          <a:ea typeface="+mn-ea"/>
+                          <a:cs typeface="+mn-cs"/>
+                        </a:rPr>
+                        <a:t>CART_ID </a:t>
+                      </a:r>
+                      <a:r>
+                        <a:rPr lang="en-US" altLang="ko-KR" sz="600" b="1" kern="1200">
+                          <a:solidFill>
+                            <a:schemeClr val="tx1"/>
+                          </a:solidFill>
+                          <a:effectLst/>
+                          <a:latin typeface="+mn-lt"/>
+                          <a:ea typeface="+mn-ea"/>
+                          <a:cs typeface="+mn-cs"/>
+                        </a:rPr>
+                        <a:t>: BIGINT (PK</a:t>
+                      </a:r>
+                      <a:r>
+                        <a:rPr lang="en-US" altLang="ko-KR" sz="600" b="1" kern="1200" smtClean="0">
+                          <a:solidFill>
+                            <a:schemeClr val="tx1"/>
+                          </a:solidFill>
+                          <a:effectLst/>
+                          <a:latin typeface="+mn-lt"/>
+                          <a:ea typeface="+mn-ea"/>
+                          <a:cs typeface="+mn-cs"/>
+                        </a:rPr>
+                        <a:t>)</a:t>
+                      </a:r>
+                    </a:p>
+                    <a:p>
+                      <a:pPr marL="0" marR="0" indent="0" algn="l" defTabSz="914400" rtl="0" eaLnBrk="1" fontAlgn="auto" latinLnBrk="1" hangingPunct="1">
+                        <a:lnSpc>
+                          <a:spcPct val="100000"/>
+                        </a:lnSpc>
+                        <a:spcBef>
+                          <a:spcPts val="0"/>
+                        </a:spcBef>
+                        <a:spcAft>
+                          <a:spcPts val="0"/>
+                        </a:spcAft>
+                        <a:buClrTx/>
+                        <a:buSzTx/>
+                        <a:buFontTx/>
+                        <a:buNone/>
+                        <a:tabLst/>
+                        <a:defRPr/>
+                      </a:pPr>
+                      <a:r>
+                        <a:rPr lang="en-US" altLang="ko-KR" sz="600" b="1" kern="1200" baseline="0" smtClean="0">
+                          <a:solidFill>
+                            <a:schemeClr val="tx1"/>
+                          </a:solidFill>
+                          <a:effectLst/>
+                          <a:latin typeface="+mn-lt"/>
+                          <a:ea typeface="+mn-ea"/>
+                          <a:cs typeface="+mn-cs"/>
+                        </a:rPr>
+                        <a:t>MEMBER_ID : BIGINT (FK)</a:t>
+                      </a:r>
+                      <a:endParaRPr lang="en-US" altLang="ko-KR" sz="600" b="1" kern="1200">
+                        <a:solidFill>
+                          <a:schemeClr val="tx1"/>
+                        </a:solidFill>
+                        <a:effectLst/>
+                        <a:latin typeface="+mn-lt"/>
+                        <a:ea typeface="+mn-ea"/>
+                        <a:cs typeface="+mn-cs"/>
+                      </a:endParaRPr>
+                    </a:p>
+                  </a:txBody>
+                  <a:tcPr marL="64933" marR="64933" marT="17952" marB="17952" anchor="ctr">
+                    <a:lnL w="3556" cap="flat" cmpd="sng" algn="ctr">
+                      <a:solidFill>
+                        <a:srgbClr val="000000"/>
+                      </a:solidFill>
+                      <a:prstDash val="solid"/>
+                      <a:round/>
+                    </a:lnL>
+                    <a:lnR w="3556" cap="flat" cmpd="sng" algn="ctr">
+                      <a:solidFill>
+                        <a:srgbClr val="000000"/>
+                      </a:solidFill>
+                      <a:prstDash val="solid"/>
+                      <a:round/>
+                    </a:lnR>
+                    <a:lnT w="3556" cap="flat" cmpd="sng" algn="ctr">
+                      <a:solidFill>
+                        <a:srgbClr val="000000"/>
+                      </a:solidFill>
+                      <a:prstDash val="solid"/>
+                      <a:round/>
+                    </a:lnT>
+                    <a:lnB w="3556" cap="flat" cmpd="sng" algn="ctr">
+                      <a:solidFill>
+                        <a:srgbClr val="000000"/>
+                      </a:solidFill>
+                      <a:prstDash val="solid"/>
+                      <a:round/>
+                    </a:lnB>
+                  </a:tcPr>
+                </a:tc>
+              </a:tr>
+            </a:tbl>
+          </a:graphicData>
+        </a:graphic>
+      </p:graphicFrame>
+      <p:grpSp>
+        <p:nvGrpSpPr>
+          <p:cNvPr id="143" name="그룹 142"/>
+          <p:cNvGrpSpPr/>
+          <p:nvPr/>
+        </p:nvGrpSpPr>
+        <p:grpSpPr>
+          <a:xfrm rot="16200000">
+            <a:off x="4349240" y="4617170"/>
+            <a:ext cx="177800" cy="900667"/>
+            <a:chOff x="5281050" y="3021012"/>
+            <a:chExt cx="177800" cy="900667"/>
+          </a:xfrm>
+        </p:grpSpPr>
+        <p:cxnSp>
+          <p:nvCxnSpPr>
+            <p:cNvPr id="144" name="직선 연결선 143"/>
+            <p:cNvCxnSpPr/>
+            <p:nvPr/>
+          </p:nvCxnSpPr>
+          <p:spPr>
+            <a:xfrm flipV="1">
+              <a:off x="5378222" y="3021012"/>
+              <a:ext cx="0" cy="194734"/>
+            </a:xfrm>
+            <a:prstGeom prst="line">
+              <a:avLst/>
+            </a:prstGeom>
+            <a:ln w="12700"/>
+          </p:spPr>
+          <p:style>
+            <a:lnRef idx="1">
+              <a:schemeClr val="accent1"/>
+            </a:lnRef>
+            <a:fillRef idx="0">
+              <a:schemeClr val="accent1"/>
+            </a:fillRef>
+            <a:effectRef idx="0">
+              <a:schemeClr val="accent1"/>
+            </a:effectRef>
+            <a:fontRef idx="minor">
+              <a:schemeClr val="tx1"/>
+            </a:fontRef>
+          </p:style>
+        </p:cxnSp>
+        <p:cxnSp>
+          <p:nvCxnSpPr>
+            <p:cNvPr id="145" name="직선 연결선 144"/>
+            <p:cNvCxnSpPr/>
+            <p:nvPr/>
+          </p:nvCxnSpPr>
+          <p:spPr>
+            <a:xfrm flipV="1">
+              <a:off x="5378222" y="3259613"/>
+              <a:ext cx="0" cy="113188"/>
+            </a:xfrm>
+            <a:prstGeom prst="line">
+              <a:avLst/>
+            </a:prstGeom>
+            <a:ln w="12700"/>
+          </p:spPr>
+          <p:style>
+            <a:lnRef idx="1">
+              <a:schemeClr val="accent1"/>
+            </a:lnRef>
+            <a:fillRef idx="0">
+              <a:schemeClr val="accent1"/>
+            </a:fillRef>
+            <a:effectRef idx="0">
+              <a:schemeClr val="accent1"/>
+            </a:effectRef>
+            <a:fontRef idx="minor">
+              <a:schemeClr val="tx1"/>
+            </a:fontRef>
+          </p:style>
+        </p:cxnSp>
+        <p:cxnSp>
+          <p:nvCxnSpPr>
+            <p:cNvPr id="146" name="직선 연결선 145"/>
+            <p:cNvCxnSpPr/>
+            <p:nvPr/>
+          </p:nvCxnSpPr>
+          <p:spPr>
+            <a:xfrm flipV="1">
+              <a:off x="5378222" y="3416713"/>
+              <a:ext cx="0" cy="113188"/>
+            </a:xfrm>
+            <a:prstGeom prst="line">
+              <a:avLst/>
+            </a:prstGeom>
+            <a:ln w="12700"/>
+          </p:spPr>
+          <p:style>
+            <a:lnRef idx="1">
+              <a:schemeClr val="accent1"/>
+            </a:lnRef>
+            <a:fillRef idx="0">
+              <a:schemeClr val="accent1"/>
+            </a:fillRef>
+            <a:effectRef idx="0">
+              <a:schemeClr val="accent1"/>
+            </a:effectRef>
+            <a:fontRef idx="minor">
+              <a:schemeClr val="tx1"/>
+            </a:fontRef>
+          </p:style>
+        </p:cxnSp>
+        <p:cxnSp>
+          <p:nvCxnSpPr>
+            <p:cNvPr id="147" name="직선 연결선 146"/>
+            <p:cNvCxnSpPr/>
+            <p:nvPr/>
+          </p:nvCxnSpPr>
+          <p:spPr>
+            <a:xfrm rot="16200000">
+              <a:off x="5352024" y="3834689"/>
+              <a:ext cx="53015" cy="618"/>
+            </a:xfrm>
+            <a:prstGeom prst="line">
+              <a:avLst/>
+            </a:prstGeom>
+            <a:ln w="12700"/>
+          </p:spPr>
+          <p:style>
+            <a:lnRef idx="1">
+              <a:schemeClr val="accent1"/>
+            </a:lnRef>
+            <a:fillRef idx="0">
+              <a:schemeClr val="accent1"/>
+            </a:fillRef>
+            <a:effectRef idx="0">
+              <a:schemeClr val="accent1"/>
+            </a:effectRef>
+            <a:fontRef idx="minor">
+              <a:schemeClr val="tx1"/>
+            </a:fontRef>
+          </p:style>
+        </p:cxnSp>
+        <p:cxnSp>
+          <p:nvCxnSpPr>
+            <p:cNvPr id="148" name="직선 연결선 147"/>
+            <p:cNvCxnSpPr/>
+            <p:nvPr/>
+          </p:nvCxnSpPr>
+          <p:spPr>
+            <a:xfrm flipV="1">
+              <a:off x="5378222" y="3808491"/>
+              <a:ext cx="0" cy="113188"/>
+            </a:xfrm>
+            <a:prstGeom prst="line">
+              <a:avLst/>
+            </a:prstGeom>
+            <a:ln w="12700"/>
+          </p:spPr>
+          <p:style>
+            <a:lnRef idx="1">
+              <a:schemeClr val="accent1"/>
+            </a:lnRef>
+            <a:fillRef idx="0">
+              <a:schemeClr val="accent1"/>
+            </a:fillRef>
+            <a:effectRef idx="0">
+              <a:schemeClr val="accent1"/>
+            </a:effectRef>
+            <a:fontRef idx="minor">
+              <a:schemeClr val="tx1"/>
+            </a:fontRef>
+          </p:style>
+        </p:cxnSp>
+        <p:cxnSp>
+          <p:nvCxnSpPr>
+            <p:cNvPr id="149" name="직선 연결선 148"/>
+            <p:cNvCxnSpPr/>
+            <p:nvPr/>
+          </p:nvCxnSpPr>
+          <p:spPr>
+            <a:xfrm rot="16200000" flipV="1">
+              <a:off x="5364252" y="3821500"/>
+              <a:ext cx="107950" cy="80010"/>
+            </a:xfrm>
+            <a:prstGeom prst="line">
+              <a:avLst/>
+            </a:prstGeom>
+            <a:ln w="12700"/>
+          </p:spPr>
+          <p:style>
+            <a:lnRef idx="1">
+              <a:schemeClr val="accent1"/>
+            </a:lnRef>
+            <a:fillRef idx="0">
+              <a:schemeClr val="accent1"/>
+            </a:fillRef>
+            <a:effectRef idx="0">
+              <a:schemeClr val="accent1"/>
+            </a:effectRef>
+            <a:fontRef idx="minor">
+              <a:schemeClr val="tx1"/>
+            </a:fontRef>
+          </p:style>
+        </p:cxnSp>
+        <p:cxnSp>
+          <p:nvCxnSpPr>
+            <p:cNvPr id="159" name="직선 연결선 158"/>
+            <p:cNvCxnSpPr/>
+            <p:nvPr/>
+          </p:nvCxnSpPr>
+          <p:spPr>
+            <a:xfrm rot="16200000">
+              <a:off x="5275970" y="3822460"/>
+              <a:ext cx="107950" cy="80010"/>
+            </a:xfrm>
+            <a:prstGeom prst="line">
+              <a:avLst/>
+            </a:prstGeom>
+            <a:ln w="12700"/>
+          </p:spPr>
+          <p:style>
+            <a:lnRef idx="1">
+              <a:schemeClr val="accent1"/>
+            </a:lnRef>
+            <a:fillRef idx="0">
+              <a:schemeClr val="accent1"/>
+            </a:fillRef>
+            <a:effectRef idx="0">
+              <a:schemeClr val="accent1"/>
+            </a:effectRef>
+            <a:fontRef idx="minor">
+              <a:schemeClr val="tx1"/>
+            </a:fontRef>
+          </p:style>
+        </p:cxnSp>
+        <p:sp>
+          <p:nvSpPr>
+            <p:cNvPr id="163" name="타원 162"/>
+            <p:cNvSpPr/>
+            <p:nvPr/>
+          </p:nvSpPr>
+          <p:spPr>
+            <a:xfrm rot="16200000" flipH="1">
+              <a:off x="5295020" y="3644661"/>
+              <a:ext cx="167640" cy="160020"/>
+            </a:xfrm>
+            <a:prstGeom prst="ellipse">
+              <a:avLst/>
+            </a:prstGeom>
+            <a:noFill/>
+          </p:spPr>
+          <p:style>
+            <a:lnRef idx="2">
+              <a:schemeClr val="accent1">
+                <a:shade val="50000"/>
+              </a:schemeClr>
+            </a:lnRef>
+            <a:fillRef idx="1">
+              <a:schemeClr val="accent1"/>
+            </a:fillRef>
+            <a:effectRef idx="0">
+              <a:schemeClr val="accent1"/>
+            </a:effectRef>
+            <a:fontRef idx="minor">
+              <a:schemeClr val="lt1"/>
+            </a:fontRef>
+          </p:style>
+          <p:txBody>
+            <a:bodyPr anchor="ctr"/>
+            <a:lstStyle/>
+            <a:p>
+              <a:pPr algn="ctr">
+                <a:defRPr/>
+              </a:pPr>
+              <a:endParaRPr lang="ko-KR" altLang="en-US"/>
+            </a:p>
+          </p:txBody>
+        </p:sp>
+        <p:cxnSp>
+          <p:nvCxnSpPr>
+            <p:cNvPr id="164" name="직선 연결선 163"/>
+            <p:cNvCxnSpPr/>
+            <p:nvPr/>
+          </p:nvCxnSpPr>
+          <p:spPr>
+            <a:xfrm rot="16200000" flipV="1">
+              <a:off x="5351221" y="3613231"/>
+              <a:ext cx="54621" cy="618"/>
+            </a:xfrm>
+            <a:prstGeom prst="line">
+              <a:avLst/>
+            </a:prstGeom>
+            <a:ln w="12700"/>
+          </p:spPr>
+          <p:style>
+            <a:lnRef idx="1">
+              <a:schemeClr val="accent1"/>
+            </a:lnRef>
+            <a:fillRef idx="0">
+              <a:schemeClr val="accent1"/>
+            </a:fillRef>
+            <a:effectRef idx="0">
+              <a:schemeClr val="accent1"/>
+            </a:effectRef>
+            <a:fontRef idx="minor">
+              <a:schemeClr val="tx1"/>
+            </a:fontRef>
+          </p:style>
+        </p:cxnSp>
+        <p:cxnSp>
+          <p:nvCxnSpPr>
+            <p:cNvPr id="165" name="직선 연결선 164"/>
+            <p:cNvCxnSpPr/>
+            <p:nvPr/>
+          </p:nvCxnSpPr>
+          <p:spPr>
+            <a:xfrm rot="16200000" flipV="1">
+              <a:off x="5369950" y="3045300"/>
+              <a:ext cx="0" cy="177800"/>
+            </a:xfrm>
+            <a:prstGeom prst="line">
+              <a:avLst/>
+            </a:prstGeom>
+            <a:ln w="12700"/>
+          </p:spPr>
+          <p:style>
+            <a:lnRef idx="1">
+              <a:schemeClr val="accent1"/>
+            </a:lnRef>
+            <a:fillRef idx="0">
+              <a:schemeClr val="accent1"/>
+            </a:fillRef>
+            <a:effectRef idx="0">
+              <a:schemeClr val="accent1"/>
+            </a:effectRef>
+            <a:fontRef idx="minor">
+              <a:schemeClr val="tx1"/>
+            </a:fontRef>
+          </p:style>
+        </p:cxnSp>
+      </p:grpSp>
+      <p:graphicFrame>
+        <p:nvGraphicFramePr>
+          <p:cNvPr id="166" name="표 165"/>
+          <p:cNvGraphicFramePr>
+            <a:graphicFrameLocks noGrp="1"/>
+          </p:cNvGraphicFramePr>
+          <p:nvPr>
+            <p:extLst>
+              <p:ext uri="{D42A27DB-BD31-4B8C-83A1-F6EECF244321}">
+                <p14:modId xmlns:p14="http://schemas.microsoft.com/office/powerpoint/2010/main" val="2153135682"/>
+              </p:ext>
+            </p:extLst>
+          </p:nvPr>
+        </p:nvGraphicFramePr>
+        <p:xfrm>
+          <a:off x="7804954" y="4611645"/>
+          <a:ext cx="1552406" cy="1018200"/>
+        </p:xfrm>
+        <a:graphic>
+          <a:graphicData uri="http://schemas.openxmlformats.org/drawingml/2006/table">
+            <a:tbl>
+              <a:tblPr firstRow="1" bandRow="1"/>
+              <a:tblGrid>
+                <a:gridCol w="1552406"/>
+              </a:tblGrid>
+              <a:tr h="250776">
+                <a:tc>
+                  <a:txBody>
+                    <a:bodyPr/>
+                    <a:lstStyle/>
+                    <a:p>
+                      <a:pPr marL="0" marR="0" indent="0" algn="ctr" latinLnBrk="0">
+                        <a:lnSpc>
+                          <a:spcPct val="160000"/>
+                        </a:lnSpc>
+                        <a:spcBef>
+                          <a:spcPts val="0"/>
+                        </a:spcBef>
+                        <a:spcAft>
+                          <a:spcPts val="0"/>
+                        </a:spcAft>
+                        <a:defRPr/>
+                      </a:pPr>
+                      <a:r>
+                        <a:rPr lang="en-US" altLang="ko-KR" sz="800" b="1" kern="0" spc="0">
+                          <a:solidFill>
+                            <a:srgbClr val="315F97"/>
+                          </a:solidFill>
+                          <a:effectLst/>
+                          <a:ea typeface="맑은 고딕"/>
+                        </a:rPr>
+                        <a:t>PRODUCT</a:t>
+                      </a:r>
+                      <a:endParaRPr lang="en-US" altLang="ko-KR" sz="800" b="1" kern="0" spc="0">
+                        <a:solidFill>
+                          <a:srgbClr val="315F97"/>
+                        </a:solidFill>
+                        <a:ea typeface="맑은 고딕"/>
+                      </a:endParaRPr>
+                    </a:p>
+                  </a:txBody>
+                  <a:tcPr marL="64933" marR="64933" marT="17952" marB="17952" anchor="ctr">
+                    <a:lnL w="3556" cap="flat" cmpd="sng" algn="ctr">
+                      <a:solidFill>
+                        <a:srgbClr val="000000"/>
+                      </a:solidFill>
+                      <a:prstDash val="solid"/>
+                      <a:round/>
+                    </a:lnL>
+                    <a:lnR w="3556" cap="flat" cmpd="sng" algn="ctr">
+                      <a:solidFill>
+                        <a:srgbClr val="000000"/>
+                      </a:solidFill>
+                      <a:prstDash val="solid"/>
+                      <a:round/>
+                    </a:lnR>
+                    <a:lnT w="3556" cap="flat" cmpd="sng" algn="ctr">
+                      <a:solidFill>
+                        <a:srgbClr val="000000"/>
+                      </a:solidFill>
+                      <a:prstDash val="solid"/>
+                      <a:round/>
+                    </a:lnT>
+                    <a:lnB w="3556" cap="flat" cmpd="sng" algn="ctr">
+                      <a:solidFill>
+                        <a:srgbClr val="000000"/>
+                      </a:solidFill>
+                      <a:prstDash val="solid"/>
+                      <a:round/>
+                    </a:lnB>
+                  </a:tcPr>
+                </a:tc>
+              </a:tr>
+              <a:tr h="625381">
+                <a:tc>
+                  <a:txBody>
+                    <a:bodyPr/>
+                    <a:lstStyle/>
+                    <a:p>
+                      <a:pPr marL="0" marR="0" indent="0" algn="l" defTabSz="914400" rtl="0" eaLnBrk="1" latinLnBrk="1" hangingPunct="1">
+                        <a:lnSpc>
+                          <a:spcPct val="100000"/>
+                        </a:lnSpc>
+                        <a:spcBef>
+                          <a:spcPts val="0"/>
+                        </a:spcBef>
+                        <a:spcAft>
+                          <a:spcPts val="0"/>
+                        </a:spcAft>
+                        <a:buClrTx/>
+                        <a:buFontTx/>
+                        <a:buNone/>
+                        <a:defRPr/>
+                      </a:pPr>
+                      <a:r>
+                        <a:rPr lang="en-US" altLang="ko-KR" sz="600" b="1" kern="1200" smtClean="0">
+                          <a:solidFill>
+                            <a:schemeClr val="tx1"/>
+                          </a:solidFill>
+                          <a:effectLst/>
+                          <a:latin typeface="+mn-lt"/>
+                          <a:ea typeface="+mn-ea"/>
+                          <a:cs typeface="+mn-cs"/>
+                        </a:rPr>
+                        <a:t>PRODUCT_ID </a:t>
+                      </a:r>
+                      <a:r>
+                        <a:rPr lang="en-US" altLang="ko-KR" sz="600" b="1" kern="1200">
+                          <a:solidFill>
+                            <a:schemeClr val="tx1"/>
+                          </a:solidFill>
+                          <a:effectLst/>
+                          <a:latin typeface="+mn-lt"/>
+                          <a:ea typeface="+mn-ea"/>
+                          <a:cs typeface="+mn-cs"/>
+                        </a:rPr>
+                        <a:t>: BIGINT (PK)</a:t>
+                      </a:r>
+                    </a:p>
+                    <a:p>
+                      <a:pPr algn="l" latinLnBrk="1">
+                        <a:defRPr/>
+                      </a:pPr>
+                      <a:r>
+                        <a:rPr lang="en-US" altLang="ko-KR" sz="600" kern="1200" baseline="0" smtClean="0">
+                          <a:solidFill>
+                            <a:schemeClr val="tx1"/>
+                          </a:solidFill>
+                          <a:effectLst/>
+                          <a:latin typeface="+mn-lt"/>
+                          <a:ea typeface="+mn-ea"/>
+                          <a:cs typeface="+mn-cs"/>
+                        </a:rPr>
+                        <a:t>PRODUCT_NAME </a:t>
+                      </a:r>
+                      <a:r>
+                        <a:rPr lang="en-US" altLang="ko-KR" sz="600" kern="1200" baseline="0">
+                          <a:solidFill>
+                            <a:schemeClr val="tx1"/>
+                          </a:solidFill>
+                          <a:effectLst/>
+                          <a:latin typeface="+mn-lt"/>
+                          <a:ea typeface="+mn-ea"/>
+                          <a:cs typeface="+mn-cs"/>
+                        </a:rPr>
+                        <a:t>: VARCHAR(255)</a:t>
+                      </a:r>
+                    </a:p>
+                    <a:p>
+                      <a:pPr algn="l" latinLnBrk="1">
+                        <a:defRPr/>
+                      </a:pPr>
+                      <a:r>
+                        <a:rPr lang="en-US" altLang="ko-KR" sz="600" kern="1200" baseline="0">
+                          <a:solidFill>
+                            <a:schemeClr val="tx1"/>
+                          </a:solidFill>
+                          <a:effectLst/>
+                          <a:latin typeface="+mn-lt"/>
+                          <a:ea typeface="+mn-ea"/>
+                          <a:cs typeface="+mn-cs"/>
+                        </a:rPr>
+                        <a:t>PRICE : INT</a:t>
+                      </a:r>
+                    </a:p>
+                    <a:p>
+                      <a:pPr algn="l" latinLnBrk="1">
+                        <a:defRPr/>
+                      </a:pPr>
+                      <a:r>
+                        <a:rPr lang="en-US" altLang="ko-KR" sz="600" kern="1200" baseline="0">
+                          <a:solidFill>
+                            <a:schemeClr val="tx1"/>
+                          </a:solidFill>
+                          <a:effectLst/>
+                          <a:latin typeface="+mn-lt"/>
+                          <a:ea typeface="+mn-ea"/>
+                          <a:cs typeface="+mn-cs"/>
+                        </a:rPr>
+                        <a:t>STOCKQUANTITY : </a:t>
+                      </a:r>
+                      <a:r>
+                        <a:rPr lang="en-US" altLang="ko-KR" sz="600" kern="1200" baseline="0" smtClean="0">
+                          <a:solidFill>
+                            <a:schemeClr val="tx1"/>
+                          </a:solidFill>
+                          <a:effectLst/>
+                          <a:latin typeface="+mn-lt"/>
+                          <a:ea typeface="+mn-ea"/>
+                          <a:cs typeface="+mn-cs"/>
+                        </a:rPr>
+                        <a:t>INT</a:t>
+                      </a:r>
+                    </a:p>
+                    <a:p>
+                      <a:pPr algn="l" latinLnBrk="1">
+                        <a:defRPr/>
+                      </a:pPr>
+                      <a:r>
+                        <a:rPr lang="en-US" altLang="ko-KR" sz="600" kern="1200" baseline="0" smtClean="0">
+                          <a:solidFill>
+                            <a:schemeClr val="tx1"/>
+                          </a:solidFill>
+                          <a:effectLst/>
+                          <a:latin typeface="+mn-lt"/>
+                          <a:ea typeface="+mn-ea"/>
+                          <a:cs typeface="+mn-cs"/>
+                        </a:rPr>
+                        <a:t>PRODUCT_DETAILS : STRING</a:t>
+                      </a:r>
+                    </a:p>
+                    <a:p>
+                      <a:pPr algn="l" latinLnBrk="1">
+                        <a:defRPr/>
+                      </a:pPr>
+                      <a:r>
+                        <a:rPr lang="en-US" altLang="ko-KR" sz="600" kern="1200" baseline="0" smtClean="0">
+                          <a:solidFill>
+                            <a:schemeClr val="tx1"/>
+                          </a:solidFill>
+                          <a:effectLst/>
+                          <a:latin typeface="+mn-lt"/>
+                          <a:ea typeface="+mn-ea"/>
+                          <a:cs typeface="+mn-cs"/>
+                        </a:rPr>
+                        <a:t>PRODUCT_SELL_STATUS : ENUM(“?”,”?”)</a:t>
+                      </a:r>
+                    </a:p>
+                    <a:p>
+                      <a:pPr algn="l" latinLnBrk="1">
+                        <a:defRPr/>
+                      </a:pPr>
+                      <a:r>
+                        <a:rPr lang="en-US" altLang="ko-KR" sz="600" kern="1200" smtClean="0">
+                          <a:solidFill>
+                            <a:schemeClr val="tx1"/>
+                          </a:solidFill>
+                          <a:effectLst/>
+                          <a:latin typeface="+mn-lt"/>
+                          <a:ea typeface="+mn-ea"/>
+                          <a:cs typeface="+mn-cs"/>
+                        </a:rPr>
+                        <a:t>CREATED_DATE : </a:t>
+                      </a:r>
+                      <a:r>
+                        <a:rPr lang="en-US" altLang="ko-KR" sz="600" kern="1200" baseline="0" smtClean="0">
+                          <a:solidFill>
+                            <a:schemeClr val="tx1"/>
+                          </a:solidFill>
+                          <a:effectLst/>
+                          <a:latin typeface="+mn-lt"/>
+                          <a:ea typeface="+mn-ea"/>
+                          <a:cs typeface="+mn-cs"/>
+                        </a:rPr>
+                        <a:t>DATETIME</a:t>
+                      </a:r>
+                    </a:p>
+                    <a:p>
+                      <a:pPr algn="l" latinLnBrk="1">
+                        <a:defRPr/>
+                      </a:pPr>
+                      <a:r>
+                        <a:rPr lang="en-US" altLang="ko-KR" sz="600" kern="1200" smtClean="0">
+                          <a:solidFill>
+                            <a:schemeClr val="tx1"/>
+                          </a:solidFill>
+                          <a:effectLst/>
+                          <a:latin typeface="+mn-lt"/>
+                          <a:ea typeface="+mn-ea"/>
+                          <a:cs typeface="+mn-cs"/>
+                        </a:rPr>
+                        <a:t>MODIFIED_DATE : </a:t>
+                      </a:r>
+                      <a:r>
+                        <a:rPr lang="en-US" altLang="ko-KR" sz="600" kern="1200" baseline="0" smtClean="0">
+                          <a:solidFill>
+                            <a:schemeClr val="tx1"/>
+                          </a:solidFill>
+                          <a:effectLst/>
+                          <a:latin typeface="+mn-lt"/>
+                          <a:ea typeface="+mn-ea"/>
+                          <a:cs typeface="+mn-cs"/>
+                        </a:rPr>
+                        <a:t>DATETIME</a:t>
+                      </a:r>
+                      <a:endParaRPr lang="en-US" altLang="ko-KR" sz="600" kern="1200" smtClean="0">
+                        <a:solidFill>
+                          <a:schemeClr val="tx1"/>
+                        </a:solidFill>
+                        <a:effectLst/>
+                        <a:latin typeface="+mn-lt"/>
+                        <a:ea typeface="+mn-ea"/>
+                        <a:cs typeface="+mn-cs"/>
+                      </a:endParaRPr>
+                    </a:p>
+                  </a:txBody>
+                  <a:tcPr marL="64933" marR="64933" marT="17952" marB="17952" anchor="ctr">
+                    <a:lnL w="3556" cap="flat" cmpd="sng" algn="ctr">
+                      <a:solidFill>
+                        <a:srgbClr val="000000"/>
+                      </a:solidFill>
+                      <a:prstDash val="solid"/>
+                      <a:round/>
+                    </a:lnL>
+                    <a:lnR w="3556" cap="flat" cmpd="sng" algn="ctr">
+                      <a:solidFill>
+                        <a:srgbClr val="000000"/>
+                      </a:solidFill>
+                      <a:prstDash val="solid"/>
+                      <a:round/>
+                    </a:lnR>
+                    <a:lnT w="3556" cap="flat" cmpd="sng" algn="ctr">
+                      <a:solidFill>
+                        <a:srgbClr val="000000"/>
+                      </a:solidFill>
+                      <a:prstDash val="solid"/>
+                      <a:round/>
+                    </a:lnT>
+                    <a:lnB w="3556" cap="flat" cmpd="sng" algn="ctr">
+                      <a:solidFill>
+                        <a:srgbClr val="000000"/>
+                      </a:solidFill>
+                      <a:prstDash val="solid"/>
+                      <a:round/>
+                    </a:lnB>
+                  </a:tcPr>
+                </a:tc>
+              </a:tr>
+            </a:tbl>
+          </a:graphicData>
+        </a:graphic>
+      </p:graphicFrame>
+      <p:grpSp>
+        <p:nvGrpSpPr>
+          <p:cNvPr id="167" name="그룹 112"/>
+          <p:cNvGrpSpPr/>
+          <p:nvPr/>
+        </p:nvGrpSpPr>
+        <p:grpSpPr>
+          <a:xfrm rot="16200000">
+            <a:off x="6936734" y="4285383"/>
+            <a:ext cx="186690" cy="1519792"/>
+            <a:chOff x="5281050" y="3021012"/>
+            <a:chExt cx="186690" cy="1519792"/>
+          </a:xfrm>
+        </p:grpSpPr>
+        <p:cxnSp>
+          <p:nvCxnSpPr>
+            <p:cNvPr id="168" name="직선 연결선 113"/>
+            <p:cNvCxnSpPr/>
+            <p:nvPr/>
+          </p:nvCxnSpPr>
+          <p:spPr>
+            <a:xfrm flipV="1">
+              <a:off x="5378222" y="3021012"/>
+              <a:ext cx="0" cy="194734"/>
+            </a:xfrm>
+            <a:prstGeom prst="line">
+              <a:avLst/>
+            </a:prstGeom>
+            <a:ln w="12700"/>
+          </p:spPr>
+          <p:style>
+            <a:lnRef idx="1">
+              <a:schemeClr val="accent1"/>
+            </a:lnRef>
+            <a:fillRef idx="0">
+              <a:schemeClr val="accent1"/>
+            </a:fillRef>
+            <a:effectRef idx="0">
+              <a:schemeClr val="accent1"/>
+            </a:effectRef>
+            <a:fontRef idx="minor">
+              <a:schemeClr val="tx1"/>
+            </a:fontRef>
+          </p:style>
+        </p:cxnSp>
+        <p:cxnSp>
+          <p:nvCxnSpPr>
+            <p:cNvPr id="169" name="직선 연결선 114"/>
+            <p:cNvCxnSpPr/>
+            <p:nvPr/>
+          </p:nvCxnSpPr>
+          <p:spPr>
+            <a:xfrm flipV="1">
+              <a:off x="5378222" y="3259613"/>
+              <a:ext cx="0" cy="113188"/>
+            </a:xfrm>
+            <a:prstGeom prst="line">
+              <a:avLst/>
+            </a:prstGeom>
+            <a:ln w="12700"/>
+          </p:spPr>
+          <p:style>
+            <a:lnRef idx="1">
+              <a:schemeClr val="accent1"/>
+            </a:lnRef>
+            <a:fillRef idx="0">
+              <a:schemeClr val="accent1"/>
+            </a:fillRef>
+            <a:effectRef idx="0">
+              <a:schemeClr val="accent1"/>
+            </a:effectRef>
+            <a:fontRef idx="minor">
+              <a:schemeClr val="tx1"/>
+            </a:fontRef>
+          </p:style>
+        </p:cxnSp>
+        <p:cxnSp>
+          <p:nvCxnSpPr>
+            <p:cNvPr id="170" name="직선 연결선 115"/>
+            <p:cNvCxnSpPr/>
+            <p:nvPr/>
+          </p:nvCxnSpPr>
+          <p:spPr>
+            <a:xfrm flipV="1">
+              <a:off x="5378222" y="3416713"/>
+              <a:ext cx="0" cy="113188"/>
+            </a:xfrm>
+            <a:prstGeom prst="line">
+              <a:avLst/>
+            </a:prstGeom>
+            <a:ln w="12700"/>
+          </p:spPr>
+          <p:style>
+            <a:lnRef idx="1">
+              <a:schemeClr val="accent1"/>
+            </a:lnRef>
+            <a:fillRef idx="0">
+              <a:schemeClr val="accent1"/>
+            </a:fillRef>
+            <a:effectRef idx="0">
+              <a:schemeClr val="accent1"/>
+            </a:effectRef>
+            <a:fontRef idx="minor">
+              <a:schemeClr val="tx1"/>
+            </a:fontRef>
+          </p:style>
+        </p:cxnSp>
+        <p:cxnSp>
+          <p:nvCxnSpPr>
+            <p:cNvPr id="171" name="직선 연결선 116"/>
+            <p:cNvCxnSpPr/>
+            <p:nvPr/>
+          </p:nvCxnSpPr>
+          <p:spPr>
+            <a:xfrm flipV="1">
+              <a:off x="5378222" y="4343795"/>
+              <a:ext cx="0" cy="136835"/>
+            </a:xfrm>
+            <a:prstGeom prst="line">
+              <a:avLst/>
+            </a:prstGeom>
+            <a:ln w="12700"/>
+          </p:spPr>
+          <p:style>
+            <a:lnRef idx="1">
+              <a:schemeClr val="accent1"/>
+            </a:lnRef>
+            <a:fillRef idx="0">
+              <a:schemeClr val="accent1"/>
+            </a:fillRef>
+            <a:effectRef idx="0">
+              <a:schemeClr val="accent1"/>
+            </a:effectRef>
+            <a:fontRef idx="minor">
+              <a:schemeClr val="tx1"/>
+            </a:fontRef>
+          </p:style>
+        </p:cxnSp>
+        <p:cxnSp>
+          <p:nvCxnSpPr>
+            <p:cNvPr id="172" name="직선 연결선 117"/>
+            <p:cNvCxnSpPr/>
+            <p:nvPr/>
+          </p:nvCxnSpPr>
+          <p:spPr>
+            <a:xfrm flipV="1">
+              <a:off x="5378222" y="4427616"/>
+              <a:ext cx="0" cy="113188"/>
+            </a:xfrm>
+            <a:prstGeom prst="line">
+              <a:avLst/>
+            </a:prstGeom>
+            <a:ln w="12700"/>
+          </p:spPr>
+          <p:style>
+            <a:lnRef idx="1">
+              <a:schemeClr val="accent1"/>
+            </a:lnRef>
+            <a:fillRef idx="0">
+              <a:schemeClr val="accent1"/>
+            </a:fillRef>
+            <a:effectRef idx="0">
+              <a:schemeClr val="accent1"/>
+            </a:effectRef>
+            <a:fontRef idx="minor">
+              <a:schemeClr val="tx1"/>
+            </a:fontRef>
+          </p:style>
+        </p:cxnSp>
+        <p:cxnSp>
+          <p:nvCxnSpPr>
+            <p:cNvPr id="173" name="직선 연결선 120"/>
+            <p:cNvCxnSpPr/>
+            <p:nvPr/>
+          </p:nvCxnSpPr>
+          <p:spPr>
+            <a:xfrm rot="16200000" flipV="1">
+              <a:off x="5378840" y="4338716"/>
+              <a:ext cx="0" cy="177800"/>
+            </a:xfrm>
+            <a:prstGeom prst="line">
+              <a:avLst/>
+            </a:prstGeom>
+            <a:ln w="12700"/>
+          </p:spPr>
+          <p:style>
+            <a:lnRef idx="1">
+              <a:schemeClr val="accent1"/>
+            </a:lnRef>
+            <a:fillRef idx="0">
+              <a:schemeClr val="accent1"/>
+            </a:fillRef>
+            <a:effectRef idx="0">
+              <a:schemeClr val="accent1"/>
+            </a:effectRef>
+            <a:fontRef idx="minor">
+              <a:schemeClr val="tx1"/>
+            </a:fontRef>
+          </p:style>
+        </p:cxnSp>
+        <p:cxnSp>
+          <p:nvCxnSpPr>
+            <p:cNvPr id="174" name="직선 연결선 122"/>
+            <p:cNvCxnSpPr/>
+            <p:nvPr/>
+          </p:nvCxnSpPr>
+          <p:spPr>
+            <a:xfrm flipV="1">
+              <a:off x="5378222" y="3586230"/>
+              <a:ext cx="0" cy="113188"/>
+            </a:xfrm>
+            <a:prstGeom prst="line">
+              <a:avLst/>
+            </a:prstGeom>
+            <a:ln w="12700"/>
+          </p:spPr>
+          <p:style>
+            <a:lnRef idx="1">
+              <a:schemeClr val="accent1"/>
+            </a:lnRef>
+            <a:fillRef idx="0">
+              <a:schemeClr val="accent1"/>
+            </a:fillRef>
+            <a:effectRef idx="0">
+              <a:schemeClr val="accent1"/>
+            </a:effectRef>
+            <a:fontRef idx="minor">
+              <a:schemeClr val="tx1"/>
+            </a:fontRef>
+          </p:style>
+        </p:cxnSp>
+        <p:cxnSp>
+          <p:nvCxnSpPr>
+            <p:cNvPr id="175" name="직선 연결선 123"/>
+            <p:cNvCxnSpPr/>
+            <p:nvPr/>
+          </p:nvCxnSpPr>
+          <p:spPr>
+            <a:xfrm rot="16200000" flipV="1">
+              <a:off x="5369950" y="3045300"/>
+              <a:ext cx="0" cy="177800"/>
+            </a:xfrm>
+            <a:prstGeom prst="line">
+              <a:avLst/>
+            </a:prstGeom>
+            <a:ln w="12700"/>
+          </p:spPr>
+          <p:style>
+            <a:lnRef idx="1">
+              <a:schemeClr val="accent1"/>
+            </a:lnRef>
+            <a:fillRef idx="0">
+              <a:schemeClr val="accent1"/>
+            </a:fillRef>
+            <a:effectRef idx="0">
+              <a:schemeClr val="accent1"/>
+            </a:effectRef>
+            <a:fontRef idx="minor">
+              <a:schemeClr val="tx1"/>
+            </a:fontRef>
+          </p:style>
+        </p:cxnSp>
+        <p:cxnSp>
+          <p:nvCxnSpPr>
+            <p:cNvPr id="191" name="직선 연결선 122"/>
+            <p:cNvCxnSpPr/>
+            <p:nvPr/>
+          </p:nvCxnSpPr>
+          <p:spPr>
+            <a:xfrm flipV="1">
+              <a:off x="5378222" y="3768447"/>
+              <a:ext cx="0" cy="113188"/>
+            </a:xfrm>
+            <a:prstGeom prst="line">
+              <a:avLst/>
+            </a:prstGeom>
+            <a:ln w="12700"/>
+          </p:spPr>
+          <p:style>
+            <a:lnRef idx="1">
+              <a:schemeClr val="accent1"/>
+            </a:lnRef>
+            <a:fillRef idx="0">
+              <a:schemeClr val="accent1"/>
+            </a:fillRef>
+            <a:effectRef idx="0">
+              <a:schemeClr val="accent1"/>
+            </a:effectRef>
+            <a:fontRef idx="minor">
+              <a:schemeClr val="tx1"/>
+            </a:fontRef>
+          </p:style>
+        </p:cxnSp>
+        <p:cxnSp>
+          <p:nvCxnSpPr>
+            <p:cNvPr id="194" name="직선 연결선 122"/>
+            <p:cNvCxnSpPr/>
+            <p:nvPr/>
+          </p:nvCxnSpPr>
+          <p:spPr>
+            <a:xfrm flipV="1">
+              <a:off x="5378222" y="3934098"/>
+              <a:ext cx="0" cy="113188"/>
+            </a:xfrm>
+            <a:prstGeom prst="line">
+              <a:avLst/>
+            </a:prstGeom>
+            <a:ln w="12700"/>
+          </p:spPr>
+          <p:style>
+            <a:lnRef idx="1">
+              <a:schemeClr val="accent1"/>
+            </a:lnRef>
+            <a:fillRef idx="0">
+              <a:schemeClr val="accent1"/>
+            </a:fillRef>
+            <a:effectRef idx="0">
+              <a:schemeClr val="accent1"/>
+            </a:effectRef>
+            <a:fontRef idx="minor">
+              <a:schemeClr val="tx1"/>
+            </a:fontRef>
+          </p:style>
+        </p:cxnSp>
+        <p:cxnSp>
+          <p:nvCxnSpPr>
+            <p:cNvPr id="195" name="직선 연결선 122"/>
+            <p:cNvCxnSpPr/>
+            <p:nvPr/>
+          </p:nvCxnSpPr>
+          <p:spPr>
+            <a:xfrm flipV="1">
+              <a:off x="5378222" y="4074904"/>
+              <a:ext cx="0" cy="113188"/>
+            </a:xfrm>
+            <a:prstGeom prst="line">
+              <a:avLst/>
+            </a:prstGeom>
+            <a:ln w="12700"/>
+          </p:spPr>
+          <p:style>
+            <a:lnRef idx="1">
+              <a:schemeClr val="accent1"/>
+            </a:lnRef>
+            <a:fillRef idx="0">
+              <a:schemeClr val="accent1"/>
+            </a:fillRef>
+            <a:effectRef idx="0">
+              <a:schemeClr val="accent1"/>
+            </a:effectRef>
+            <a:fontRef idx="minor">
+              <a:schemeClr val="tx1"/>
+            </a:fontRef>
+          </p:style>
+        </p:cxnSp>
+        <p:cxnSp>
+          <p:nvCxnSpPr>
+            <p:cNvPr id="196" name="직선 연결선 122"/>
+            <p:cNvCxnSpPr/>
+            <p:nvPr/>
+          </p:nvCxnSpPr>
+          <p:spPr>
+            <a:xfrm flipV="1">
+              <a:off x="5378222" y="4203284"/>
+              <a:ext cx="0" cy="113188"/>
+            </a:xfrm>
+            <a:prstGeom prst="line">
+              <a:avLst/>
+            </a:prstGeom>
+            <a:ln w="12700"/>
+          </p:spPr>
+          <p:style>
+            <a:lnRef idx="1">
+              <a:schemeClr val="accent1"/>
+            </a:lnRef>
+            <a:fillRef idx="0">
+              <a:schemeClr val="accent1"/>
+            </a:fillRef>
+            <a:effectRef idx="0">
+              <a:schemeClr val="accent1"/>
+            </a:effectRef>
+            <a:fontRef idx="minor">
+              <a:schemeClr val="tx1"/>
+            </a:fontRef>
+          </p:style>
+        </p:cxnSp>
+      </p:grpSp>
     </p:spTree>
   </p:cSld>
   <p:clrMapOvr>
     <a:masterClrMapping/>
   </p:clrMapOvr>
-  <mc:AlternateContent xmlns:mc="http://schemas.openxmlformats.org/markup-compatibility/2006">
-    <mc:Choice xmlns:p14="http://schemas.microsoft.com/office/powerpoint/2010/main" Requires="p14">
-      <p:transition xmlns:mc="http://schemas.openxmlformats.org/markup-compatibility/2006" xmlns:p14="http://schemas.microsoft.com/office/powerpoint/2010/main" mc:Ignorable="p14" p14:dur="500"/>
+  <mc:AlternateContent xmlns:mc="http://schemas.openxmlformats.org/markup-compatibility/2006" xmlns:p14="http://schemas.microsoft.com/office/powerpoint/2010/main">
+    <mc:Choice Requires="p14">
+      <p:transition/>
     </mc:Choice>
-    <mc:Fallback>
+    <mc:Fallback xmlns:dsp="http://schemas.microsoft.com/office/drawing/2008/diagram" xmlns:dgm="http://schemas.openxmlformats.org/drawingml/2006/diagram" xmlns:c="http://schemas.openxmlformats.org/drawingml/2006/chart" xmlns="">
       <p:transition/>
     </mc:Fallback>
   </mc:AlternateContent>
@@ -32667,44 +34098,44 @@
 </file>
 
 <file path=ppt/theme/theme1.xml><?xml version="1.0" encoding="utf-8"?>
-<a:theme xmlns:r="http://schemas.openxmlformats.org/officeDocument/2006/relationships" xmlns:c="http://schemas.openxmlformats.org/drawingml/2006/chart" xmlns:dgm="http://schemas.openxmlformats.org/drawingml/2006/diagram" xmlns:dsp="http://schemas.microsoft.com/office/drawing/2008/diagram" xmlns:a="http://schemas.openxmlformats.org/drawingml/2006/main" xmlns:pic="http://schemas.openxmlformats.org/drawingml/2006/picture" xmlns:wp="http://schemas.openxmlformats.org/drawingml/2006/wordprocessingDrawing" xmlns:xdr="http://schemas.openxmlformats.org/drawingml/2006/spreadsheetDrawing" xmlns:p="http://schemas.openxmlformats.org/presentationml/2006/main" name="Office 테마">
+<a:theme xmlns:a="http://schemas.openxmlformats.org/drawingml/2006/main" name="Office 테마">
   <a:themeElements>
     <a:clrScheme name="Office">
       <a:dk1>
         <a:sysClr val="windowText" lastClr="000000"/>
       </a:dk1>
       <a:lt1>
-        <a:sysClr val="window" lastClr="ffffff"/>
+        <a:sysClr val="window" lastClr="FFFFFF"/>
       </a:lt1>
       <a:dk2>
-        <a:srgbClr val="44546a"/>
+        <a:srgbClr val="44546A"/>
       </a:dk2>
       <a:lt2>
-        <a:srgbClr val="e7e6e6"/>
+        <a:srgbClr val="E7E6E6"/>
       </a:lt2>
       <a:accent1>
-        <a:srgbClr val="5b9bd5"/>
+        <a:srgbClr val="5B9BD5"/>
       </a:accent1>
       <a:accent2>
-        <a:srgbClr val="ed7d31"/>
+        <a:srgbClr val="ED7D31"/>
       </a:accent2>
       <a:accent3>
-        <a:srgbClr val="a5a5a5"/>
+        <a:srgbClr val="A5A5A5"/>
       </a:accent3>
       <a:accent4>
-        <a:srgbClr val="ffc000"/>
+        <a:srgbClr val="FFC000"/>
       </a:accent4>
       <a:accent5>
-        <a:srgbClr val="4472c4"/>
+        <a:srgbClr val="4472C4"/>
       </a:accent5>
       <a:accent6>
-        <a:srgbClr val="70ad47"/>
+        <a:srgbClr val="70AD47"/>
       </a:accent6>
       <a:hlink>
-        <a:srgbClr val="0563c1"/>
+        <a:srgbClr val="0563C1"/>
       </a:hlink>
       <a:folHlink>
-        <a:srgbClr val="954f72"/>
+        <a:srgbClr val="954F72"/>
       </a:folHlink>
     </a:clrScheme>
     <a:fontScheme name="Office">
@@ -32917,45 +34348,47 @@
       </a:bgFillStyleLst>
     </a:fmtScheme>
   </a:themeElements>
+  <a:objectDefaults/>
+  <a:extraClrSchemeLst/>
 </a:theme>
 </file>
 
 <file path=ppt/theme/theme2.xml><?xml version="1.0" encoding="utf-8"?>
-<a:theme xmlns:r="http://schemas.openxmlformats.org/officeDocument/2006/relationships" xmlns:c="http://schemas.openxmlformats.org/drawingml/2006/chart" xmlns:dgm="http://schemas.openxmlformats.org/drawingml/2006/diagram" xmlns:dsp="http://schemas.microsoft.com/office/drawing/2008/diagram" xmlns:a="http://schemas.openxmlformats.org/drawingml/2006/main" xmlns:pic="http://schemas.openxmlformats.org/drawingml/2006/picture" xmlns:wp="http://schemas.openxmlformats.org/drawingml/2006/wordprocessingDrawing" xmlns:xdr="http://schemas.openxmlformats.org/drawingml/2006/spreadsheetDrawing" xmlns:p="http://schemas.openxmlformats.org/presentationml/2006/main" name="Office 테마">
+<a:theme xmlns:a="http://schemas.openxmlformats.org/drawingml/2006/main" name="Office 테마">
   <a:themeElements>
     <a:clrScheme name="Office">
       <a:dk1>
         <a:sysClr val="windowText" lastClr="000000"/>
       </a:dk1>
       <a:lt1>
-        <a:sysClr val="window" lastClr="ffffff"/>
+        <a:sysClr val="window" lastClr="FFFFFF"/>
       </a:lt1>
       <a:dk2>
-        <a:srgbClr val="1f497d"/>
+        <a:srgbClr val="1F497D"/>
       </a:dk2>
       <a:lt2>
-        <a:srgbClr val="eeece1"/>
+        <a:srgbClr val="EEECE1"/>
       </a:lt2>
       <a:accent1>
-        <a:srgbClr val="4f81bd"/>
+        <a:srgbClr val="4F81BD"/>
       </a:accent1>
       <a:accent2>
-        <a:srgbClr val="c0504d"/>
+        <a:srgbClr val="C0504D"/>
       </a:accent2>
       <a:accent3>
-        <a:srgbClr val="9bbb59"/>
+        <a:srgbClr val="9BBB59"/>
       </a:accent3>
       <a:accent4>
-        <a:srgbClr val="8064a2"/>
+        <a:srgbClr val="8064A2"/>
       </a:accent4>
       <a:accent5>
-        <a:srgbClr val="4bacc6"/>
+        <a:srgbClr val="4BACC6"/>
       </a:accent5>
       <a:accent6>
-        <a:srgbClr val="f79646"/>
+        <a:srgbClr val="F79646"/>
       </a:accent6>
       <a:hlink>
-        <a:srgbClr val="0000ff"/>
+        <a:srgbClr val="0000FF"/>
       </a:hlink>
       <a:folHlink>
         <a:srgbClr val="800080"/>
@@ -33200,5 +34633,7 @@
       </a:bgFillStyleLst>
     </a:fmtScheme>
   </a:themeElements>
+  <a:objectDefaults/>
+  <a:extraClrSchemeLst/>
 </a:theme>
 </file>
</xml_diff>